<commit_message>
Alle 4 de modules samen & in eenduidige stijl
</commit_message>
<xml_diff>
--- a/Presentatie/Presentatie groep A1.pptx
+++ b/Presentatie/Presentatie groep A1.pptx
@@ -5,10 +5,10 @@
     <p:sldMasterId id="2147483649" r:id="rId1"/>
   </p:sldMasterIdLst>
   <p:notesMasterIdLst>
-    <p:notesMasterId r:id="rId12"/>
+    <p:notesMasterId r:id="rId23"/>
   </p:notesMasterIdLst>
   <p:handoutMasterIdLst>
-    <p:handoutMasterId r:id="rId13"/>
+    <p:handoutMasterId r:id="rId24"/>
   </p:handoutMasterIdLst>
   <p:sldIdLst>
     <p:sldId id="382" r:id="rId2"/>
@@ -16,11 +16,22 @@
     <p:sldId id="384" r:id="rId4"/>
     <p:sldId id="385" r:id="rId5"/>
     <p:sldId id="386" r:id="rId6"/>
-    <p:sldId id="387" r:id="rId7"/>
-    <p:sldId id="388" r:id="rId8"/>
-    <p:sldId id="389" r:id="rId9"/>
-    <p:sldId id="390" r:id="rId10"/>
-    <p:sldId id="391" r:id="rId11"/>
+    <p:sldId id="392" r:id="rId7"/>
+    <p:sldId id="393" r:id="rId8"/>
+    <p:sldId id="394" r:id="rId9"/>
+    <p:sldId id="395" r:id="rId10"/>
+    <p:sldId id="396" r:id="rId11"/>
+    <p:sldId id="387" r:id="rId12"/>
+    <p:sldId id="403" r:id="rId13"/>
+    <p:sldId id="404" r:id="rId14"/>
+    <p:sldId id="405" r:id="rId15"/>
+    <p:sldId id="406" r:id="rId16"/>
+    <p:sldId id="397" r:id="rId17"/>
+    <p:sldId id="398" r:id="rId18"/>
+    <p:sldId id="399" r:id="rId19"/>
+    <p:sldId id="400" r:id="rId20"/>
+    <p:sldId id="401" r:id="rId21"/>
+    <p:sldId id="402" r:id="rId22"/>
   </p:sldIdLst>
   <p:sldSz cx="9144000" cy="6858000" type="screen4x3"/>
   <p:notesSz cx="6794500" cy="9931400"/>
@@ -5298,6 +5309,319 @@
       </p:grpSpPr>
       <p:sp>
         <p:nvSpPr>
+          <p:cNvPr id="4098" name="Title 3"/>
+          <p:cNvSpPr>
+            <a:spLocks noGrp="1"/>
+          </p:cNvSpPr>
+          <p:nvPr>
+            <p:ph type="title"/>
+          </p:nvPr>
+        </p:nvSpPr>
+        <p:spPr>
+          <a:xfrm>
+            <a:off x="917575" y="457200"/>
+            <a:ext cx="7159625" cy="627063"/>
+          </a:xfrm>
+        </p:spPr>
+        <p:txBody>
+          <a:bodyPr/>
+          <a:lstStyle/>
+          <a:p>
+            <a:pPr>
+              <a:defRPr/>
+            </a:pPr>
+            <a:r>
+              <a:rPr lang="nl-NL" altLang="nl-NL" dirty="0" err="1" smtClean="0">
+                <a:latin typeface="+mn-lt"/>
+                <a:ea typeface="ＭＳ Ｐゴシック" pitchFamily="34" charset="-128"/>
+              </a:rPr>
+              <a:t>Main</a:t>
+            </a:r>
+            <a:r>
+              <a:rPr lang="nl-NL" altLang="nl-NL" dirty="0" smtClean="0">
+                <a:latin typeface="+mn-lt"/>
+                <a:ea typeface="ＭＳ Ｐゴシック" pitchFamily="34" charset="-128"/>
+              </a:rPr>
+              <a:t> controller</a:t>
+            </a:r>
+            <a:endParaRPr lang="nl-NL" altLang="nl-NL" dirty="0" smtClean="0">
+              <a:latin typeface="+mn-lt"/>
+              <a:ea typeface="ＭＳ Ｐゴシック" pitchFamily="34" charset="-128"/>
+            </a:endParaRPr>
+          </a:p>
+        </p:txBody>
+      </p:sp>
+      <p:sp>
+        <p:nvSpPr>
+          <p:cNvPr id="6" name="Ondertitel 2"/>
+          <p:cNvSpPr txBox="1">
+            <a:spLocks/>
+          </p:cNvSpPr>
+          <p:nvPr/>
+        </p:nvSpPr>
+        <p:spPr bwMode="auto">
+          <a:xfrm>
+            <a:off x="914400" y="1041400"/>
+            <a:ext cx="6781800" cy="474663"/>
+          </a:xfrm>
+          <a:prstGeom prst="rect">
+            <a:avLst/>
+          </a:prstGeom>
+          <a:noFill/>
+          <a:ln w="9525">
+            <a:noFill/>
+            <a:miter lim="800000"/>
+            <a:headEnd/>
+            <a:tailEnd/>
+          </a:ln>
+        </p:spPr>
+        <p:txBody>
+          <a:bodyPr lIns="0" tIns="0" rIns="0" bIns="0"/>
+          <a:lstStyle>
+            <a:lvl1pPr eaLnBrk="0" hangingPunct="0">
+              <a:defRPr sz="2400">
+                <a:solidFill>
+                  <a:schemeClr val="tx1"/>
+                </a:solidFill>
+                <a:latin typeface="Tahoma" charset="0"/>
+                <a:cs typeface="Arial" charset="0"/>
+              </a:defRPr>
+            </a:lvl1pPr>
+            <a:lvl2pPr marL="37931725" indent="-37474525" eaLnBrk="0" hangingPunct="0">
+              <a:defRPr sz="2400">
+                <a:solidFill>
+                  <a:schemeClr val="tx1"/>
+                </a:solidFill>
+                <a:latin typeface="Tahoma" charset="0"/>
+                <a:cs typeface="Arial" charset="0"/>
+              </a:defRPr>
+            </a:lvl2pPr>
+            <a:lvl3pPr eaLnBrk="0" hangingPunct="0">
+              <a:defRPr sz="2400">
+                <a:solidFill>
+                  <a:schemeClr val="tx1"/>
+                </a:solidFill>
+                <a:latin typeface="Tahoma" charset="0"/>
+                <a:cs typeface="Arial" charset="0"/>
+              </a:defRPr>
+            </a:lvl3pPr>
+            <a:lvl4pPr eaLnBrk="0" hangingPunct="0">
+              <a:defRPr sz="2400">
+                <a:solidFill>
+                  <a:schemeClr val="tx1"/>
+                </a:solidFill>
+                <a:latin typeface="Tahoma" charset="0"/>
+                <a:cs typeface="Arial" charset="0"/>
+              </a:defRPr>
+            </a:lvl4pPr>
+            <a:lvl5pPr eaLnBrk="0" hangingPunct="0">
+              <a:defRPr sz="2400">
+                <a:solidFill>
+                  <a:schemeClr val="tx1"/>
+                </a:solidFill>
+                <a:latin typeface="Tahoma" charset="0"/>
+                <a:cs typeface="Arial" charset="0"/>
+              </a:defRPr>
+            </a:lvl5pPr>
+            <a:lvl6pPr marL="457200" eaLnBrk="0" fontAlgn="base" hangingPunct="0">
+              <a:spcBef>
+                <a:spcPct val="0"/>
+              </a:spcBef>
+              <a:spcAft>
+                <a:spcPct val="0"/>
+              </a:spcAft>
+              <a:defRPr sz="2400">
+                <a:solidFill>
+                  <a:schemeClr val="tx1"/>
+                </a:solidFill>
+                <a:latin typeface="Tahoma" charset="0"/>
+                <a:cs typeface="Arial" charset="0"/>
+              </a:defRPr>
+            </a:lvl6pPr>
+            <a:lvl7pPr marL="914400" eaLnBrk="0" fontAlgn="base" hangingPunct="0">
+              <a:spcBef>
+                <a:spcPct val="0"/>
+              </a:spcBef>
+              <a:spcAft>
+                <a:spcPct val="0"/>
+              </a:spcAft>
+              <a:defRPr sz="2400">
+                <a:solidFill>
+                  <a:schemeClr val="tx1"/>
+                </a:solidFill>
+                <a:latin typeface="Tahoma" charset="0"/>
+                <a:cs typeface="Arial" charset="0"/>
+              </a:defRPr>
+            </a:lvl7pPr>
+            <a:lvl8pPr marL="1371600" eaLnBrk="0" fontAlgn="base" hangingPunct="0">
+              <a:spcBef>
+                <a:spcPct val="0"/>
+              </a:spcBef>
+              <a:spcAft>
+                <a:spcPct val="0"/>
+              </a:spcAft>
+              <a:defRPr sz="2400">
+                <a:solidFill>
+                  <a:schemeClr val="tx1"/>
+                </a:solidFill>
+                <a:latin typeface="Tahoma" charset="0"/>
+                <a:cs typeface="Arial" charset="0"/>
+              </a:defRPr>
+            </a:lvl8pPr>
+            <a:lvl9pPr marL="1828800" eaLnBrk="0" fontAlgn="base" hangingPunct="0">
+              <a:spcBef>
+                <a:spcPct val="0"/>
+              </a:spcBef>
+              <a:spcAft>
+                <a:spcPct val="0"/>
+              </a:spcAft>
+              <a:defRPr sz="2400">
+                <a:solidFill>
+                  <a:schemeClr val="tx1"/>
+                </a:solidFill>
+                <a:latin typeface="Tahoma" charset="0"/>
+                <a:cs typeface="Arial" charset="0"/>
+              </a:defRPr>
+            </a:lvl9pPr>
+          </a:lstStyle>
+          <a:p>
+            <a:pPr algn="l">
+              <a:lnSpc>
+                <a:spcPts val="2500"/>
+              </a:lnSpc>
+              <a:buClr>
+                <a:srgbClr val="00A6D6"/>
+              </a:buClr>
+              <a:defRPr/>
+            </a:pPr>
+            <a:r>
+              <a:rPr lang="nl-NL" altLang="nl-NL" sz="2000" dirty="0" smtClean="0">
+                <a:solidFill>
+                  <a:srgbClr val="00A6D6"/>
+                </a:solidFill>
+                <a:latin typeface="+mn-lt"/>
+                <a:ea typeface="ＭＳ Ｐゴシック" charset="-128"/>
+              </a:rPr>
+              <a:t>Menu</a:t>
+            </a:r>
+            <a:endParaRPr lang="nl-NL" altLang="nl-NL" sz="2000" dirty="0" smtClean="0">
+              <a:solidFill>
+                <a:srgbClr val="00A6D6"/>
+              </a:solidFill>
+              <a:latin typeface="+mn-lt"/>
+              <a:ea typeface="ＭＳ Ｐゴシック" charset="-128"/>
+            </a:endParaRPr>
+          </a:p>
+        </p:txBody>
+      </p:sp>
+      <p:sp>
+        <p:nvSpPr>
+          <p:cNvPr id="8" name="Content Placeholder 4"/>
+          <p:cNvSpPr>
+            <a:spLocks noGrp="1"/>
+          </p:cNvSpPr>
+          <p:nvPr>
+            <p:ph idx="1"/>
+          </p:nvPr>
+        </p:nvSpPr>
+        <p:spPr/>
+        <p:txBody>
+          <a:bodyPr/>
+          <a:lstStyle/>
+          <a:p>
+            <a:r>
+              <a:rPr lang="nl-NL" altLang="nl-NL" dirty="0">
+                <a:ea typeface="Tahoma"/>
+                <a:cs typeface="Tahoma"/>
+              </a:rPr>
+              <a:t>Gebruiksvriendelijk</a:t>
+            </a:r>
+          </a:p>
+          <a:p>
+            <a:r>
+              <a:rPr lang="nl-NL" altLang="nl-NL" dirty="0" smtClean="0">
+                <a:ea typeface="Tahoma"/>
+                <a:cs typeface="Tahoma"/>
+              </a:rPr>
+              <a:t>FSM</a:t>
+            </a:r>
+            <a:endParaRPr lang="nl-NL" altLang="nl-NL" dirty="0">
+              <a:ea typeface="Tahoma"/>
+              <a:cs typeface="Tahoma"/>
+            </a:endParaRPr>
+          </a:p>
+        </p:txBody>
+      </p:sp>
+      <p:pic>
+        <p:nvPicPr>
+          <p:cNvPr id="5" name="Afbeelding 4" descr="fsm.png"/>
+          <p:cNvPicPr>
+            <a:picLocks noChangeAspect="1"/>
+          </p:cNvPicPr>
+          <p:nvPr/>
+        </p:nvPicPr>
+        <p:blipFill>
+          <a:blip r:embed="rId2">
+            <a:extLst>
+              <a:ext uri="{28A0092B-C50C-407E-A947-70E740481C1C}">
+                <a14:useLocalDpi xmlns:a14="http://schemas.microsoft.com/office/drawing/2010/main" val="0"/>
+              </a:ext>
+            </a:extLst>
+          </a:blip>
+          <a:srcRect l="-10" r="12916"/>
+          <a:stretch>
+            <a:fillRect/>
+          </a:stretch>
+        </p:blipFill>
+        <p:spPr>
+          <a:xfrm>
+            <a:off x="3544508" y="1903216"/>
+            <a:ext cx="5157167" cy="3552825"/>
+          </a:xfrm>
+          <a:prstGeom prst="rect">
+            <a:avLst/>
+          </a:prstGeom>
+        </p:spPr>
+      </p:pic>
+    </p:spTree>
+    <p:extLst>
+      <p:ext uri="{BB962C8B-B14F-4D97-AF65-F5344CB8AC3E}">
+        <p14:creationId xmlns:p14="http://schemas.microsoft.com/office/powerpoint/2010/main" val="3958517889"/>
+      </p:ext>
+    </p:extLst>
+  </p:cSld>
+  <p:clrMapOvr>
+    <a:masterClrMapping/>
+  </p:clrMapOvr>
+  <p:timing>
+    <p:tnLst>
+      <p:par>
+        <p:cTn id="1" dur="indefinite" restart="never" nodeType="tmRoot"/>
+      </p:par>
+    </p:tnLst>
+  </p:timing>
+</p:sld>
+</file>
+
+<file path=ppt/slides/slide11.xml><?xml version="1.0" encoding="utf-8"?>
+<p:sld xmlns:a="http://schemas.openxmlformats.org/drawingml/2006/main" xmlns:r="http://schemas.openxmlformats.org/officeDocument/2006/relationships" xmlns:p="http://schemas.openxmlformats.org/presentationml/2006/main">
+  <p:cSld>
+    <p:spTree>
+      <p:nvGrpSpPr>
+        <p:cNvPr id="1" name=""/>
+        <p:cNvGrpSpPr/>
+        <p:nvPr/>
+      </p:nvGrpSpPr>
+      <p:grpSpPr>
+        <a:xfrm>
+          <a:off x="0" y="0"/>
+          <a:ext cx="0" cy="0"/>
+          <a:chOff x="0" y="0"/>
+          <a:chExt cx="0" cy="0"/>
+        </a:xfrm>
+      </p:grpSpPr>
+      <p:sp>
+        <p:nvSpPr>
           <p:cNvPr id="2" name="Titel 1"/>
           <p:cNvSpPr>
             <a:spLocks noGrp="1"/>
@@ -5312,20 +5636,563 @@
           <a:lstStyle/>
           <a:p>
             <a:r>
-              <a:rPr lang="nl-NL" dirty="0" smtClean="0">
+              <a:rPr lang="nl-NL" dirty="0" smtClean="0"/>
+              <a:t>Alarm module</a:t>
+            </a:r>
+            <a:endParaRPr lang="nl-NL" dirty="0"/>
+          </a:p>
+        </p:txBody>
+      </p:sp>
+    </p:spTree>
+    <p:extLst>
+      <p:ext uri="{BB962C8B-B14F-4D97-AF65-F5344CB8AC3E}">
+        <p14:creationId xmlns:p14="http://schemas.microsoft.com/office/powerpoint/2010/main" val="1580779184"/>
+      </p:ext>
+    </p:extLst>
+  </p:cSld>
+  <p:clrMapOvr>
+    <a:masterClrMapping/>
+  </p:clrMapOvr>
+  <p:timing>
+    <p:tnLst>
+      <p:par>
+        <p:cTn id="1" dur="indefinite" restart="never" nodeType="tmRoot"/>
+      </p:par>
+    </p:tnLst>
+  </p:timing>
+</p:sld>
+</file>
+
+<file path=ppt/slides/slide12.xml><?xml version="1.0" encoding="utf-8"?>
+<p:sld xmlns:a="http://schemas.openxmlformats.org/drawingml/2006/main" xmlns:r="http://schemas.openxmlformats.org/officeDocument/2006/relationships" xmlns:p="http://schemas.openxmlformats.org/presentationml/2006/main">
+  <p:cSld>
+    <p:spTree>
+      <p:nvGrpSpPr>
+        <p:cNvPr id="1" name=""/>
+        <p:cNvGrpSpPr/>
+        <p:nvPr/>
+      </p:nvGrpSpPr>
+      <p:grpSpPr>
+        <a:xfrm>
+          <a:off x="0" y="0"/>
+          <a:ext cx="0" cy="0"/>
+          <a:chOff x="0" y="0"/>
+          <a:chExt cx="0" cy="0"/>
+        </a:xfrm>
+      </p:grpSpPr>
+      <p:sp>
+        <p:nvSpPr>
+          <p:cNvPr id="4098" name="Title 3"/>
+          <p:cNvSpPr>
+            <a:spLocks noGrp="1"/>
+          </p:cNvSpPr>
+          <p:nvPr>
+            <p:ph type="title"/>
+          </p:nvPr>
+        </p:nvSpPr>
+        <p:spPr>
+          <a:xfrm>
+            <a:off x="917575" y="457200"/>
+            <a:ext cx="7159625" cy="627063"/>
+          </a:xfrm>
+        </p:spPr>
+        <p:txBody>
+          <a:bodyPr/>
+          <a:lstStyle/>
+          <a:p>
+            <a:pPr>
+              <a:defRPr/>
+            </a:pPr>
+            <a:r>
+              <a:rPr lang="nl-NL" altLang="nl-NL" dirty="0" smtClean="0">
                 <a:latin typeface="+mn-lt"/>
+                <a:ea typeface="ＭＳ Ｐゴシック" pitchFamily="34" charset="-128"/>
               </a:rPr>
-              <a:t>FSM</a:t>
-            </a:r>
-            <a:endParaRPr lang="nl-NL" dirty="0">
+              <a:t>Alarm</a:t>
+            </a:r>
+            <a:endParaRPr lang="nl-NL" altLang="nl-NL" dirty="0" smtClean="0">
               <a:latin typeface="+mn-lt"/>
+              <a:ea typeface="ＭＳ Ｐゴシック" pitchFamily="34" charset="-128"/>
+            </a:endParaRPr>
+          </a:p>
+        </p:txBody>
+      </p:sp>
+      <p:sp>
+        <p:nvSpPr>
+          <p:cNvPr id="6" name="Ondertitel 2"/>
+          <p:cNvSpPr txBox="1">
+            <a:spLocks/>
+          </p:cNvSpPr>
+          <p:nvPr/>
+        </p:nvSpPr>
+        <p:spPr bwMode="auto">
+          <a:xfrm>
+            <a:off x="914400" y="1041400"/>
+            <a:ext cx="6781800" cy="474663"/>
+          </a:xfrm>
+          <a:prstGeom prst="rect">
+            <a:avLst/>
+          </a:prstGeom>
+          <a:noFill/>
+          <a:ln w="9525">
+            <a:noFill/>
+            <a:miter lim="800000"/>
+            <a:headEnd/>
+            <a:tailEnd/>
+          </a:ln>
+        </p:spPr>
+        <p:txBody>
+          <a:bodyPr lIns="0" tIns="0" rIns="0" bIns="0"/>
+          <a:lstStyle>
+            <a:lvl1pPr eaLnBrk="0" hangingPunct="0">
+              <a:defRPr sz="2400">
+                <a:solidFill>
+                  <a:schemeClr val="tx1"/>
+                </a:solidFill>
+                <a:latin typeface="Tahoma" charset="0"/>
+                <a:cs typeface="Arial" charset="0"/>
+              </a:defRPr>
+            </a:lvl1pPr>
+            <a:lvl2pPr marL="37931725" indent="-37474525" eaLnBrk="0" hangingPunct="0">
+              <a:defRPr sz="2400">
+                <a:solidFill>
+                  <a:schemeClr val="tx1"/>
+                </a:solidFill>
+                <a:latin typeface="Tahoma" charset="0"/>
+                <a:cs typeface="Arial" charset="0"/>
+              </a:defRPr>
+            </a:lvl2pPr>
+            <a:lvl3pPr eaLnBrk="0" hangingPunct="0">
+              <a:defRPr sz="2400">
+                <a:solidFill>
+                  <a:schemeClr val="tx1"/>
+                </a:solidFill>
+                <a:latin typeface="Tahoma" charset="0"/>
+                <a:cs typeface="Arial" charset="0"/>
+              </a:defRPr>
+            </a:lvl3pPr>
+            <a:lvl4pPr eaLnBrk="0" hangingPunct="0">
+              <a:defRPr sz="2400">
+                <a:solidFill>
+                  <a:schemeClr val="tx1"/>
+                </a:solidFill>
+                <a:latin typeface="Tahoma" charset="0"/>
+                <a:cs typeface="Arial" charset="0"/>
+              </a:defRPr>
+            </a:lvl4pPr>
+            <a:lvl5pPr eaLnBrk="0" hangingPunct="0">
+              <a:defRPr sz="2400">
+                <a:solidFill>
+                  <a:schemeClr val="tx1"/>
+                </a:solidFill>
+                <a:latin typeface="Tahoma" charset="0"/>
+                <a:cs typeface="Arial" charset="0"/>
+              </a:defRPr>
+            </a:lvl5pPr>
+            <a:lvl6pPr marL="457200" eaLnBrk="0" fontAlgn="base" hangingPunct="0">
+              <a:spcBef>
+                <a:spcPct val="0"/>
+              </a:spcBef>
+              <a:spcAft>
+                <a:spcPct val="0"/>
+              </a:spcAft>
+              <a:defRPr sz="2400">
+                <a:solidFill>
+                  <a:schemeClr val="tx1"/>
+                </a:solidFill>
+                <a:latin typeface="Tahoma" charset="0"/>
+                <a:cs typeface="Arial" charset="0"/>
+              </a:defRPr>
+            </a:lvl6pPr>
+            <a:lvl7pPr marL="914400" eaLnBrk="0" fontAlgn="base" hangingPunct="0">
+              <a:spcBef>
+                <a:spcPct val="0"/>
+              </a:spcBef>
+              <a:spcAft>
+                <a:spcPct val="0"/>
+              </a:spcAft>
+              <a:defRPr sz="2400">
+                <a:solidFill>
+                  <a:schemeClr val="tx1"/>
+                </a:solidFill>
+                <a:latin typeface="Tahoma" charset="0"/>
+                <a:cs typeface="Arial" charset="0"/>
+              </a:defRPr>
+            </a:lvl7pPr>
+            <a:lvl8pPr marL="1371600" eaLnBrk="0" fontAlgn="base" hangingPunct="0">
+              <a:spcBef>
+                <a:spcPct val="0"/>
+              </a:spcBef>
+              <a:spcAft>
+                <a:spcPct val="0"/>
+              </a:spcAft>
+              <a:defRPr sz="2400">
+                <a:solidFill>
+                  <a:schemeClr val="tx1"/>
+                </a:solidFill>
+                <a:latin typeface="Tahoma" charset="0"/>
+                <a:cs typeface="Arial" charset="0"/>
+              </a:defRPr>
+            </a:lvl8pPr>
+            <a:lvl9pPr marL="1828800" eaLnBrk="0" fontAlgn="base" hangingPunct="0">
+              <a:spcBef>
+                <a:spcPct val="0"/>
+              </a:spcBef>
+              <a:spcAft>
+                <a:spcPct val="0"/>
+              </a:spcAft>
+              <a:defRPr sz="2400">
+                <a:solidFill>
+                  <a:schemeClr val="tx1"/>
+                </a:solidFill>
+                <a:latin typeface="Tahoma" charset="0"/>
+                <a:cs typeface="Arial" charset="0"/>
+              </a:defRPr>
+            </a:lvl9pPr>
+          </a:lstStyle>
+          <a:p>
+            <a:pPr algn="l">
+              <a:lnSpc>
+                <a:spcPts val="2500"/>
+              </a:lnSpc>
+              <a:buClr>
+                <a:srgbClr val="00A6D6"/>
+              </a:buClr>
+              <a:defRPr/>
+            </a:pPr>
+            <a:r>
+              <a:rPr lang="nl-NL" altLang="nl-NL" sz="2000" dirty="0" smtClean="0">
+                <a:solidFill>
+                  <a:srgbClr val="00A6D6"/>
+                </a:solidFill>
+                <a:latin typeface="+mn-lt"/>
+                <a:ea typeface="ＭＳ Ｐゴシック" charset="-128"/>
+              </a:rPr>
+              <a:t>Blokdiagram</a:t>
+            </a:r>
+            <a:endParaRPr lang="nl-NL" altLang="nl-NL" sz="2000" dirty="0" smtClean="0">
+              <a:solidFill>
+                <a:srgbClr val="00A6D6"/>
+              </a:solidFill>
+              <a:latin typeface="+mn-lt"/>
+              <a:ea typeface="ＭＳ Ｐゴシック" charset="-128"/>
             </a:endParaRPr>
           </a:p>
         </p:txBody>
       </p:sp>
       <p:pic>
         <p:nvPicPr>
-          <p:cNvPr id="4" name="Tijdelijke aanduiding voor inhoud 3"/>
+          <p:cNvPr id="7" name="Tijdelijke aanduiding voor inhoud 5"/>
+          <p:cNvPicPr>
+            <a:picLocks noChangeAspect="1"/>
+          </p:cNvPicPr>
+          <p:nvPr/>
+        </p:nvPicPr>
+        <p:blipFill>
+          <a:blip r:embed="rId2">
+            <a:extLst>
+              <a:ext uri="{28A0092B-C50C-407E-A947-70E740481C1C}">
+                <a14:useLocalDpi xmlns:a14="http://schemas.microsoft.com/office/drawing/2010/main" val="0"/>
+              </a:ext>
+            </a:extLst>
+          </a:blip>
+          <a:stretch>
+            <a:fillRect/>
+          </a:stretch>
+        </p:blipFill>
+        <p:spPr bwMode="auto">
+          <a:xfrm>
+            <a:off x="153448" y="2238233"/>
+            <a:ext cx="8990552" cy="3745381"/>
+          </a:xfrm>
+          <a:prstGeom prst="rect">
+            <a:avLst/>
+          </a:prstGeom>
+          <a:noFill/>
+          <a:ln>
+            <a:noFill/>
+          </a:ln>
+          <a:extLst>
+            <a:ext uri="{909E8E84-426E-40DD-AFC4-6F175D3DCCD1}">
+              <a14:hiddenFill xmlns:a14="http://schemas.microsoft.com/office/drawing/2010/main">
+                <a:solidFill>
+                  <a:srgbClr val="FFFFFF"/>
+                </a:solidFill>
+              </a14:hiddenFill>
+            </a:ext>
+            <a:ext uri="{91240B29-F687-4F45-9708-019B960494DF}">
+              <a14:hiddenLine xmlns:a14="http://schemas.microsoft.com/office/drawing/2010/main" w="9525">
+                <a:solidFill>
+                  <a:srgbClr val="000000"/>
+                </a:solidFill>
+                <a:miter lim="800000"/>
+                <a:headEnd/>
+                <a:tailEnd/>
+              </a14:hiddenLine>
+            </a:ext>
+          </a:extLst>
+        </p:spPr>
+      </p:pic>
+    </p:spTree>
+    <p:extLst>
+      <p:ext uri="{BB962C8B-B14F-4D97-AF65-F5344CB8AC3E}">
+        <p14:creationId xmlns:p14="http://schemas.microsoft.com/office/powerpoint/2010/main" val="2267202334"/>
+      </p:ext>
+    </p:extLst>
+  </p:cSld>
+  <p:clrMapOvr>
+    <a:masterClrMapping/>
+  </p:clrMapOvr>
+  <p:timing>
+    <p:tnLst>
+      <p:par>
+        <p:cTn id="1" dur="indefinite" restart="never" nodeType="tmRoot"/>
+      </p:par>
+    </p:tnLst>
+  </p:timing>
+</p:sld>
+</file>
+
+<file path=ppt/slides/slide13.xml><?xml version="1.0" encoding="utf-8"?>
+<p:sld xmlns:a="http://schemas.openxmlformats.org/drawingml/2006/main" xmlns:r="http://schemas.openxmlformats.org/officeDocument/2006/relationships" xmlns:p="http://schemas.openxmlformats.org/presentationml/2006/main">
+  <p:cSld>
+    <p:spTree>
+      <p:nvGrpSpPr>
+        <p:cNvPr id="1" name=""/>
+        <p:cNvGrpSpPr/>
+        <p:nvPr/>
+      </p:nvGrpSpPr>
+      <p:grpSpPr>
+        <a:xfrm>
+          <a:off x="0" y="0"/>
+          <a:ext cx="0" cy="0"/>
+          <a:chOff x="0" y="0"/>
+          <a:chExt cx="0" cy="0"/>
+        </a:xfrm>
+      </p:grpSpPr>
+      <p:sp>
+        <p:nvSpPr>
+          <p:cNvPr id="4098" name="Title 3"/>
+          <p:cNvSpPr>
+            <a:spLocks noGrp="1"/>
+          </p:cNvSpPr>
+          <p:nvPr>
+            <p:ph type="title"/>
+          </p:nvPr>
+        </p:nvSpPr>
+        <p:spPr>
+          <a:xfrm>
+            <a:off x="917575" y="457200"/>
+            <a:ext cx="7159625" cy="627063"/>
+          </a:xfrm>
+        </p:spPr>
+        <p:txBody>
+          <a:bodyPr/>
+          <a:lstStyle/>
+          <a:p>
+            <a:pPr>
+              <a:defRPr/>
+            </a:pPr>
+            <a:r>
+              <a:rPr lang="nl-NL" altLang="nl-NL" dirty="0" smtClean="0">
+                <a:latin typeface="+mn-lt"/>
+                <a:ea typeface="ＭＳ Ｐゴシック" pitchFamily="34" charset="-128"/>
+              </a:rPr>
+              <a:t>Alarm</a:t>
+            </a:r>
+            <a:endParaRPr lang="nl-NL" altLang="nl-NL" dirty="0" smtClean="0">
+              <a:latin typeface="+mn-lt"/>
+              <a:ea typeface="ＭＳ Ｐゴシック" pitchFamily="34" charset="-128"/>
+            </a:endParaRPr>
+          </a:p>
+        </p:txBody>
+      </p:sp>
+      <p:sp>
+        <p:nvSpPr>
+          <p:cNvPr id="6" name="Ondertitel 2"/>
+          <p:cNvSpPr txBox="1">
+            <a:spLocks/>
+          </p:cNvSpPr>
+          <p:nvPr/>
+        </p:nvSpPr>
+        <p:spPr bwMode="auto">
+          <a:xfrm>
+            <a:off x="914400" y="1041400"/>
+            <a:ext cx="6781800" cy="474663"/>
+          </a:xfrm>
+          <a:prstGeom prst="rect">
+            <a:avLst/>
+          </a:prstGeom>
+          <a:noFill/>
+          <a:ln w="9525">
+            <a:noFill/>
+            <a:miter lim="800000"/>
+            <a:headEnd/>
+            <a:tailEnd/>
+          </a:ln>
+        </p:spPr>
+        <p:txBody>
+          <a:bodyPr lIns="0" tIns="0" rIns="0" bIns="0"/>
+          <a:lstStyle>
+            <a:lvl1pPr eaLnBrk="0" hangingPunct="0">
+              <a:defRPr sz="2400">
+                <a:solidFill>
+                  <a:schemeClr val="tx1"/>
+                </a:solidFill>
+                <a:latin typeface="Tahoma" charset="0"/>
+                <a:cs typeface="Arial" charset="0"/>
+              </a:defRPr>
+            </a:lvl1pPr>
+            <a:lvl2pPr marL="37931725" indent="-37474525" eaLnBrk="0" hangingPunct="0">
+              <a:defRPr sz="2400">
+                <a:solidFill>
+                  <a:schemeClr val="tx1"/>
+                </a:solidFill>
+                <a:latin typeface="Tahoma" charset="0"/>
+                <a:cs typeface="Arial" charset="0"/>
+              </a:defRPr>
+            </a:lvl2pPr>
+            <a:lvl3pPr eaLnBrk="0" hangingPunct="0">
+              <a:defRPr sz="2400">
+                <a:solidFill>
+                  <a:schemeClr val="tx1"/>
+                </a:solidFill>
+                <a:latin typeface="Tahoma" charset="0"/>
+                <a:cs typeface="Arial" charset="0"/>
+              </a:defRPr>
+            </a:lvl3pPr>
+            <a:lvl4pPr eaLnBrk="0" hangingPunct="0">
+              <a:defRPr sz="2400">
+                <a:solidFill>
+                  <a:schemeClr val="tx1"/>
+                </a:solidFill>
+                <a:latin typeface="Tahoma" charset="0"/>
+                <a:cs typeface="Arial" charset="0"/>
+              </a:defRPr>
+            </a:lvl4pPr>
+            <a:lvl5pPr eaLnBrk="0" hangingPunct="0">
+              <a:defRPr sz="2400">
+                <a:solidFill>
+                  <a:schemeClr val="tx1"/>
+                </a:solidFill>
+                <a:latin typeface="Tahoma" charset="0"/>
+                <a:cs typeface="Arial" charset="0"/>
+              </a:defRPr>
+            </a:lvl5pPr>
+            <a:lvl6pPr marL="457200" eaLnBrk="0" fontAlgn="base" hangingPunct="0">
+              <a:spcBef>
+                <a:spcPct val="0"/>
+              </a:spcBef>
+              <a:spcAft>
+                <a:spcPct val="0"/>
+              </a:spcAft>
+              <a:defRPr sz="2400">
+                <a:solidFill>
+                  <a:schemeClr val="tx1"/>
+                </a:solidFill>
+                <a:latin typeface="Tahoma" charset="0"/>
+                <a:cs typeface="Arial" charset="0"/>
+              </a:defRPr>
+            </a:lvl6pPr>
+            <a:lvl7pPr marL="914400" eaLnBrk="0" fontAlgn="base" hangingPunct="0">
+              <a:spcBef>
+                <a:spcPct val="0"/>
+              </a:spcBef>
+              <a:spcAft>
+                <a:spcPct val="0"/>
+              </a:spcAft>
+              <a:defRPr sz="2400">
+                <a:solidFill>
+                  <a:schemeClr val="tx1"/>
+                </a:solidFill>
+                <a:latin typeface="Tahoma" charset="0"/>
+                <a:cs typeface="Arial" charset="0"/>
+              </a:defRPr>
+            </a:lvl7pPr>
+            <a:lvl8pPr marL="1371600" eaLnBrk="0" fontAlgn="base" hangingPunct="0">
+              <a:spcBef>
+                <a:spcPct val="0"/>
+              </a:spcBef>
+              <a:spcAft>
+                <a:spcPct val="0"/>
+              </a:spcAft>
+              <a:defRPr sz="2400">
+                <a:solidFill>
+                  <a:schemeClr val="tx1"/>
+                </a:solidFill>
+                <a:latin typeface="Tahoma" charset="0"/>
+                <a:cs typeface="Arial" charset="0"/>
+              </a:defRPr>
+            </a:lvl8pPr>
+            <a:lvl9pPr marL="1828800" eaLnBrk="0" fontAlgn="base" hangingPunct="0">
+              <a:spcBef>
+                <a:spcPct val="0"/>
+              </a:spcBef>
+              <a:spcAft>
+                <a:spcPct val="0"/>
+              </a:spcAft>
+              <a:defRPr sz="2400">
+                <a:solidFill>
+                  <a:schemeClr val="tx1"/>
+                </a:solidFill>
+                <a:latin typeface="Tahoma" charset="0"/>
+                <a:cs typeface="Arial" charset="0"/>
+              </a:defRPr>
+            </a:lvl9pPr>
+          </a:lstStyle>
+          <a:p>
+            <a:pPr algn="l">
+              <a:lnSpc>
+                <a:spcPts val="2500"/>
+              </a:lnSpc>
+              <a:buClr>
+                <a:srgbClr val="00A6D6"/>
+              </a:buClr>
+              <a:defRPr/>
+            </a:pPr>
+            <a:r>
+              <a:rPr lang="nl-NL" altLang="nl-NL" sz="2000" dirty="0" smtClean="0">
+                <a:solidFill>
+                  <a:srgbClr val="00A6D6"/>
+                </a:solidFill>
+                <a:latin typeface="+mn-lt"/>
+                <a:ea typeface="ＭＳ Ｐゴシック" charset="-128"/>
+              </a:rPr>
+              <a:t>FSM ‘</a:t>
+            </a:r>
+            <a:r>
+              <a:rPr lang="nl-NL" altLang="nl-NL" sz="2000" dirty="0" err="1" smtClean="0">
+                <a:solidFill>
+                  <a:srgbClr val="00A6D6"/>
+                </a:solidFill>
+                <a:latin typeface="+mn-lt"/>
+                <a:ea typeface="ＭＳ Ｐゴシック" charset="-128"/>
+              </a:rPr>
+              <a:t>Compare</a:t>
+            </a:r>
+            <a:r>
+              <a:rPr lang="nl-NL" altLang="nl-NL" sz="2000" dirty="0" smtClean="0">
+                <a:solidFill>
+                  <a:srgbClr val="00A6D6"/>
+                </a:solidFill>
+                <a:latin typeface="+mn-lt"/>
+                <a:ea typeface="ＭＳ Ｐゴシック" charset="-128"/>
+              </a:rPr>
+              <a:t>’</a:t>
+            </a:r>
+            <a:endParaRPr lang="nl-NL" altLang="nl-NL" sz="2000" dirty="0" smtClean="0">
+              <a:solidFill>
+                <a:srgbClr val="00A6D6"/>
+              </a:solidFill>
+              <a:latin typeface="+mn-lt"/>
+              <a:ea typeface="ＭＳ Ｐゴシック" charset="-128"/>
+            </a:endParaRPr>
+          </a:p>
+        </p:txBody>
+      </p:sp>
+      <p:pic>
+        <p:nvPicPr>
+          <p:cNvPr id="5" name="Tijdelijke aanduiding voor inhoud 1"/>
           <p:cNvPicPr>
             <a:picLocks noGrp="1" noChangeAspect="1"/>
           </p:cNvPicPr>
@@ -5347,15 +6214,1777 @@
         </p:blipFill>
         <p:spPr>
           <a:xfrm>
-            <a:off x="1378424" y="916596"/>
-            <a:ext cx="6815905" cy="5210562"/>
+            <a:off x="532263" y="1316251"/>
+            <a:ext cx="7789246" cy="4646400"/>
           </a:xfrm>
         </p:spPr>
       </p:pic>
     </p:spTree>
     <p:extLst>
       <p:ext uri="{BB962C8B-B14F-4D97-AF65-F5344CB8AC3E}">
-        <p14:creationId xmlns:p14="http://schemas.microsoft.com/office/powerpoint/2010/main" val="2574639051"/>
+        <p14:creationId xmlns:p14="http://schemas.microsoft.com/office/powerpoint/2010/main" val="1260428583"/>
+      </p:ext>
+    </p:extLst>
+  </p:cSld>
+  <p:clrMapOvr>
+    <a:masterClrMapping/>
+  </p:clrMapOvr>
+  <p:timing>
+    <p:tnLst>
+      <p:par>
+        <p:cTn id="1" dur="indefinite" restart="never" nodeType="tmRoot"/>
+      </p:par>
+    </p:tnLst>
+  </p:timing>
+</p:sld>
+</file>
+
+<file path=ppt/slides/slide14.xml><?xml version="1.0" encoding="utf-8"?>
+<p:sld xmlns:a="http://schemas.openxmlformats.org/drawingml/2006/main" xmlns:r="http://schemas.openxmlformats.org/officeDocument/2006/relationships" xmlns:p="http://schemas.openxmlformats.org/presentationml/2006/main">
+  <p:cSld>
+    <p:spTree>
+      <p:nvGrpSpPr>
+        <p:cNvPr id="1" name=""/>
+        <p:cNvGrpSpPr/>
+        <p:nvPr/>
+      </p:nvGrpSpPr>
+      <p:grpSpPr>
+        <a:xfrm>
+          <a:off x="0" y="0"/>
+          <a:ext cx="0" cy="0"/>
+          <a:chOff x="0" y="0"/>
+          <a:chExt cx="0" cy="0"/>
+        </a:xfrm>
+      </p:grpSpPr>
+      <p:sp>
+        <p:nvSpPr>
+          <p:cNvPr id="4098" name="Title 3"/>
+          <p:cNvSpPr>
+            <a:spLocks noGrp="1"/>
+          </p:cNvSpPr>
+          <p:nvPr>
+            <p:ph type="title"/>
+          </p:nvPr>
+        </p:nvSpPr>
+        <p:spPr>
+          <a:xfrm>
+            <a:off x="917575" y="457200"/>
+            <a:ext cx="7159625" cy="627063"/>
+          </a:xfrm>
+        </p:spPr>
+        <p:txBody>
+          <a:bodyPr/>
+          <a:lstStyle/>
+          <a:p>
+            <a:pPr>
+              <a:defRPr/>
+            </a:pPr>
+            <a:r>
+              <a:rPr lang="nl-NL" altLang="nl-NL" dirty="0" smtClean="0">
+                <a:latin typeface="+mn-lt"/>
+                <a:ea typeface="ＭＳ Ｐゴシック" pitchFamily="34" charset="-128"/>
+              </a:rPr>
+              <a:t>Alarm</a:t>
+            </a:r>
+            <a:endParaRPr lang="nl-NL" altLang="nl-NL" dirty="0" smtClean="0">
+              <a:latin typeface="+mn-lt"/>
+              <a:ea typeface="ＭＳ Ｐゴシック" pitchFamily="34" charset="-128"/>
+            </a:endParaRPr>
+          </a:p>
+        </p:txBody>
+      </p:sp>
+      <p:sp>
+        <p:nvSpPr>
+          <p:cNvPr id="6" name="Ondertitel 2"/>
+          <p:cNvSpPr txBox="1">
+            <a:spLocks/>
+          </p:cNvSpPr>
+          <p:nvPr/>
+        </p:nvSpPr>
+        <p:spPr bwMode="auto">
+          <a:xfrm>
+            <a:off x="914400" y="1041400"/>
+            <a:ext cx="6781800" cy="474663"/>
+          </a:xfrm>
+          <a:prstGeom prst="rect">
+            <a:avLst/>
+          </a:prstGeom>
+          <a:noFill/>
+          <a:ln w="9525">
+            <a:noFill/>
+            <a:miter lim="800000"/>
+            <a:headEnd/>
+            <a:tailEnd/>
+          </a:ln>
+        </p:spPr>
+        <p:txBody>
+          <a:bodyPr lIns="0" tIns="0" rIns="0" bIns="0"/>
+          <a:lstStyle>
+            <a:lvl1pPr eaLnBrk="0" hangingPunct="0">
+              <a:defRPr sz="2400">
+                <a:solidFill>
+                  <a:schemeClr val="tx1"/>
+                </a:solidFill>
+                <a:latin typeface="Tahoma" charset="0"/>
+                <a:cs typeface="Arial" charset="0"/>
+              </a:defRPr>
+            </a:lvl1pPr>
+            <a:lvl2pPr marL="37931725" indent="-37474525" eaLnBrk="0" hangingPunct="0">
+              <a:defRPr sz="2400">
+                <a:solidFill>
+                  <a:schemeClr val="tx1"/>
+                </a:solidFill>
+                <a:latin typeface="Tahoma" charset="0"/>
+                <a:cs typeface="Arial" charset="0"/>
+              </a:defRPr>
+            </a:lvl2pPr>
+            <a:lvl3pPr eaLnBrk="0" hangingPunct="0">
+              <a:defRPr sz="2400">
+                <a:solidFill>
+                  <a:schemeClr val="tx1"/>
+                </a:solidFill>
+                <a:latin typeface="Tahoma" charset="0"/>
+                <a:cs typeface="Arial" charset="0"/>
+              </a:defRPr>
+            </a:lvl3pPr>
+            <a:lvl4pPr eaLnBrk="0" hangingPunct="0">
+              <a:defRPr sz="2400">
+                <a:solidFill>
+                  <a:schemeClr val="tx1"/>
+                </a:solidFill>
+                <a:latin typeface="Tahoma" charset="0"/>
+                <a:cs typeface="Arial" charset="0"/>
+              </a:defRPr>
+            </a:lvl4pPr>
+            <a:lvl5pPr eaLnBrk="0" hangingPunct="0">
+              <a:defRPr sz="2400">
+                <a:solidFill>
+                  <a:schemeClr val="tx1"/>
+                </a:solidFill>
+                <a:latin typeface="Tahoma" charset="0"/>
+                <a:cs typeface="Arial" charset="0"/>
+              </a:defRPr>
+            </a:lvl5pPr>
+            <a:lvl6pPr marL="457200" eaLnBrk="0" fontAlgn="base" hangingPunct="0">
+              <a:spcBef>
+                <a:spcPct val="0"/>
+              </a:spcBef>
+              <a:spcAft>
+                <a:spcPct val="0"/>
+              </a:spcAft>
+              <a:defRPr sz="2400">
+                <a:solidFill>
+                  <a:schemeClr val="tx1"/>
+                </a:solidFill>
+                <a:latin typeface="Tahoma" charset="0"/>
+                <a:cs typeface="Arial" charset="0"/>
+              </a:defRPr>
+            </a:lvl6pPr>
+            <a:lvl7pPr marL="914400" eaLnBrk="0" fontAlgn="base" hangingPunct="0">
+              <a:spcBef>
+                <a:spcPct val="0"/>
+              </a:spcBef>
+              <a:spcAft>
+                <a:spcPct val="0"/>
+              </a:spcAft>
+              <a:defRPr sz="2400">
+                <a:solidFill>
+                  <a:schemeClr val="tx1"/>
+                </a:solidFill>
+                <a:latin typeface="Tahoma" charset="0"/>
+                <a:cs typeface="Arial" charset="0"/>
+              </a:defRPr>
+            </a:lvl7pPr>
+            <a:lvl8pPr marL="1371600" eaLnBrk="0" fontAlgn="base" hangingPunct="0">
+              <a:spcBef>
+                <a:spcPct val="0"/>
+              </a:spcBef>
+              <a:spcAft>
+                <a:spcPct val="0"/>
+              </a:spcAft>
+              <a:defRPr sz="2400">
+                <a:solidFill>
+                  <a:schemeClr val="tx1"/>
+                </a:solidFill>
+                <a:latin typeface="Tahoma" charset="0"/>
+                <a:cs typeface="Arial" charset="0"/>
+              </a:defRPr>
+            </a:lvl8pPr>
+            <a:lvl9pPr marL="1828800" eaLnBrk="0" fontAlgn="base" hangingPunct="0">
+              <a:spcBef>
+                <a:spcPct val="0"/>
+              </a:spcBef>
+              <a:spcAft>
+                <a:spcPct val="0"/>
+              </a:spcAft>
+              <a:defRPr sz="2400">
+                <a:solidFill>
+                  <a:schemeClr val="tx1"/>
+                </a:solidFill>
+                <a:latin typeface="Tahoma" charset="0"/>
+                <a:cs typeface="Arial" charset="0"/>
+              </a:defRPr>
+            </a:lvl9pPr>
+          </a:lstStyle>
+          <a:p>
+            <a:pPr algn="l">
+              <a:lnSpc>
+                <a:spcPts val="2500"/>
+              </a:lnSpc>
+              <a:buClr>
+                <a:srgbClr val="00A6D6"/>
+              </a:buClr>
+              <a:defRPr/>
+            </a:pPr>
+            <a:r>
+              <a:rPr lang="nl-NL" altLang="nl-NL" sz="2000" dirty="0" smtClean="0">
+                <a:solidFill>
+                  <a:srgbClr val="00A6D6"/>
+                </a:solidFill>
+                <a:latin typeface="+mn-lt"/>
+                <a:ea typeface="ＭＳ Ｐゴシック" charset="-128"/>
+              </a:rPr>
+              <a:t>FSM ‘PWM’</a:t>
+            </a:r>
+            <a:endParaRPr lang="nl-NL" altLang="nl-NL" sz="2000" dirty="0" smtClean="0">
+              <a:solidFill>
+                <a:srgbClr val="00A6D6"/>
+              </a:solidFill>
+              <a:latin typeface="+mn-lt"/>
+              <a:ea typeface="ＭＳ Ｐゴシック" charset="-128"/>
+            </a:endParaRPr>
+          </a:p>
+        </p:txBody>
+      </p:sp>
+      <p:sp>
+        <p:nvSpPr>
+          <p:cNvPr id="2" name="Tijdelijke aanduiding voor inhoud 1"/>
+          <p:cNvSpPr>
+            <a:spLocks noGrp="1"/>
+          </p:cNvSpPr>
+          <p:nvPr>
+            <p:ph idx="1"/>
+          </p:nvPr>
+        </p:nvSpPr>
+        <p:spPr/>
+        <p:txBody>
+          <a:bodyPr/>
+          <a:lstStyle/>
+          <a:p>
+            <a:endParaRPr lang="nl-NL"/>
+          </a:p>
+        </p:txBody>
+      </p:sp>
+      <p:pic>
+        <p:nvPicPr>
+          <p:cNvPr id="7" name="Tijdelijke aanduiding voor inhoud 3"/>
+          <p:cNvPicPr>
+            <a:picLocks noChangeAspect="1"/>
+          </p:cNvPicPr>
+          <p:nvPr/>
+        </p:nvPicPr>
+        <p:blipFill>
+          <a:blip r:embed="rId2">
+            <a:extLst>
+              <a:ext uri="{28A0092B-C50C-407E-A947-70E740481C1C}">
+                <a14:useLocalDpi xmlns:a14="http://schemas.microsoft.com/office/drawing/2010/main" val="0"/>
+              </a:ext>
+            </a:extLst>
+          </a:blip>
+          <a:stretch>
+            <a:fillRect/>
+          </a:stretch>
+        </p:blipFill>
+        <p:spPr bwMode="auto">
+          <a:xfrm>
+            <a:off x="917575" y="1310185"/>
+            <a:ext cx="7154574" cy="4403832"/>
+          </a:xfrm>
+          <a:prstGeom prst="rect">
+            <a:avLst/>
+          </a:prstGeom>
+          <a:noFill/>
+          <a:ln>
+            <a:noFill/>
+          </a:ln>
+          <a:extLst>
+            <a:ext uri="{909E8E84-426E-40DD-AFC4-6F175D3DCCD1}">
+              <a14:hiddenFill xmlns:a14="http://schemas.microsoft.com/office/drawing/2010/main">
+                <a:solidFill>
+                  <a:srgbClr val="FFFFFF"/>
+                </a:solidFill>
+              </a14:hiddenFill>
+            </a:ext>
+            <a:ext uri="{91240B29-F687-4F45-9708-019B960494DF}">
+              <a14:hiddenLine xmlns:a14="http://schemas.microsoft.com/office/drawing/2010/main" w="9525">
+                <a:solidFill>
+                  <a:srgbClr val="000000"/>
+                </a:solidFill>
+                <a:miter lim="800000"/>
+                <a:headEnd/>
+                <a:tailEnd/>
+              </a14:hiddenLine>
+            </a:ext>
+          </a:extLst>
+        </p:spPr>
+      </p:pic>
+    </p:spTree>
+    <p:extLst>
+      <p:ext uri="{BB962C8B-B14F-4D97-AF65-F5344CB8AC3E}">
+        <p14:creationId xmlns:p14="http://schemas.microsoft.com/office/powerpoint/2010/main" val="2792786641"/>
+      </p:ext>
+    </p:extLst>
+  </p:cSld>
+  <p:clrMapOvr>
+    <a:masterClrMapping/>
+  </p:clrMapOvr>
+  <p:timing>
+    <p:tnLst>
+      <p:par>
+        <p:cTn id="1" dur="indefinite" restart="never" nodeType="tmRoot"/>
+      </p:par>
+    </p:tnLst>
+  </p:timing>
+</p:sld>
+</file>
+
+<file path=ppt/slides/slide15.xml><?xml version="1.0" encoding="utf-8"?>
+<p:sld xmlns:a="http://schemas.openxmlformats.org/drawingml/2006/main" xmlns:r="http://schemas.openxmlformats.org/officeDocument/2006/relationships" xmlns:p="http://schemas.openxmlformats.org/presentationml/2006/main">
+  <p:cSld>
+    <p:spTree>
+      <p:nvGrpSpPr>
+        <p:cNvPr id="1" name=""/>
+        <p:cNvGrpSpPr/>
+        <p:nvPr/>
+      </p:nvGrpSpPr>
+      <p:grpSpPr>
+        <a:xfrm>
+          <a:off x="0" y="0"/>
+          <a:ext cx="0" cy="0"/>
+          <a:chOff x="0" y="0"/>
+          <a:chExt cx="0" cy="0"/>
+        </a:xfrm>
+      </p:grpSpPr>
+      <p:pic>
+        <p:nvPicPr>
+          <p:cNvPr id="8" name="Tijdelijke aanduiding voor inhoud 3"/>
+          <p:cNvPicPr>
+            <a:picLocks noChangeAspect="1"/>
+          </p:cNvPicPr>
+          <p:nvPr/>
+        </p:nvPicPr>
+        <p:blipFill>
+          <a:blip r:embed="rId2">
+            <a:extLst>
+              <a:ext uri="{28A0092B-C50C-407E-A947-70E740481C1C}">
+                <a14:useLocalDpi xmlns:a14="http://schemas.microsoft.com/office/drawing/2010/main" val="0"/>
+              </a:ext>
+            </a:extLst>
+          </a:blip>
+          <a:stretch>
+            <a:fillRect/>
+          </a:stretch>
+        </p:blipFill>
+        <p:spPr bwMode="auto">
+          <a:xfrm>
+            <a:off x="1378424" y="916596"/>
+            <a:ext cx="6815905" cy="5210562"/>
+          </a:xfrm>
+          <a:prstGeom prst="rect">
+            <a:avLst/>
+          </a:prstGeom>
+          <a:noFill/>
+          <a:ln>
+            <a:noFill/>
+          </a:ln>
+          <a:extLst>
+            <a:ext uri="{909E8E84-426E-40DD-AFC4-6F175D3DCCD1}">
+              <a14:hiddenFill xmlns:a14="http://schemas.microsoft.com/office/drawing/2010/main">
+                <a:solidFill>
+                  <a:srgbClr val="FFFFFF"/>
+                </a:solidFill>
+              </a14:hiddenFill>
+            </a:ext>
+            <a:ext uri="{91240B29-F687-4F45-9708-019B960494DF}">
+              <a14:hiddenLine xmlns:a14="http://schemas.microsoft.com/office/drawing/2010/main" w="9525">
+                <a:solidFill>
+                  <a:srgbClr val="000000"/>
+                </a:solidFill>
+                <a:miter lim="800000"/>
+                <a:headEnd/>
+                <a:tailEnd/>
+              </a14:hiddenLine>
+            </a:ext>
+          </a:extLst>
+        </p:spPr>
+      </p:pic>
+      <p:sp>
+        <p:nvSpPr>
+          <p:cNvPr id="4098" name="Title 3"/>
+          <p:cNvSpPr>
+            <a:spLocks noGrp="1"/>
+          </p:cNvSpPr>
+          <p:nvPr>
+            <p:ph type="title"/>
+          </p:nvPr>
+        </p:nvSpPr>
+        <p:spPr>
+          <a:xfrm>
+            <a:off x="917575" y="457200"/>
+            <a:ext cx="7159625" cy="627063"/>
+          </a:xfrm>
+        </p:spPr>
+        <p:txBody>
+          <a:bodyPr/>
+          <a:lstStyle/>
+          <a:p>
+            <a:pPr>
+              <a:defRPr/>
+            </a:pPr>
+            <a:r>
+              <a:rPr lang="nl-NL" altLang="nl-NL" dirty="0" smtClean="0">
+                <a:latin typeface="+mn-lt"/>
+                <a:ea typeface="ＭＳ Ｐゴシック" pitchFamily="34" charset="-128"/>
+              </a:rPr>
+              <a:t>Alarm</a:t>
+            </a:r>
+            <a:endParaRPr lang="nl-NL" altLang="nl-NL" dirty="0" smtClean="0">
+              <a:latin typeface="+mn-lt"/>
+              <a:ea typeface="ＭＳ Ｐゴシック" pitchFamily="34" charset="-128"/>
+            </a:endParaRPr>
+          </a:p>
+        </p:txBody>
+      </p:sp>
+      <p:sp>
+        <p:nvSpPr>
+          <p:cNvPr id="6" name="Ondertitel 2"/>
+          <p:cNvSpPr txBox="1">
+            <a:spLocks/>
+          </p:cNvSpPr>
+          <p:nvPr/>
+        </p:nvSpPr>
+        <p:spPr bwMode="auto">
+          <a:xfrm>
+            <a:off x="914400" y="1041400"/>
+            <a:ext cx="6781800" cy="474663"/>
+          </a:xfrm>
+          <a:prstGeom prst="rect">
+            <a:avLst/>
+          </a:prstGeom>
+          <a:noFill/>
+          <a:ln w="9525">
+            <a:noFill/>
+            <a:miter lim="800000"/>
+            <a:headEnd/>
+            <a:tailEnd/>
+          </a:ln>
+        </p:spPr>
+        <p:txBody>
+          <a:bodyPr lIns="0" tIns="0" rIns="0" bIns="0"/>
+          <a:lstStyle>
+            <a:lvl1pPr eaLnBrk="0" hangingPunct="0">
+              <a:defRPr sz="2400">
+                <a:solidFill>
+                  <a:schemeClr val="tx1"/>
+                </a:solidFill>
+                <a:latin typeface="Tahoma" charset="0"/>
+                <a:cs typeface="Arial" charset="0"/>
+              </a:defRPr>
+            </a:lvl1pPr>
+            <a:lvl2pPr marL="37931725" indent="-37474525" eaLnBrk="0" hangingPunct="0">
+              <a:defRPr sz="2400">
+                <a:solidFill>
+                  <a:schemeClr val="tx1"/>
+                </a:solidFill>
+                <a:latin typeface="Tahoma" charset="0"/>
+                <a:cs typeface="Arial" charset="0"/>
+              </a:defRPr>
+            </a:lvl2pPr>
+            <a:lvl3pPr eaLnBrk="0" hangingPunct="0">
+              <a:defRPr sz="2400">
+                <a:solidFill>
+                  <a:schemeClr val="tx1"/>
+                </a:solidFill>
+                <a:latin typeface="Tahoma" charset="0"/>
+                <a:cs typeface="Arial" charset="0"/>
+              </a:defRPr>
+            </a:lvl3pPr>
+            <a:lvl4pPr eaLnBrk="0" hangingPunct="0">
+              <a:defRPr sz="2400">
+                <a:solidFill>
+                  <a:schemeClr val="tx1"/>
+                </a:solidFill>
+                <a:latin typeface="Tahoma" charset="0"/>
+                <a:cs typeface="Arial" charset="0"/>
+              </a:defRPr>
+            </a:lvl4pPr>
+            <a:lvl5pPr eaLnBrk="0" hangingPunct="0">
+              <a:defRPr sz="2400">
+                <a:solidFill>
+                  <a:schemeClr val="tx1"/>
+                </a:solidFill>
+                <a:latin typeface="Tahoma" charset="0"/>
+                <a:cs typeface="Arial" charset="0"/>
+              </a:defRPr>
+            </a:lvl5pPr>
+            <a:lvl6pPr marL="457200" eaLnBrk="0" fontAlgn="base" hangingPunct="0">
+              <a:spcBef>
+                <a:spcPct val="0"/>
+              </a:spcBef>
+              <a:spcAft>
+                <a:spcPct val="0"/>
+              </a:spcAft>
+              <a:defRPr sz="2400">
+                <a:solidFill>
+                  <a:schemeClr val="tx1"/>
+                </a:solidFill>
+                <a:latin typeface="Tahoma" charset="0"/>
+                <a:cs typeface="Arial" charset="0"/>
+              </a:defRPr>
+            </a:lvl6pPr>
+            <a:lvl7pPr marL="914400" eaLnBrk="0" fontAlgn="base" hangingPunct="0">
+              <a:spcBef>
+                <a:spcPct val="0"/>
+              </a:spcBef>
+              <a:spcAft>
+                <a:spcPct val="0"/>
+              </a:spcAft>
+              <a:defRPr sz="2400">
+                <a:solidFill>
+                  <a:schemeClr val="tx1"/>
+                </a:solidFill>
+                <a:latin typeface="Tahoma" charset="0"/>
+                <a:cs typeface="Arial" charset="0"/>
+              </a:defRPr>
+            </a:lvl7pPr>
+            <a:lvl8pPr marL="1371600" eaLnBrk="0" fontAlgn="base" hangingPunct="0">
+              <a:spcBef>
+                <a:spcPct val="0"/>
+              </a:spcBef>
+              <a:spcAft>
+                <a:spcPct val="0"/>
+              </a:spcAft>
+              <a:defRPr sz="2400">
+                <a:solidFill>
+                  <a:schemeClr val="tx1"/>
+                </a:solidFill>
+                <a:latin typeface="Tahoma" charset="0"/>
+                <a:cs typeface="Arial" charset="0"/>
+              </a:defRPr>
+            </a:lvl8pPr>
+            <a:lvl9pPr marL="1828800" eaLnBrk="0" fontAlgn="base" hangingPunct="0">
+              <a:spcBef>
+                <a:spcPct val="0"/>
+              </a:spcBef>
+              <a:spcAft>
+                <a:spcPct val="0"/>
+              </a:spcAft>
+              <a:defRPr sz="2400">
+                <a:solidFill>
+                  <a:schemeClr val="tx1"/>
+                </a:solidFill>
+                <a:latin typeface="Tahoma" charset="0"/>
+                <a:cs typeface="Arial" charset="0"/>
+              </a:defRPr>
+            </a:lvl9pPr>
+          </a:lstStyle>
+          <a:p>
+            <a:pPr algn="l">
+              <a:lnSpc>
+                <a:spcPts val="2500"/>
+              </a:lnSpc>
+              <a:buClr>
+                <a:srgbClr val="00A6D6"/>
+              </a:buClr>
+              <a:defRPr/>
+            </a:pPr>
+            <a:r>
+              <a:rPr lang="nl-NL" altLang="nl-NL" sz="2000" dirty="0" smtClean="0">
+                <a:solidFill>
+                  <a:srgbClr val="00A6D6"/>
+                </a:solidFill>
+                <a:latin typeface="+mn-lt"/>
+                <a:ea typeface="ＭＳ Ｐゴシック" charset="-128"/>
+              </a:rPr>
+              <a:t>FSM ‘Counter’</a:t>
+            </a:r>
+            <a:endParaRPr lang="nl-NL" altLang="nl-NL" sz="2000" dirty="0" smtClean="0">
+              <a:solidFill>
+                <a:srgbClr val="00A6D6"/>
+              </a:solidFill>
+              <a:latin typeface="+mn-lt"/>
+              <a:ea typeface="ＭＳ Ｐゴシック" charset="-128"/>
+            </a:endParaRPr>
+          </a:p>
+        </p:txBody>
+      </p:sp>
+    </p:spTree>
+    <p:extLst>
+      <p:ext uri="{BB962C8B-B14F-4D97-AF65-F5344CB8AC3E}">
+        <p14:creationId xmlns:p14="http://schemas.microsoft.com/office/powerpoint/2010/main" val="2660275856"/>
+      </p:ext>
+    </p:extLst>
+  </p:cSld>
+  <p:clrMapOvr>
+    <a:masterClrMapping/>
+  </p:clrMapOvr>
+  <p:timing>
+    <p:tnLst>
+      <p:par>
+        <p:cTn id="1" dur="indefinite" restart="never" nodeType="tmRoot"/>
+      </p:par>
+    </p:tnLst>
+  </p:timing>
+</p:sld>
+</file>
+
+<file path=ppt/slides/slide16.xml><?xml version="1.0" encoding="utf-8"?>
+<p:sld xmlns:a="http://schemas.openxmlformats.org/drawingml/2006/main" xmlns:r="http://schemas.openxmlformats.org/officeDocument/2006/relationships" xmlns:p="http://schemas.openxmlformats.org/presentationml/2006/main">
+  <p:cSld>
+    <p:spTree>
+      <p:nvGrpSpPr>
+        <p:cNvPr id="1" name=""/>
+        <p:cNvGrpSpPr/>
+        <p:nvPr/>
+      </p:nvGrpSpPr>
+      <p:grpSpPr>
+        <a:xfrm>
+          <a:off x="0" y="0"/>
+          <a:ext cx="0" cy="0"/>
+          <a:chOff x="0" y="0"/>
+          <a:chExt cx="0" cy="0"/>
+        </a:xfrm>
+      </p:grpSpPr>
+      <p:sp>
+        <p:nvSpPr>
+          <p:cNvPr id="2" name="Titel 1"/>
+          <p:cNvSpPr>
+            <a:spLocks noGrp="1"/>
+          </p:cNvSpPr>
+          <p:nvPr>
+            <p:ph type="title"/>
+          </p:nvPr>
+        </p:nvSpPr>
+        <p:spPr/>
+        <p:txBody>
+          <a:bodyPr/>
+          <a:lstStyle/>
+          <a:p>
+            <a:r>
+              <a:rPr lang="nl-NL" dirty="0" smtClean="0"/>
+              <a:t>LCD module</a:t>
+            </a:r>
+            <a:endParaRPr lang="nl-NL" dirty="0"/>
+          </a:p>
+        </p:txBody>
+      </p:sp>
+    </p:spTree>
+    <p:extLst>
+      <p:ext uri="{BB962C8B-B14F-4D97-AF65-F5344CB8AC3E}">
+        <p14:creationId xmlns:p14="http://schemas.microsoft.com/office/powerpoint/2010/main" val="3719282447"/>
+      </p:ext>
+    </p:extLst>
+  </p:cSld>
+  <p:clrMapOvr>
+    <a:masterClrMapping/>
+  </p:clrMapOvr>
+  <p:timing>
+    <p:tnLst>
+      <p:par>
+        <p:cTn id="1" dur="indefinite" restart="never" nodeType="tmRoot"/>
+      </p:par>
+    </p:tnLst>
+  </p:timing>
+</p:sld>
+</file>
+
+<file path=ppt/slides/slide17.xml><?xml version="1.0" encoding="utf-8"?>
+<p:sld xmlns:a="http://schemas.openxmlformats.org/drawingml/2006/main" xmlns:r="http://schemas.openxmlformats.org/officeDocument/2006/relationships" xmlns:p="http://schemas.openxmlformats.org/presentationml/2006/main">
+  <p:cSld>
+    <p:spTree>
+      <p:nvGrpSpPr>
+        <p:cNvPr id="1" name=""/>
+        <p:cNvGrpSpPr/>
+        <p:nvPr/>
+      </p:nvGrpSpPr>
+      <p:grpSpPr>
+        <a:xfrm>
+          <a:off x="0" y="0"/>
+          <a:ext cx="0" cy="0"/>
+          <a:chOff x="0" y="0"/>
+          <a:chExt cx="0" cy="0"/>
+        </a:xfrm>
+      </p:grpSpPr>
+      <p:sp>
+        <p:nvSpPr>
+          <p:cNvPr id="4098" name="Title 3"/>
+          <p:cNvSpPr>
+            <a:spLocks noGrp="1"/>
+          </p:cNvSpPr>
+          <p:nvPr>
+            <p:ph type="title"/>
+          </p:nvPr>
+        </p:nvSpPr>
+        <p:spPr>
+          <a:xfrm>
+            <a:off x="915193" y="502892"/>
+            <a:ext cx="7159625" cy="627063"/>
+          </a:xfrm>
+        </p:spPr>
+        <p:txBody>
+          <a:bodyPr/>
+          <a:lstStyle/>
+          <a:p>
+            <a:pPr>
+              <a:defRPr/>
+            </a:pPr>
+            <a:r>
+              <a:rPr lang="nl-NL" altLang="nl-NL" dirty="0" smtClean="0">
+                <a:latin typeface="+mn-lt"/>
+                <a:ea typeface="ＭＳ Ｐゴシック" pitchFamily="34" charset="-128"/>
+              </a:rPr>
+              <a:t>LCD</a:t>
+            </a:r>
+          </a:p>
+        </p:txBody>
+      </p:sp>
+      <p:sp>
+        <p:nvSpPr>
+          <p:cNvPr id="6" name="Ondertitel 2"/>
+          <p:cNvSpPr txBox="1">
+            <a:spLocks/>
+          </p:cNvSpPr>
+          <p:nvPr/>
+        </p:nvSpPr>
+        <p:spPr bwMode="auto">
+          <a:xfrm>
+            <a:off x="914400" y="1041400"/>
+            <a:ext cx="6781800" cy="474663"/>
+          </a:xfrm>
+          <a:prstGeom prst="rect">
+            <a:avLst/>
+          </a:prstGeom>
+          <a:noFill/>
+          <a:ln w="9525">
+            <a:noFill/>
+            <a:miter lim="800000"/>
+            <a:headEnd/>
+            <a:tailEnd/>
+          </a:ln>
+        </p:spPr>
+        <p:txBody>
+          <a:bodyPr lIns="0" tIns="0" rIns="0" bIns="0"/>
+          <a:lstStyle>
+            <a:lvl1pPr eaLnBrk="0" hangingPunct="0">
+              <a:defRPr sz="2400">
+                <a:solidFill>
+                  <a:schemeClr val="tx1"/>
+                </a:solidFill>
+                <a:latin typeface="Tahoma" charset="0"/>
+                <a:cs typeface="Arial" charset="0"/>
+              </a:defRPr>
+            </a:lvl1pPr>
+            <a:lvl2pPr marL="37931725" indent="-37474525" eaLnBrk="0" hangingPunct="0">
+              <a:defRPr sz="2400">
+                <a:solidFill>
+                  <a:schemeClr val="tx1"/>
+                </a:solidFill>
+                <a:latin typeface="Tahoma" charset="0"/>
+                <a:cs typeface="Arial" charset="0"/>
+              </a:defRPr>
+            </a:lvl2pPr>
+            <a:lvl3pPr eaLnBrk="0" hangingPunct="0">
+              <a:defRPr sz="2400">
+                <a:solidFill>
+                  <a:schemeClr val="tx1"/>
+                </a:solidFill>
+                <a:latin typeface="Tahoma" charset="0"/>
+                <a:cs typeface="Arial" charset="0"/>
+              </a:defRPr>
+            </a:lvl3pPr>
+            <a:lvl4pPr eaLnBrk="0" hangingPunct="0">
+              <a:defRPr sz="2400">
+                <a:solidFill>
+                  <a:schemeClr val="tx1"/>
+                </a:solidFill>
+                <a:latin typeface="Tahoma" charset="0"/>
+                <a:cs typeface="Arial" charset="0"/>
+              </a:defRPr>
+            </a:lvl4pPr>
+            <a:lvl5pPr eaLnBrk="0" hangingPunct="0">
+              <a:defRPr sz="2400">
+                <a:solidFill>
+                  <a:schemeClr val="tx1"/>
+                </a:solidFill>
+                <a:latin typeface="Tahoma" charset="0"/>
+                <a:cs typeface="Arial" charset="0"/>
+              </a:defRPr>
+            </a:lvl5pPr>
+            <a:lvl6pPr marL="457200" eaLnBrk="0" fontAlgn="base" hangingPunct="0">
+              <a:spcBef>
+                <a:spcPct val="0"/>
+              </a:spcBef>
+              <a:spcAft>
+                <a:spcPct val="0"/>
+              </a:spcAft>
+              <a:defRPr sz="2400">
+                <a:solidFill>
+                  <a:schemeClr val="tx1"/>
+                </a:solidFill>
+                <a:latin typeface="Tahoma" charset="0"/>
+                <a:cs typeface="Arial" charset="0"/>
+              </a:defRPr>
+            </a:lvl6pPr>
+            <a:lvl7pPr marL="914400" eaLnBrk="0" fontAlgn="base" hangingPunct="0">
+              <a:spcBef>
+                <a:spcPct val="0"/>
+              </a:spcBef>
+              <a:spcAft>
+                <a:spcPct val="0"/>
+              </a:spcAft>
+              <a:defRPr sz="2400">
+                <a:solidFill>
+                  <a:schemeClr val="tx1"/>
+                </a:solidFill>
+                <a:latin typeface="Tahoma" charset="0"/>
+                <a:cs typeface="Arial" charset="0"/>
+              </a:defRPr>
+            </a:lvl7pPr>
+            <a:lvl8pPr marL="1371600" eaLnBrk="0" fontAlgn="base" hangingPunct="0">
+              <a:spcBef>
+                <a:spcPct val="0"/>
+              </a:spcBef>
+              <a:spcAft>
+                <a:spcPct val="0"/>
+              </a:spcAft>
+              <a:defRPr sz="2400">
+                <a:solidFill>
+                  <a:schemeClr val="tx1"/>
+                </a:solidFill>
+                <a:latin typeface="Tahoma" charset="0"/>
+                <a:cs typeface="Arial" charset="0"/>
+              </a:defRPr>
+            </a:lvl8pPr>
+            <a:lvl9pPr marL="1828800" eaLnBrk="0" fontAlgn="base" hangingPunct="0">
+              <a:spcBef>
+                <a:spcPct val="0"/>
+              </a:spcBef>
+              <a:spcAft>
+                <a:spcPct val="0"/>
+              </a:spcAft>
+              <a:defRPr sz="2400">
+                <a:solidFill>
+                  <a:schemeClr val="tx1"/>
+                </a:solidFill>
+                <a:latin typeface="Tahoma" charset="0"/>
+                <a:cs typeface="Arial" charset="0"/>
+              </a:defRPr>
+            </a:lvl9pPr>
+          </a:lstStyle>
+          <a:p>
+            <a:pPr algn="l">
+              <a:lnSpc>
+                <a:spcPts val="2500"/>
+              </a:lnSpc>
+              <a:buClr>
+                <a:srgbClr val="00A6D6"/>
+              </a:buClr>
+              <a:defRPr/>
+            </a:pPr>
+            <a:r>
+              <a:rPr lang="nl-NL" altLang="nl-NL" sz="2000" dirty="0" smtClean="0">
+                <a:solidFill>
+                  <a:srgbClr val="00A6D6"/>
+                </a:solidFill>
+                <a:latin typeface="Tahoma"/>
+                <a:ea typeface="ＭＳ Ｐゴシック" charset="-128"/>
+              </a:rPr>
+              <a:t>Het totale systeem</a:t>
+            </a:r>
+          </a:p>
+        </p:txBody>
+      </p:sp>
+      <p:sp>
+        <p:nvSpPr>
+          <p:cNvPr id="4" name="Tijdelijke aanduiding voor inhoud 3"/>
+          <p:cNvSpPr>
+            <a:spLocks noGrp="1"/>
+          </p:cNvSpPr>
+          <p:nvPr>
+            <p:ph idx="1"/>
+          </p:nvPr>
+        </p:nvSpPr>
+        <p:spPr/>
+        <p:txBody>
+          <a:bodyPr/>
+          <a:lstStyle/>
+          <a:p>
+            <a:pPr lvl="0"/>
+            <a:r>
+              <a:rPr lang="nl-NL" dirty="0"/>
+              <a:t>LCD MIDAS typenummer </a:t>
+            </a:r>
+            <a:r>
+              <a:rPr lang="nl-NL" dirty="0" smtClean="0"/>
+              <a:t>MC128064B6W-BNMLW</a:t>
+            </a:r>
+          </a:p>
+          <a:p>
+            <a:pPr lvl="0"/>
+            <a:endParaRPr lang="nl-NL" dirty="0"/>
+          </a:p>
+          <a:p>
+            <a:pPr lvl="0"/>
+            <a:r>
+              <a:rPr lang="nl-NL" dirty="0"/>
+              <a:t>Chip geeft x-y positie met </a:t>
+            </a:r>
+            <a:r>
+              <a:rPr lang="nl-NL" dirty="0" smtClean="0"/>
+              <a:t>karakter</a:t>
+            </a:r>
+          </a:p>
+          <a:p>
+            <a:pPr lvl="0"/>
+            <a:endParaRPr lang="nl-NL" dirty="0"/>
+          </a:p>
+          <a:p>
+            <a:pPr lvl="0"/>
+            <a:r>
+              <a:rPr lang="nl-NL" dirty="0"/>
+              <a:t>Atmega32-16pu met karakter bibliotheek en schrijf </a:t>
+            </a:r>
+            <a:r>
+              <a:rPr lang="nl-NL" dirty="0" smtClean="0"/>
+              <a:t>routine</a:t>
+            </a:r>
+            <a:endParaRPr lang="nl-NL" dirty="0"/>
+          </a:p>
+        </p:txBody>
+      </p:sp>
+      <p:pic>
+        <p:nvPicPr>
+          <p:cNvPr id="8" name="voorbeeld_lcd.png"/>
+          <p:cNvPicPr/>
+          <p:nvPr/>
+        </p:nvPicPr>
+        <p:blipFill>
+          <a:blip r:embed="rId2">
+            <a:extLst/>
+          </a:blip>
+          <a:stretch>
+            <a:fillRect/>
+          </a:stretch>
+        </p:blipFill>
+        <p:spPr>
+          <a:xfrm>
+            <a:off x="5058289" y="4160983"/>
+            <a:ext cx="3059981" cy="1373199"/>
+          </a:xfrm>
+          <a:prstGeom prst="rect">
+            <a:avLst/>
+          </a:prstGeom>
+          <a:ln w="12700">
+            <a:miter lim="400000"/>
+          </a:ln>
+        </p:spPr>
+      </p:pic>
+      <p:pic>
+        <p:nvPicPr>
+          <p:cNvPr id="10" name="pasted-image.tif"/>
+          <p:cNvPicPr/>
+          <p:nvPr/>
+        </p:nvPicPr>
+        <p:blipFill>
+          <a:blip r:embed="rId3">
+            <a:extLst/>
+          </a:blip>
+          <a:srcRect l="31265" t="1357" r="31139" b="10740"/>
+          <a:stretch>
+            <a:fillRect/>
+          </a:stretch>
+        </p:blipFill>
+        <p:spPr>
+          <a:xfrm>
+            <a:off x="3586356" y="3990773"/>
+            <a:ext cx="673162" cy="1774865"/>
+          </a:xfrm>
+          <a:prstGeom prst="rect">
+            <a:avLst/>
+          </a:prstGeom>
+          <a:ln w="12700">
+            <a:miter lim="400000"/>
+          </a:ln>
+        </p:spPr>
+      </p:pic>
+      <p:pic>
+        <p:nvPicPr>
+          <p:cNvPr id="11" name="toplevel_entity.png"/>
+          <p:cNvPicPr/>
+          <p:nvPr/>
+        </p:nvPicPr>
+        <p:blipFill>
+          <a:blip r:embed="rId4">
+            <a:extLst/>
+          </a:blip>
+          <a:stretch>
+            <a:fillRect/>
+          </a:stretch>
+        </p:blipFill>
+        <p:spPr>
+          <a:xfrm>
+            <a:off x="468569" y="3929528"/>
+            <a:ext cx="2823273" cy="1836110"/>
+          </a:xfrm>
+          <a:prstGeom prst="rect">
+            <a:avLst/>
+          </a:prstGeom>
+          <a:ln w="12700">
+            <a:miter lim="400000"/>
+          </a:ln>
+        </p:spPr>
+      </p:pic>
+      <p:sp>
+        <p:nvSpPr>
+          <p:cNvPr id="12" name="Shape 41"/>
+          <p:cNvSpPr/>
+          <p:nvPr/>
+        </p:nvSpPr>
+        <p:spPr>
+          <a:xfrm>
+            <a:off x="2787586" y="4604708"/>
+            <a:ext cx="798770" cy="0"/>
+          </a:xfrm>
+          <a:prstGeom prst="line">
+            <a:avLst/>
+          </a:prstGeom>
+          <a:ln w="63500">
+            <a:solidFill/>
+            <a:miter lim="400000"/>
+            <a:tailEnd type="triangle"/>
+          </a:ln>
+        </p:spPr>
+        <p:txBody>
+          <a:bodyPr lIns="0" tIns="0" rIns="0" bIns="0" anchor="ctr"/>
+          <a:lstStyle/>
+          <a:p>
+            <a:pPr>
+              <a:defRPr sz="2400"/>
+            </a:pPr>
+            <a:endParaRPr>
+              <a:solidFill>
+                <a:srgbClr val="000000"/>
+              </a:solidFill>
+            </a:endParaRPr>
+          </a:p>
+        </p:txBody>
+      </p:sp>
+      <p:sp>
+        <p:nvSpPr>
+          <p:cNvPr id="13" name="Shape 42"/>
+          <p:cNvSpPr/>
+          <p:nvPr/>
+        </p:nvSpPr>
+        <p:spPr>
+          <a:xfrm>
+            <a:off x="4259518" y="4604708"/>
+            <a:ext cx="798771" cy="0"/>
+          </a:xfrm>
+          <a:prstGeom prst="line">
+            <a:avLst/>
+          </a:prstGeom>
+          <a:ln w="63500">
+            <a:solidFill/>
+            <a:miter lim="400000"/>
+            <a:tailEnd type="triangle"/>
+          </a:ln>
+        </p:spPr>
+        <p:txBody>
+          <a:bodyPr lIns="0" tIns="0" rIns="0" bIns="0" anchor="ctr"/>
+          <a:lstStyle/>
+          <a:p>
+            <a:pPr>
+              <a:defRPr sz="2400"/>
+            </a:pPr>
+            <a:endParaRPr>
+              <a:solidFill>
+                <a:srgbClr val="000000"/>
+              </a:solidFill>
+            </a:endParaRPr>
+          </a:p>
+        </p:txBody>
+      </p:sp>
+    </p:spTree>
+    <p:extLst>
+      <p:ext uri="{BB962C8B-B14F-4D97-AF65-F5344CB8AC3E}">
+        <p14:creationId xmlns:p14="http://schemas.microsoft.com/office/powerpoint/2010/main" val="1029360624"/>
+      </p:ext>
+    </p:extLst>
+  </p:cSld>
+  <p:clrMapOvr>
+    <a:masterClrMapping/>
+  </p:clrMapOvr>
+  <p:timing>
+    <p:tnLst>
+      <p:par>
+        <p:cTn id="1" dur="indefinite" restart="never" nodeType="tmRoot"/>
+      </p:par>
+    </p:tnLst>
+  </p:timing>
+</p:sld>
+</file>
+
+<file path=ppt/slides/slide18.xml><?xml version="1.0" encoding="utf-8"?>
+<p:sld xmlns:a="http://schemas.openxmlformats.org/drawingml/2006/main" xmlns:r="http://schemas.openxmlformats.org/officeDocument/2006/relationships" xmlns:p="http://schemas.openxmlformats.org/presentationml/2006/main">
+  <p:cSld>
+    <p:spTree>
+      <p:nvGrpSpPr>
+        <p:cNvPr id="1" name=""/>
+        <p:cNvGrpSpPr/>
+        <p:nvPr/>
+      </p:nvGrpSpPr>
+      <p:grpSpPr>
+        <a:xfrm>
+          <a:off x="0" y="0"/>
+          <a:ext cx="0" cy="0"/>
+          <a:chOff x="0" y="0"/>
+          <a:chExt cx="0" cy="0"/>
+        </a:xfrm>
+      </p:grpSpPr>
+      <p:sp>
+        <p:nvSpPr>
+          <p:cNvPr id="4098" name="Title 3"/>
+          <p:cNvSpPr>
+            <a:spLocks noGrp="1"/>
+          </p:cNvSpPr>
+          <p:nvPr>
+            <p:ph type="title"/>
+          </p:nvPr>
+        </p:nvSpPr>
+        <p:spPr>
+          <a:xfrm>
+            <a:off x="915193" y="502892"/>
+            <a:ext cx="7159625" cy="627063"/>
+          </a:xfrm>
+        </p:spPr>
+        <p:txBody>
+          <a:bodyPr/>
+          <a:lstStyle/>
+          <a:p>
+            <a:pPr>
+              <a:defRPr/>
+            </a:pPr>
+            <a:r>
+              <a:rPr lang="nl-NL" altLang="nl-NL" dirty="0" smtClean="0">
+                <a:latin typeface="+mn-lt"/>
+                <a:ea typeface="ＭＳ Ｐゴシック" pitchFamily="34" charset="-128"/>
+              </a:rPr>
+              <a:t>LCD</a:t>
+            </a:r>
+          </a:p>
+        </p:txBody>
+      </p:sp>
+      <p:sp>
+        <p:nvSpPr>
+          <p:cNvPr id="6" name="Ondertitel 2"/>
+          <p:cNvSpPr txBox="1">
+            <a:spLocks/>
+          </p:cNvSpPr>
+          <p:nvPr/>
+        </p:nvSpPr>
+        <p:spPr bwMode="auto">
+          <a:xfrm>
+            <a:off x="914400" y="1041400"/>
+            <a:ext cx="6781800" cy="474663"/>
+          </a:xfrm>
+          <a:prstGeom prst="rect">
+            <a:avLst/>
+          </a:prstGeom>
+          <a:noFill/>
+          <a:ln w="9525">
+            <a:noFill/>
+            <a:miter lim="800000"/>
+            <a:headEnd/>
+            <a:tailEnd/>
+          </a:ln>
+        </p:spPr>
+        <p:txBody>
+          <a:bodyPr lIns="0" tIns="0" rIns="0" bIns="0"/>
+          <a:lstStyle>
+            <a:lvl1pPr eaLnBrk="0" hangingPunct="0">
+              <a:defRPr sz="2400">
+                <a:solidFill>
+                  <a:schemeClr val="tx1"/>
+                </a:solidFill>
+                <a:latin typeface="Tahoma" charset="0"/>
+                <a:cs typeface="Arial" charset="0"/>
+              </a:defRPr>
+            </a:lvl1pPr>
+            <a:lvl2pPr marL="37931725" indent="-37474525" eaLnBrk="0" hangingPunct="0">
+              <a:defRPr sz="2400">
+                <a:solidFill>
+                  <a:schemeClr val="tx1"/>
+                </a:solidFill>
+                <a:latin typeface="Tahoma" charset="0"/>
+                <a:cs typeface="Arial" charset="0"/>
+              </a:defRPr>
+            </a:lvl2pPr>
+            <a:lvl3pPr eaLnBrk="0" hangingPunct="0">
+              <a:defRPr sz="2400">
+                <a:solidFill>
+                  <a:schemeClr val="tx1"/>
+                </a:solidFill>
+                <a:latin typeface="Tahoma" charset="0"/>
+                <a:cs typeface="Arial" charset="0"/>
+              </a:defRPr>
+            </a:lvl3pPr>
+            <a:lvl4pPr eaLnBrk="0" hangingPunct="0">
+              <a:defRPr sz="2400">
+                <a:solidFill>
+                  <a:schemeClr val="tx1"/>
+                </a:solidFill>
+                <a:latin typeface="Tahoma" charset="0"/>
+                <a:cs typeface="Arial" charset="0"/>
+              </a:defRPr>
+            </a:lvl4pPr>
+            <a:lvl5pPr eaLnBrk="0" hangingPunct="0">
+              <a:defRPr sz="2400">
+                <a:solidFill>
+                  <a:schemeClr val="tx1"/>
+                </a:solidFill>
+                <a:latin typeface="Tahoma" charset="0"/>
+                <a:cs typeface="Arial" charset="0"/>
+              </a:defRPr>
+            </a:lvl5pPr>
+            <a:lvl6pPr marL="457200" eaLnBrk="0" fontAlgn="base" hangingPunct="0">
+              <a:spcBef>
+                <a:spcPct val="0"/>
+              </a:spcBef>
+              <a:spcAft>
+                <a:spcPct val="0"/>
+              </a:spcAft>
+              <a:defRPr sz="2400">
+                <a:solidFill>
+                  <a:schemeClr val="tx1"/>
+                </a:solidFill>
+                <a:latin typeface="Tahoma" charset="0"/>
+                <a:cs typeface="Arial" charset="0"/>
+              </a:defRPr>
+            </a:lvl6pPr>
+            <a:lvl7pPr marL="914400" eaLnBrk="0" fontAlgn="base" hangingPunct="0">
+              <a:spcBef>
+                <a:spcPct val="0"/>
+              </a:spcBef>
+              <a:spcAft>
+                <a:spcPct val="0"/>
+              </a:spcAft>
+              <a:defRPr sz="2400">
+                <a:solidFill>
+                  <a:schemeClr val="tx1"/>
+                </a:solidFill>
+                <a:latin typeface="Tahoma" charset="0"/>
+                <a:cs typeface="Arial" charset="0"/>
+              </a:defRPr>
+            </a:lvl7pPr>
+            <a:lvl8pPr marL="1371600" eaLnBrk="0" fontAlgn="base" hangingPunct="0">
+              <a:spcBef>
+                <a:spcPct val="0"/>
+              </a:spcBef>
+              <a:spcAft>
+                <a:spcPct val="0"/>
+              </a:spcAft>
+              <a:defRPr sz="2400">
+                <a:solidFill>
+                  <a:schemeClr val="tx1"/>
+                </a:solidFill>
+                <a:latin typeface="Tahoma" charset="0"/>
+                <a:cs typeface="Arial" charset="0"/>
+              </a:defRPr>
+            </a:lvl8pPr>
+            <a:lvl9pPr marL="1828800" eaLnBrk="0" fontAlgn="base" hangingPunct="0">
+              <a:spcBef>
+                <a:spcPct val="0"/>
+              </a:spcBef>
+              <a:spcAft>
+                <a:spcPct val="0"/>
+              </a:spcAft>
+              <a:defRPr sz="2400">
+                <a:solidFill>
+                  <a:schemeClr val="tx1"/>
+                </a:solidFill>
+                <a:latin typeface="Tahoma" charset="0"/>
+                <a:cs typeface="Arial" charset="0"/>
+              </a:defRPr>
+            </a:lvl9pPr>
+          </a:lstStyle>
+          <a:p>
+            <a:pPr algn="l">
+              <a:lnSpc>
+                <a:spcPts val="2500"/>
+              </a:lnSpc>
+              <a:buClr>
+                <a:srgbClr val="00A6D6"/>
+              </a:buClr>
+              <a:defRPr/>
+            </a:pPr>
+            <a:r>
+              <a:rPr lang="nl-NL" altLang="nl-NL" sz="2000" dirty="0" smtClean="0">
+                <a:solidFill>
+                  <a:srgbClr val="00A6D6"/>
+                </a:solidFill>
+                <a:latin typeface="Tahoma"/>
+                <a:ea typeface="ＭＳ Ｐゴシック" charset="-128"/>
+              </a:rPr>
+              <a:t>Werking display</a:t>
+            </a:r>
+          </a:p>
+        </p:txBody>
+      </p:sp>
+      <p:pic>
+        <p:nvPicPr>
+          <p:cNvPr id="14" name="voorbeeld_lcd.png"/>
+          <p:cNvPicPr/>
+          <p:nvPr/>
+        </p:nvPicPr>
+        <p:blipFill>
+          <a:blip r:embed="rId2">
+            <a:extLst/>
+          </a:blip>
+          <a:stretch>
+            <a:fillRect/>
+          </a:stretch>
+        </p:blipFill>
+        <p:spPr>
+          <a:xfrm>
+            <a:off x="2796156" y="4305606"/>
+            <a:ext cx="3147444" cy="1422333"/>
+          </a:xfrm>
+          <a:prstGeom prst="rect">
+            <a:avLst/>
+          </a:prstGeom>
+          <a:ln w="12700">
+            <a:miter lim="400000"/>
+          </a:ln>
+        </p:spPr>
+      </p:pic>
+      <p:pic>
+        <p:nvPicPr>
+          <p:cNvPr id="15" name="pasted-image.png"/>
+          <p:cNvPicPr/>
+          <p:nvPr/>
+        </p:nvPicPr>
+        <p:blipFill>
+          <a:blip r:embed="rId3">
+            <a:extLst/>
+          </a:blip>
+          <a:stretch>
+            <a:fillRect/>
+          </a:stretch>
+        </p:blipFill>
+        <p:spPr>
+          <a:xfrm>
+            <a:off x="5297313" y="2054571"/>
+            <a:ext cx="3583304" cy="2087816"/>
+          </a:xfrm>
+          <a:prstGeom prst="rect">
+            <a:avLst/>
+          </a:prstGeom>
+          <a:ln w="12700">
+            <a:miter lim="400000"/>
+          </a:ln>
+        </p:spPr>
+      </p:pic>
+      <p:pic>
+        <p:nvPicPr>
+          <p:cNvPr id="16" name="pasted-image.png"/>
+          <p:cNvPicPr/>
+          <p:nvPr/>
+        </p:nvPicPr>
+        <p:blipFill>
+          <a:blip r:embed="rId4">
+            <a:extLst/>
+          </a:blip>
+          <a:stretch>
+            <a:fillRect/>
+          </a:stretch>
+        </p:blipFill>
+        <p:spPr>
+          <a:xfrm>
+            <a:off x="268958" y="2054571"/>
+            <a:ext cx="2010067" cy="1995570"/>
+          </a:xfrm>
+          <a:prstGeom prst="rect">
+            <a:avLst/>
+          </a:prstGeom>
+          <a:ln w="12700">
+            <a:miter lim="400000"/>
+          </a:ln>
+        </p:spPr>
+      </p:pic>
+      <p:pic>
+        <p:nvPicPr>
+          <p:cNvPr id="17" name="pasted-image.png"/>
+          <p:cNvPicPr/>
+          <p:nvPr/>
+        </p:nvPicPr>
+        <p:blipFill>
+          <a:blip r:embed="rId5">
+            <a:extLst/>
+          </a:blip>
+          <a:stretch>
+            <a:fillRect/>
+          </a:stretch>
+        </p:blipFill>
+        <p:spPr>
+          <a:xfrm>
+            <a:off x="2224824" y="3077072"/>
+            <a:ext cx="3018288" cy="561385"/>
+          </a:xfrm>
+          <a:prstGeom prst="rect">
+            <a:avLst/>
+          </a:prstGeom>
+          <a:ln w="12700">
+            <a:miter lim="400000"/>
+          </a:ln>
+        </p:spPr>
+      </p:pic>
+      <p:pic>
+        <p:nvPicPr>
+          <p:cNvPr id="18" name="pasted-image.png"/>
+          <p:cNvPicPr/>
+          <p:nvPr/>
+        </p:nvPicPr>
+        <p:blipFill>
+          <a:blip r:embed="rId6">
+            <a:extLst/>
+          </a:blip>
+          <a:stretch>
+            <a:fillRect/>
+          </a:stretch>
+        </p:blipFill>
+        <p:spPr>
+          <a:xfrm>
+            <a:off x="2279025" y="2591538"/>
+            <a:ext cx="2909886" cy="506941"/>
+          </a:xfrm>
+          <a:prstGeom prst="rect">
+            <a:avLst/>
+          </a:prstGeom>
+          <a:ln w="12700">
+            <a:miter lim="400000"/>
+          </a:ln>
+        </p:spPr>
+      </p:pic>
+      <p:pic>
+        <p:nvPicPr>
+          <p:cNvPr id="19" name="pasted-image.png"/>
+          <p:cNvPicPr/>
+          <p:nvPr/>
+        </p:nvPicPr>
+        <p:blipFill>
+          <a:blip r:embed="rId7">
+            <a:extLst/>
+          </a:blip>
+          <a:stretch>
+            <a:fillRect/>
+          </a:stretch>
+        </p:blipFill>
+        <p:spPr>
+          <a:xfrm>
+            <a:off x="2224824" y="3635446"/>
+            <a:ext cx="2907026" cy="506941"/>
+          </a:xfrm>
+          <a:prstGeom prst="rect">
+            <a:avLst/>
+          </a:prstGeom>
+          <a:ln w="12700">
+            <a:miter lim="400000"/>
+          </a:ln>
+        </p:spPr>
+      </p:pic>
+      <p:pic>
+        <p:nvPicPr>
+          <p:cNvPr id="20" name="pasted-image.png"/>
+          <p:cNvPicPr/>
+          <p:nvPr/>
+        </p:nvPicPr>
+        <p:blipFill>
+          <a:blip r:embed="rId8">
+            <a:extLst/>
+          </a:blip>
+          <a:stretch>
+            <a:fillRect/>
+          </a:stretch>
+        </p:blipFill>
+        <p:spPr>
+          <a:xfrm>
+            <a:off x="2317237" y="2095332"/>
+            <a:ext cx="3009410" cy="444773"/>
+          </a:xfrm>
+          <a:prstGeom prst="rect">
+            <a:avLst/>
+          </a:prstGeom>
+          <a:ln w="12700">
+            <a:miter lim="400000"/>
+          </a:ln>
+        </p:spPr>
+      </p:pic>
+    </p:spTree>
+    <p:extLst>
+      <p:ext uri="{BB962C8B-B14F-4D97-AF65-F5344CB8AC3E}">
+        <p14:creationId xmlns:p14="http://schemas.microsoft.com/office/powerpoint/2010/main" val="1364178138"/>
+      </p:ext>
+    </p:extLst>
+  </p:cSld>
+  <p:clrMapOvr>
+    <a:masterClrMapping/>
+  </p:clrMapOvr>
+  <p:timing>
+    <p:tnLst>
+      <p:par>
+        <p:cTn id="1" dur="indefinite" restart="never" nodeType="tmRoot"/>
+      </p:par>
+    </p:tnLst>
+  </p:timing>
+</p:sld>
+</file>
+
+<file path=ppt/slides/slide19.xml><?xml version="1.0" encoding="utf-8"?>
+<p:sld xmlns:a="http://schemas.openxmlformats.org/drawingml/2006/main" xmlns:r="http://schemas.openxmlformats.org/officeDocument/2006/relationships" xmlns:p="http://schemas.openxmlformats.org/presentationml/2006/main">
+  <p:cSld>
+    <p:spTree>
+      <p:nvGrpSpPr>
+        <p:cNvPr id="1" name=""/>
+        <p:cNvGrpSpPr/>
+        <p:nvPr/>
+      </p:nvGrpSpPr>
+      <p:grpSpPr>
+        <a:xfrm>
+          <a:off x="0" y="0"/>
+          <a:ext cx="0" cy="0"/>
+          <a:chOff x="0" y="0"/>
+          <a:chExt cx="0" cy="0"/>
+        </a:xfrm>
+      </p:grpSpPr>
+      <p:sp>
+        <p:nvSpPr>
+          <p:cNvPr id="4098" name="Title 3"/>
+          <p:cNvSpPr>
+            <a:spLocks noGrp="1"/>
+          </p:cNvSpPr>
+          <p:nvPr>
+            <p:ph type="title"/>
+          </p:nvPr>
+        </p:nvSpPr>
+        <p:spPr>
+          <a:xfrm>
+            <a:off x="915193" y="502892"/>
+            <a:ext cx="7159625" cy="627063"/>
+          </a:xfrm>
+        </p:spPr>
+        <p:txBody>
+          <a:bodyPr/>
+          <a:lstStyle/>
+          <a:p>
+            <a:pPr>
+              <a:defRPr/>
+            </a:pPr>
+            <a:r>
+              <a:rPr lang="nl-NL" altLang="nl-NL" dirty="0" smtClean="0">
+                <a:latin typeface="+mn-lt"/>
+                <a:ea typeface="ＭＳ Ｐゴシック" pitchFamily="34" charset="-128"/>
+              </a:rPr>
+              <a:t>LCD</a:t>
+            </a:r>
+          </a:p>
+        </p:txBody>
+      </p:sp>
+      <p:sp>
+        <p:nvSpPr>
+          <p:cNvPr id="6" name="Ondertitel 2"/>
+          <p:cNvSpPr txBox="1">
+            <a:spLocks/>
+          </p:cNvSpPr>
+          <p:nvPr/>
+        </p:nvSpPr>
+        <p:spPr bwMode="auto">
+          <a:xfrm>
+            <a:off x="914400" y="1041400"/>
+            <a:ext cx="6781800" cy="474663"/>
+          </a:xfrm>
+          <a:prstGeom prst="rect">
+            <a:avLst/>
+          </a:prstGeom>
+          <a:noFill/>
+          <a:ln w="9525">
+            <a:noFill/>
+            <a:miter lim="800000"/>
+            <a:headEnd/>
+            <a:tailEnd/>
+          </a:ln>
+        </p:spPr>
+        <p:txBody>
+          <a:bodyPr lIns="0" tIns="0" rIns="0" bIns="0"/>
+          <a:lstStyle>
+            <a:lvl1pPr eaLnBrk="0" hangingPunct="0">
+              <a:defRPr sz="2400">
+                <a:solidFill>
+                  <a:schemeClr val="tx1"/>
+                </a:solidFill>
+                <a:latin typeface="Tahoma" charset="0"/>
+                <a:cs typeface="Arial" charset="0"/>
+              </a:defRPr>
+            </a:lvl1pPr>
+            <a:lvl2pPr marL="37931725" indent="-37474525" eaLnBrk="0" hangingPunct="0">
+              <a:defRPr sz="2400">
+                <a:solidFill>
+                  <a:schemeClr val="tx1"/>
+                </a:solidFill>
+                <a:latin typeface="Tahoma" charset="0"/>
+                <a:cs typeface="Arial" charset="0"/>
+              </a:defRPr>
+            </a:lvl2pPr>
+            <a:lvl3pPr eaLnBrk="0" hangingPunct="0">
+              <a:defRPr sz="2400">
+                <a:solidFill>
+                  <a:schemeClr val="tx1"/>
+                </a:solidFill>
+                <a:latin typeface="Tahoma" charset="0"/>
+                <a:cs typeface="Arial" charset="0"/>
+              </a:defRPr>
+            </a:lvl3pPr>
+            <a:lvl4pPr eaLnBrk="0" hangingPunct="0">
+              <a:defRPr sz="2400">
+                <a:solidFill>
+                  <a:schemeClr val="tx1"/>
+                </a:solidFill>
+                <a:latin typeface="Tahoma" charset="0"/>
+                <a:cs typeface="Arial" charset="0"/>
+              </a:defRPr>
+            </a:lvl4pPr>
+            <a:lvl5pPr eaLnBrk="0" hangingPunct="0">
+              <a:defRPr sz="2400">
+                <a:solidFill>
+                  <a:schemeClr val="tx1"/>
+                </a:solidFill>
+                <a:latin typeface="Tahoma" charset="0"/>
+                <a:cs typeface="Arial" charset="0"/>
+              </a:defRPr>
+            </a:lvl5pPr>
+            <a:lvl6pPr marL="457200" eaLnBrk="0" fontAlgn="base" hangingPunct="0">
+              <a:spcBef>
+                <a:spcPct val="0"/>
+              </a:spcBef>
+              <a:spcAft>
+                <a:spcPct val="0"/>
+              </a:spcAft>
+              <a:defRPr sz="2400">
+                <a:solidFill>
+                  <a:schemeClr val="tx1"/>
+                </a:solidFill>
+                <a:latin typeface="Tahoma" charset="0"/>
+                <a:cs typeface="Arial" charset="0"/>
+              </a:defRPr>
+            </a:lvl6pPr>
+            <a:lvl7pPr marL="914400" eaLnBrk="0" fontAlgn="base" hangingPunct="0">
+              <a:spcBef>
+                <a:spcPct val="0"/>
+              </a:spcBef>
+              <a:spcAft>
+                <a:spcPct val="0"/>
+              </a:spcAft>
+              <a:defRPr sz="2400">
+                <a:solidFill>
+                  <a:schemeClr val="tx1"/>
+                </a:solidFill>
+                <a:latin typeface="Tahoma" charset="0"/>
+                <a:cs typeface="Arial" charset="0"/>
+              </a:defRPr>
+            </a:lvl7pPr>
+            <a:lvl8pPr marL="1371600" eaLnBrk="0" fontAlgn="base" hangingPunct="0">
+              <a:spcBef>
+                <a:spcPct val="0"/>
+              </a:spcBef>
+              <a:spcAft>
+                <a:spcPct val="0"/>
+              </a:spcAft>
+              <a:defRPr sz="2400">
+                <a:solidFill>
+                  <a:schemeClr val="tx1"/>
+                </a:solidFill>
+                <a:latin typeface="Tahoma" charset="0"/>
+                <a:cs typeface="Arial" charset="0"/>
+              </a:defRPr>
+            </a:lvl8pPr>
+            <a:lvl9pPr marL="1828800" eaLnBrk="0" fontAlgn="base" hangingPunct="0">
+              <a:spcBef>
+                <a:spcPct val="0"/>
+              </a:spcBef>
+              <a:spcAft>
+                <a:spcPct val="0"/>
+              </a:spcAft>
+              <a:defRPr sz="2400">
+                <a:solidFill>
+                  <a:schemeClr val="tx1"/>
+                </a:solidFill>
+                <a:latin typeface="Tahoma" charset="0"/>
+                <a:cs typeface="Arial" charset="0"/>
+              </a:defRPr>
+            </a:lvl9pPr>
+          </a:lstStyle>
+          <a:p>
+            <a:pPr algn="l">
+              <a:lnSpc>
+                <a:spcPts val="2500"/>
+              </a:lnSpc>
+              <a:buClr>
+                <a:srgbClr val="00A6D6"/>
+              </a:buClr>
+              <a:defRPr/>
+            </a:pPr>
+            <a:r>
+              <a:rPr lang="nl-NL" altLang="nl-NL" sz="2000" dirty="0" smtClean="0">
+                <a:solidFill>
+                  <a:srgbClr val="00A6D6"/>
+                </a:solidFill>
+                <a:latin typeface="Tahoma"/>
+                <a:ea typeface="ＭＳ Ｐゴシック" charset="-128"/>
+              </a:rPr>
+              <a:t>LCD controller chip</a:t>
+            </a:r>
+          </a:p>
+        </p:txBody>
+      </p:sp>
+      <p:pic>
+        <p:nvPicPr>
+          <p:cNvPr id="14" name="pasted-image.png"/>
+          <p:cNvPicPr/>
+          <p:nvPr/>
+        </p:nvPicPr>
+        <p:blipFill rotWithShape="1">
+          <a:blip r:embed="rId2">
+            <a:extLst/>
+          </a:blip>
+          <a:srcRect t="2545" b="2026"/>
+          <a:stretch/>
+        </p:blipFill>
+        <p:spPr>
+          <a:xfrm>
+            <a:off x="1561381" y="1431985"/>
+            <a:ext cx="6513437" cy="4666890"/>
+          </a:xfrm>
+          <a:prstGeom prst="rect">
+            <a:avLst/>
+          </a:prstGeom>
+          <a:ln w="12700">
+            <a:miter lim="400000"/>
+          </a:ln>
+        </p:spPr>
+      </p:pic>
+    </p:spTree>
+    <p:extLst>
+      <p:ext uri="{BB962C8B-B14F-4D97-AF65-F5344CB8AC3E}">
+        <p14:creationId xmlns:p14="http://schemas.microsoft.com/office/powerpoint/2010/main" val="2724193976"/>
       </p:ext>
     </p:extLst>
   </p:cSld>
@@ -5416,6 +8045,1445 @@
     <p:extLst>
       <p:ext uri="{BB962C8B-B14F-4D97-AF65-F5344CB8AC3E}">
         <p14:creationId xmlns:p14="http://schemas.microsoft.com/office/powerpoint/2010/main" val="912281294"/>
+      </p:ext>
+    </p:extLst>
+  </p:cSld>
+  <p:clrMapOvr>
+    <a:masterClrMapping/>
+  </p:clrMapOvr>
+  <p:timing>
+    <p:tnLst>
+      <p:par>
+        <p:cTn id="1" dur="indefinite" restart="never" nodeType="tmRoot"/>
+      </p:par>
+    </p:tnLst>
+  </p:timing>
+</p:sld>
+</file>
+
+<file path=ppt/slides/slide20.xml><?xml version="1.0" encoding="utf-8"?>
+<p:sld xmlns:a="http://schemas.openxmlformats.org/drawingml/2006/main" xmlns:r="http://schemas.openxmlformats.org/officeDocument/2006/relationships" xmlns:p="http://schemas.openxmlformats.org/presentationml/2006/main">
+  <p:cSld>
+    <p:spTree>
+      <p:nvGrpSpPr>
+        <p:cNvPr id="1" name=""/>
+        <p:cNvGrpSpPr/>
+        <p:nvPr/>
+      </p:nvGrpSpPr>
+      <p:grpSpPr>
+        <a:xfrm>
+          <a:off x="0" y="0"/>
+          <a:ext cx="0" cy="0"/>
+          <a:chOff x="0" y="0"/>
+          <a:chExt cx="0" cy="0"/>
+        </a:xfrm>
+      </p:grpSpPr>
+      <p:sp>
+        <p:nvSpPr>
+          <p:cNvPr id="4098" name="Title 3"/>
+          <p:cNvSpPr>
+            <a:spLocks noGrp="1"/>
+          </p:cNvSpPr>
+          <p:nvPr>
+            <p:ph type="title"/>
+          </p:nvPr>
+        </p:nvSpPr>
+        <p:spPr>
+          <a:xfrm>
+            <a:off x="915193" y="502892"/>
+            <a:ext cx="7159625" cy="627063"/>
+          </a:xfrm>
+        </p:spPr>
+        <p:txBody>
+          <a:bodyPr/>
+          <a:lstStyle/>
+          <a:p>
+            <a:pPr>
+              <a:defRPr/>
+            </a:pPr>
+            <a:r>
+              <a:rPr lang="nl-NL" altLang="nl-NL" dirty="0" smtClean="0">
+                <a:latin typeface="+mn-lt"/>
+                <a:ea typeface="ＭＳ Ｐゴシック" pitchFamily="34" charset="-128"/>
+              </a:rPr>
+              <a:t>LCD</a:t>
+            </a:r>
+          </a:p>
+        </p:txBody>
+      </p:sp>
+      <p:sp>
+        <p:nvSpPr>
+          <p:cNvPr id="6" name="Ondertitel 2"/>
+          <p:cNvSpPr txBox="1">
+            <a:spLocks/>
+          </p:cNvSpPr>
+          <p:nvPr/>
+        </p:nvSpPr>
+        <p:spPr bwMode="auto">
+          <a:xfrm>
+            <a:off x="914400" y="1041400"/>
+            <a:ext cx="6781800" cy="474663"/>
+          </a:xfrm>
+          <a:prstGeom prst="rect">
+            <a:avLst/>
+          </a:prstGeom>
+          <a:noFill/>
+          <a:ln w="9525">
+            <a:noFill/>
+            <a:miter lim="800000"/>
+            <a:headEnd/>
+            <a:tailEnd/>
+          </a:ln>
+        </p:spPr>
+        <p:txBody>
+          <a:bodyPr lIns="0" tIns="0" rIns="0" bIns="0"/>
+          <a:lstStyle>
+            <a:lvl1pPr eaLnBrk="0" hangingPunct="0">
+              <a:defRPr sz="2400">
+                <a:solidFill>
+                  <a:schemeClr val="tx1"/>
+                </a:solidFill>
+                <a:latin typeface="Tahoma" charset="0"/>
+                <a:cs typeface="Arial" charset="0"/>
+              </a:defRPr>
+            </a:lvl1pPr>
+            <a:lvl2pPr marL="37931725" indent="-37474525" eaLnBrk="0" hangingPunct="0">
+              <a:defRPr sz="2400">
+                <a:solidFill>
+                  <a:schemeClr val="tx1"/>
+                </a:solidFill>
+                <a:latin typeface="Tahoma" charset="0"/>
+                <a:cs typeface="Arial" charset="0"/>
+              </a:defRPr>
+            </a:lvl2pPr>
+            <a:lvl3pPr eaLnBrk="0" hangingPunct="0">
+              <a:defRPr sz="2400">
+                <a:solidFill>
+                  <a:schemeClr val="tx1"/>
+                </a:solidFill>
+                <a:latin typeface="Tahoma" charset="0"/>
+                <a:cs typeface="Arial" charset="0"/>
+              </a:defRPr>
+            </a:lvl3pPr>
+            <a:lvl4pPr eaLnBrk="0" hangingPunct="0">
+              <a:defRPr sz="2400">
+                <a:solidFill>
+                  <a:schemeClr val="tx1"/>
+                </a:solidFill>
+                <a:latin typeface="Tahoma" charset="0"/>
+                <a:cs typeface="Arial" charset="0"/>
+              </a:defRPr>
+            </a:lvl4pPr>
+            <a:lvl5pPr eaLnBrk="0" hangingPunct="0">
+              <a:defRPr sz="2400">
+                <a:solidFill>
+                  <a:schemeClr val="tx1"/>
+                </a:solidFill>
+                <a:latin typeface="Tahoma" charset="0"/>
+                <a:cs typeface="Arial" charset="0"/>
+              </a:defRPr>
+            </a:lvl5pPr>
+            <a:lvl6pPr marL="457200" eaLnBrk="0" fontAlgn="base" hangingPunct="0">
+              <a:spcBef>
+                <a:spcPct val="0"/>
+              </a:spcBef>
+              <a:spcAft>
+                <a:spcPct val="0"/>
+              </a:spcAft>
+              <a:defRPr sz="2400">
+                <a:solidFill>
+                  <a:schemeClr val="tx1"/>
+                </a:solidFill>
+                <a:latin typeface="Tahoma" charset="0"/>
+                <a:cs typeface="Arial" charset="0"/>
+              </a:defRPr>
+            </a:lvl6pPr>
+            <a:lvl7pPr marL="914400" eaLnBrk="0" fontAlgn="base" hangingPunct="0">
+              <a:spcBef>
+                <a:spcPct val="0"/>
+              </a:spcBef>
+              <a:spcAft>
+                <a:spcPct val="0"/>
+              </a:spcAft>
+              <a:defRPr sz="2400">
+                <a:solidFill>
+                  <a:schemeClr val="tx1"/>
+                </a:solidFill>
+                <a:latin typeface="Tahoma" charset="0"/>
+                <a:cs typeface="Arial" charset="0"/>
+              </a:defRPr>
+            </a:lvl7pPr>
+            <a:lvl8pPr marL="1371600" eaLnBrk="0" fontAlgn="base" hangingPunct="0">
+              <a:spcBef>
+                <a:spcPct val="0"/>
+              </a:spcBef>
+              <a:spcAft>
+                <a:spcPct val="0"/>
+              </a:spcAft>
+              <a:defRPr sz="2400">
+                <a:solidFill>
+                  <a:schemeClr val="tx1"/>
+                </a:solidFill>
+                <a:latin typeface="Tahoma" charset="0"/>
+                <a:cs typeface="Arial" charset="0"/>
+              </a:defRPr>
+            </a:lvl8pPr>
+            <a:lvl9pPr marL="1828800" eaLnBrk="0" fontAlgn="base" hangingPunct="0">
+              <a:spcBef>
+                <a:spcPct val="0"/>
+              </a:spcBef>
+              <a:spcAft>
+                <a:spcPct val="0"/>
+              </a:spcAft>
+              <a:defRPr sz="2400">
+                <a:solidFill>
+                  <a:schemeClr val="tx1"/>
+                </a:solidFill>
+                <a:latin typeface="Tahoma" charset="0"/>
+                <a:cs typeface="Arial" charset="0"/>
+              </a:defRPr>
+            </a:lvl9pPr>
+          </a:lstStyle>
+          <a:p>
+            <a:pPr algn="l">
+              <a:lnSpc>
+                <a:spcPts val="2500"/>
+              </a:lnSpc>
+              <a:buClr>
+                <a:srgbClr val="00A6D6"/>
+              </a:buClr>
+              <a:defRPr/>
+            </a:pPr>
+            <a:r>
+              <a:rPr lang="nl-NL" altLang="nl-NL" sz="2000" dirty="0" smtClean="0">
+                <a:solidFill>
+                  <a:srgbClr val="00A6D6"/>
+                </a:solidFill>
+                <a:latin typeface="Tahoma"/>
+                <a:ea typeface="ＭＳ Ｐゴシック" charset="-128"/>
+              </a:rPr>
+              <a:t>Data omzetting, vb. datum</a:t>
+            </a:r>
+          </a:p>
+        </p:txBody>
+      </p:sp>
+      <p:pic>
+        <p:nvPicPr>
+          <p:cNvPr id="5" name="datum_fsm.png"/>
+          <p:cNvPicPr/>
+          <p:nvPr/>
+        </p:nvPicPr>
+        <p:blipFill>
+          <a:blip r:embed="rId2">
+            <a:extLst/>
+          </a:blip>
+          <a:stretch>
+            <a:fillRect/>
+          </a:stretch>
+        </p:blipFill>
+        <p:spPr>
+          <a:xfrm>
+            <a:off x="2803586" y="1516063"/>
+            <a:ext cx="6239758" cy="3901326"/>
+          </a:xfrm>
+          <a:prstGeom prst="rect">
+            <a:avLst/>
+          </a:prstGeom>
+          <a:ln w="12700">
+            <a:miter lim="400000"/>
+          </a:ln>
+        </p:spPr>
+      </p:pic>
+      <p:pic>
+        <p:nvPicPr>
+          <p:cNvPr id="7" name="datum_entity.png"/>
+          <p:cNvPicPr/>
+          <p:nvPr/>
+        </p:nvPicPr>
+        <p:blipFill>
+          <a:blip r:embed="rId3">
+            <a:extLst/>
+          </a:blip>
+          <a:stretch>
+            <a:fillRect/>
+          </a:stretch>
+        </p:blipFill>
+        <p:spPr>
+          <a:xfrm>
+            <a:off x="612475" y="4278702"/>
+            <a:ext cx="4045789" cy="1475457"/>
+          </a:xfrm>
+          <a:prstGeom prst="rect">
+            <a:avLst/>
+          </a:prstGeom>
+          <a:ln w="12700">
+            <a:miter lim="400000"/>
+          </a:ln>
+        </p:spPr>
+      </p:pic>
+    </p:spTree>
+    <p:extLst>
+      <p:ext uri="{BB962C8B-B14F-4D97-AF65-F5344CB8AC3E}">
+        <p14:creationId xmlns:p14="http://schemas.microsoft.com/office/powerpoint/2010/main" val="1193109032"/>
+      </p:ext>
+    </p:extLst>
+  </p:cSld>
+  <p:clrMapOvr>
+    <a:masterClrMapping/>
+  </p:clrMapOvr>
+  <p:timing>
+    <p:tnLst>
+      <p:par>
+        <p:cTn id="1" dur="indefinite" restart="never" nodeType="tmRoot"/>
+      </p:par>
+    </p:tnLst>
+  </p:timing>
+</p:sld>
+</file>
+
+<file path=ppt/slides/slide21.xml><?xml version="1.0" encoding="utf-8"?>
+<p:sld xmlns:a="http://schemas.openxmlformats.org/drawingml/2006/main" xmlns:r="http://schemas.openxmlformats.org/officeDocument/2006/relationships" xmlns:p="http://schemas.openxmlformats.org/presentationml/2006/main">
+  <p:cSld>
+    <p:spTree>
+      <p:nvGrpSpPr>
+        <p:cNvPr id="1" name=""/>
+        <p:cNvGrpSpPr/>
+        <p:nvPr/>
+      </p:nvGrpSpPr>
+      <p:grpSpPr>
+        <a:xfrm>
+          <a:off x="0" y="0"/>
+          <a:ext cx="0" cy="0"/>
+          <a:chOff x="0" y="0"/>
+          <a:chExt cx="0" cy="0"/>
+        </a:xfrm>
+      </p:grpSpPr>
+      <p:pic>
+        <p:nvPicPr>
+          <p:cNvPr id="2" name="Afbeelding 1"/>
+          <p:cNvPicPr>
+            <a:picLocks noChangeAspect="1"/>
+          </p:cNvPicPr>
+          <p:nvPr/>
+        </p:nvPicPr>
+        <p:blipFill>
+          <a:blip r:embed="rId2">
+            <a:extLst>
+              <a:ext uri="{28A0092B-C50C-407E-A947-70E740481C1C}">
+                <a14:useLocalDpi xmlns:a14="http://schemas.microsoft.com/office/drawing/2010/main" val="0"/>
+              </a:ext>
+            </a:extLst>
+          </a:blip>
+          <a:stretch>
+            <a:fillRect/>
+          </a:stretch>
+        </p:blipFill>
+        <p:spPr>
+          <a:xfrm>
+            <a:off x="4095819" y="1573869"/>
+            <a:ext cx="2949196" cy="1486029"/>
+          </a:xfrm>
+          <a:prstGeom prst="rect">
+            <a:avLst/>
+          </a:prstGeom>
+        </p:spPr>
+      </p:pic>
+      <p:sp>
+        <p:nvSpPr>
+          <p:cNvPr id="4098" name="Title 3"/>
+          <p:cNvSpPr>
+            <a:spLocks noGrp="1"/>
+          </p:cNvSpPr>
+          <p:nvPr>
+            <p:ph type="title"/>
+          </p:nvPr>
+        </p:nvSpPr>
+        <p:spPr>
+          <a:xfrm>
+            <a:off x="915193" y="502892"/>
+            <a:ext cx="7159625" cy="627063"/>
+          </a:xfrm>
+        </p:spPr>
+        <p:txBody>
+          <a:bodyPr/>
+          <a:lstStyle/>
+          <a:p>
+            <a:pPr>
+              <a:defRPr/>
+            </a:pPr>
+            <a:r>
+              <a:rPr lang="nl-NL" altLang="nl-NL" dirty="0" smtClean="0">
+                <a:latin typeface="+mn-lt"/>
+                <a:ea typeface="ＭＳ Ｐゴシック" pitchFamily="34" charset="-128"/>
+              </a:rPr>
+              <a:t>LCD</a:t>
+            </a:r>
+          </a:p>
+        </p:txBody>
+      </p:sp>
+      <p:sp>
+        <p:nvSpPr>
+          <p:cNvPr id="6" name="Ondertitel 2"/>
+          <p:cNvSpPr txBox="1">
+            <a:spLocks/>
+          </p:cNvSpPr>
+          <p:nvPr/>
+        </p:nvSpPr>
+        <p:spPr bwMode="auto">
+          <a:xfrm>
+            <a:off x="914400" y="1041400"/>
+            <a:ext cx="6781800" cy="474663"/>
+          </a:xfrm>
+          <a:prstGeom prst="rect">
+            <a:avLst/>
+          </a:prstGeom>
+          <a:noFill/>
+          <a:ln w="9525">
+            <a:noFill/>
+            <a:miter lim="800000"/>
+            <a:headEnd/>
+            <a:tailEnd/>
+          </a:ln>
+        </p:spPr>
+        <p:txBody>
+          <a:bodyPr lIns="0" tIns="0" rIns="0" bIns="0"/>
+          <a:lstStyle>
+            <a:lvl1pPr eaLnBrk="0" hangingPunct="0">
+              <a:defRPr sz="2400">
+                <a:solidFill>
+                  <a:schemeClr val="tx1"/>
+                </a:solidFill>
+                <a:latin typeface="Tahoma" charset="0"/>
+                <a:cs typeface="Arial" charset="0"/>
+              </a:defRPr>
+            </a:lvl1pPr>
+            <a:lvl2pPr marL="37931725" indent="-37474525" eaLnBrk="0" hangingPunct="0">
+              <a:defRPr sz="2400">
+                <a:solidFill>
+                  <a:schemeClr val="tx1"/>
+                </a:solidFill>
+                <a:latin typeface="Tahoma" charset="0"/>
+                <a:cs typeface="Arial" charset="0"/>
+              </a:defRPr>
+            </a:lvl2pPr>
+            <a:lvl3pPr eaLnBrk="0" hangingPunct="0">
+              <a:defRPr sz="2400">
+                <a:solidFill>
+                  <a:schemeClr val="tx1"/>
+                </a:solidFill>
+                <a:latin typeface="Tahoma" charset="0"/>
+                <a:cs typeface="Arial" charset="0"/>
+              </a:defRPr>
+            </a:lvl3pPr>
+            <a:lvl4pPr eaLnBrk="0" hangingPunct="0">
+              <a:defRPr sz="2400">
+                <a:solidFill>
+                  <a:schemeClr val="tx1"/>
+                </a:solidFill>
+                <a:latin typeface="Tahoma" charset="0"/>
+                <a:cs typeface="Arial" charset="0"/>
+              </a:defRPr>
+            </a:lvl4pPr>
+            <a:lvl5pPr eaLnBrk="0" hangingPunct="0">
+              <a:defRPr sz="2400">
+                <a:solidFill>
+                  <a:schemeClr val="tx1"/>
+                </a:solidFill>
+                <a:latin typeface="Tahoma" charset="0"/>
+                <a:cs typeface="Arial" charset="0"/>
+              </a:defRPr>
+            </a:lvl5pPr>
+            <a:lvl6pPr marL="457200" eaLnBrk="0" fontAlgn="base" hangingPunct="0">
+              <a:spcBef>
+                <a:spcPct val="0"/>
+              </a:spcBef>
+              <a:spcAft>
+                <a:spcPct val="0"/>
+              </a:spcAft>
+              <a:defRPr sz="2400">
+                <a:solidFill>
+                  <a:schemeClr val="tx1"/>
+                </a:solidFill>
+                <a:latin typeface="Tahoma" charset="0"/>
+                <a:cs typeface="Arial" charset="0"/>
+              </a:defRPr>
+            </a:lvl6pPr>
+            <a:lvl7pPr marL="914400" eaLnBrk="0" fontAlgn="base" hangingPunct="0">
+              <a:spcBef>
+                <a:spcPct val="0"/>
+              </a:spcBef>
+              <a:spcAft>
+                <a:spcPct val="0"/>
+              </a:spcAft>
+              <a:defRPr sz="2400">
+                <a:solidFill>
+                  <a:schemeClr val="tx1"/>
+                </a:solidFill>
+                <a:latin typeface="Tahoma" charset="0"/>
+                <a:cs typeface="Arial" charset="0"/>
+              </a:defRPr>
+            </a:lvl7pPr>
+            <a:lvl8pPr marL="1371600" eaLnBrk="0" fontAlgn="base" hangingPunct="0">
+              <a:spcBef>
+                <a:spcPct val="0"/>
+              </a:spcBef>
+              <a:spcAft>
+                <a:spcPct val="0"/>
+              </a:spcAft>
+              <a:defRPr sz="2400">
+                <a:solidFill>
+                  <a:schemeClr val="tx1"/>
+                </a:solidFill>
+                <a:latin typeface="Tahoma" charset="0"/>
+                <a:cs typeface="Arial" charset="0"/>
+              </a:defRPr>
+            </a:lvl8pPr>
+            <a:lvl9pPr marL="1828800" eaLnBrk="0" fontAlgn="base" hangingPunct="0">
+              <a:spcBef>
+                <a:spcPct val="0"/>
+              </a:spcBef>
+              <a:spcAft>
+                <a:spcPct val="0"/>
+              </a:spcAft>
+              <a:defRPr sz="2400">
+                <a:solidFill>
+                  <a:schemeClr val="tx1"/>
+                </a:solidFill>
+                <a:latin typeface="Tahoma" charset="0"/>
+                <a:cs typeface="Arial" charset="0"/>
+              </a:defRPr>
+            </a:lvl9pPr>
+          </a:lstStyle>
+          <a:p>
+            <a:pPr algn="l">
+              <a:lnSpc>
+                <a:spcPts val="2500"/>
+              </a:lnSpc>
+              <a:buClr>
+                <a:srgbClr val="00A6D6"/>
+              </a:buClr>
+              <a:defRPr/>
+            </a:pPr>
+            <a:r>
+              <a:rPr lang="nl-NL" altLang="nl-NL" sz="2000" dirty="0" smtClean="0">
+                <a:solidFill>
+                  <a:srgbClr val="00A6D6"/>
+                </a:solidFill>
+                <a:latin typeface="Tahoma"/>
+                <a:ea typeface="ＭＳ Ｐゴシック" charset="-128"/>
+              </a:rPr>
+              <a:t>Proces positie bepaling</a:t>
+            </a:r>
+          </a:p>
+        </p:txBody>
+      </p:sp>
+      <p:grpSp>
+        <p:nvGrpSpPr>
+          <p:cNvPr id="9" name="Group 81"/>
+          <p:cNvGrpSpPr/>
+          <p:nvPr/>
+        </p:nvGrpSpPr>
+        <p:grpSpPr>
+          <a:xfrm>
+            <a:off x="914400" y="1824256"/>
+            <a:ext cx="5201728" cy="4179729"/>
+            <a:chOff x="0" y="0"/>
+            <a:chExt cx="7868671" cy="6444048"/>
+          </a:xfrm>
+        </p:grpSpPr>
+        <p:pic>
+          <p:nvPicPr>
+            <p:cNvPr id="10" name="pasted-image.png"/>
+            <p:cNvPicPr/>
+            <p:nvPr/>
+          </p:nvPicPr>
+          <p:blipFill>
+            <a:blip r:embed="rId3">
+              <a:extLst/>
+            </a:blip>
+            <a:stretch>
+              <a:fillRect/>
+            </a:stretch>
+          </p:blipFill>
+          <p:spPr>
+            <a:xfrm>
+              <a:off x="0" y="0"/>
+              <a:ext cx="3329914" cy="1542612"/>
+            </a:xfrm>
+            <a:prstGeom prst="rect">
+              <a:avLst/>
+            </a:prstGeom>
+            <a:ln w="12700" cap="flat">
+              <a:noFill/>
+              <a:miter lim="400000"/>
+            </a:ln>
+            <a:effectLst/>
+          </p:spPr>
+        </p:pic>
+        <p:pic>
+          <p:nvPicPr>
+            <p:cNvPr id="11" name="pasted-image.png"/>
+            <p:cNvPicPr/>
+            <p:nvPr/>
+          </p:nvPicPr>
+          <p:blipFill>
+            <a:blip r:embed="rId4">
+              <a:extLst/>
+            </a:blip>
+            <a:stretch>
+              <a:fillRect/>
+            </a:stretch>
+          </p:blipFill>
+          <p:spPr>
+            <a:xfrm>
+              <a:off x="570856" y="1556620"/>
+              <a:ext cx="2453608" cy="4887429"/>
+            </a:xfrm>
+            <a:prstGeom prst="rect">
+              <a:avLst/>
+            </a:prstGeom>
+            <a:ln w="12700" cap="flat">
+              <a:noFill/>
+              <a:miter lim="400000"/>
+            </a:ln>
+            <a:effectLst/>
+          </p:spPr>
+        </p:pic>
+        <p:sp>
+          <p:nvSpPr>
+            <p:cNvPr id="12" name="Shape 64"/>
+            <p:cNvSpPr/>
+            <p:nvPr/>
+          </p:nvSpPr>
+          <p:spPr>
+            <a:xfrm>
+              <a:off x="5511611" y="873434"/>
+              <a:ext cx="484091" cy="84371"/>
+            </a:xfrm>
+            <a:prstGeom prst="rect">
+              <a:avLst/>
+            </a:prstGeom>
+            <a:blipFill rotWithShape="1">
+              <a:blip r:embed="rId5"/>
+              <a:srcRect/>
+              <a:tile tx="0" ty="0" sx="100000" sy="100000" flip="none" algn="tl"/>
+            </a:blipFill>
+            <a:ln w="12700" cap="flat">
+              <a:noFill/>
+              <a:miter lim="400000"/>
+            </a:ln>
+            <a:effectLst>
+              <a:outerShdw blurRad="50800" dist="12700" rotWithShape="0">
+                <a:srgbClr val="000000">
+                  <a:alpha val="50000"/>
+                </a:srgbClr>
+              </a:outerShdw>
+            </a:effectLst>
+          </p:spPr>
+          <p:txBody>
+            <a:bodyPr wrap="square" lIns="50800" tIns="50800" rIns="50800" bIns="50800" numCol="1" anchor="ctr">
+              <a:noAutofit/>
+            </a:bodyPr>
+            <a:lstStyle/>
+            <a:p>
+              <a:pPr>
+                <a:defRPr sz="2400">
+                  <a:solidFill>
+                    <a:srgbClr val="FFFFFF"/>
+                  </a:solidFill>
+                </a:defRPr>
+              </a:pPr>
+              <a:endParaRPr>
+                <a:solidFill>
+                  <a:srgbClr val="FFFFFF"/>
+                </a:solidFill>
+              </a:endParaRPr>
+            </a:p>
+          </p:txBody>
+        </p:sp>
+        <p:sp>
+          <p:nvSpPr>
+            <p:cNvPr id="13" name="Shape 65"/>
+            <p:cNvSpPr/>
+            <p:nvPr/>
+          </p:nvSpPr>
+          <p:spPr>
+            <a:xfrm>
+              <a:off x="6270081" y="873434"/>
+              <a:ext cx="214291" cy="84371"/>
+            </a:xfrm>
+            <a:prstGeom prst="rect">
+              <a:avLst/>
+            </a:prstGeom>
+            <a:blipFill rotWithShape="1">
+              <a:blip r:embed="rId5"/>
+              <a:srcRect/>
+              <a:tile tx="0" ty="0" sx="100000" sy="100000" flip="none" algn="tl"/>
+            </a:blipFill>
+            <a:ln w="12700" cap="flat">
+              <a:noFill/>
+              <a:miter lim="400000"/>
+            </a:ln>
+            <a:effectLst>
+              <a:outerShdw blurRad="50800" dist="12700" rotWithShape="0">
+                <a:srgbClr val="000000">
+                  <a:alpha val="50000"/>
+                </a:srgbClr>
+              </a:outerShdw>
+            </a:effectLst>
+          </p:spPr>
+          <p:txBody>
+            <a:bodyPr wrap="square" lIns="50800" tIns="50800" rIns="50800" bIns="50800" numCol="1" anchor="ctr">
+              <a:noAutofit/>
+            </a:bodyPr>
+            <a:lstStyle/>
+            <a:p>
+              <a:pPr>
+                <a:defRPr sz="2400">
+                  <a:solidFill>
+                    <a:srgbClr val="FFFFFF"/>
+                  </a:solidFill>
+                </a:defRPr>
+              </a:pPr>
+              <a:endParaRPr>
+                <a:solidFill>
+                  <a:srgbClr val="FFFFFF"/>
+                </a:solidFill>
+              </a:endParaRPr>
+            </a:p>
+          </p:txBody>
+        </p:sp>
+        <p:sp>
+          <p:nvSpPr>
+            <p:cNvPr id="14" name="Shape 66"/>
+            <p:cNvSpPr/>
+            <p:nvPr/>
+          </p:nvSpPr>
+          <p:spPr>
+            <a:xfrm>
+              <a:off x="6524081" y="873434"/>
+              <a:ext cx="214291" cy="84371"/>
+            </a:xfrm>
+            <a:prstGeom prst="rect">
+              <a:avLst/>
+            </a:prstGeom>
+            <a:blipFill rotWithShape="1">
+              <a:blip r:embed="rId5"/>
+              <a:srcRect/>
+              <a:tile tx="0" ty="0" sx="100000" sy="100000" flip="none" algn="tl"/>
+            </a:blipFill>
+            <a:ln w="12700" cap="flat">
+              <a:noFill/>
+              <a:miter lim="400000"/>
+            </a:ln>
+            <a:effectLst>
+              <a:outerShdw blurRad="50800" dist="12700" rotWithShape="0">
+                <a:srgbClr val="000000">
+                  <a:alpha val="50000"/>
+                </a:srgbClr>
+              </a:outerShdw>
+            </a:effectLst>
+          </p:spPr>
+          <p:txBody>
+            <a:bodyPr wrap="square" lIns="50800" tIns="50800" rIns="50800" bIns="50800" numCol="1" anchor="ctr">
+              <a:noAutofit/>
+            </a:bodyPr>
+            <a:lstStyle/>
+            <a:p>
+              <a:pPr>
+                <a:defRPr sz="2400">
+                  <a:solidFill>
+                    <a:srgbClr val="FFFFFF"/>
+                  </a:solidFill>
+                </a:defRPr>
+              </a:pPr>
+              <a:endParaRPr>
+                <a:solidFill>
+                  <a:srgbClr val="FFFFFF"/>
+                </a:solidFill>
+              </a:endParaRPr>
+            </a:p>
+          </p:txBody>
+        </p:sp>
+        <p:sp>
+          <p:nvSpPr>
+            <p:cNvPr id="15" name="Shape 67"/>
+            <p:cNvSpPr/>
+            <p:nvPr/>
+          </p:nvSpPr>
+          <p:spPr>
+            <a:xfrm>
+              <a:off x="6828881" y="873434"/>
+              <a:ext cx="214291" cy="84371"/>
+            </a:xfrm>
+            <a:prstGeom prst="rect">
+              <a:avLst/>
+            </a:prstGeom>
+            <a:blipFill rotWithShape="1">
+              <a:blip r:embed="rId5"/>
+              <a:srcRect/>
+              <a:tile tx="0" ty="0" sx="100000" sy="100000" flip="none" algn="tl"/>
+            </a:blipFill>
+            <a:ln w="12700" cap="flat">
+              <a:noFill/>
+              <a:miter lim="400000"/>
+            </a:ln>
+            <a:effectLst>
+              <a:outerShdw blurRad="50800" dist="12700" rotWithShape="0">
+                <a:srgbClr val="000000">
+                  <a:alpha val="50000"/>
+                </a:srgbClr>
+              </a:outerShdw>
+            </a:effectLst>
+          </p:spPr>
+          <p:txBody>
+            <a:bodyPr wrap="square" lIns="50800" tIns="50800" rIns="50800" bIns="50800" numCol="1" anchor="ctr">
+              <a:noAutofit/>
+            </a:bodyPr>
+            <a:lstStyle/>
+            <a:p>
+              <a:pPr>
+                <a:defRPr sz="2400">
+                  <a:solidFill>
+                    <a:srgbClr val="FFFFFF"/>
+                  </a:solidFill>
+                </a:defRPr>
+              </a:pPr>
+              <a:endParaRPr>
+                <a:solidFill>
+                  <a:srgbClr val="FFFFFF"/>
+                </a:solidFill>
+              </a:endParaRPr>
+            </a:p>
+          </p:txBody>
+        </p:sp>
+        <p:sp>
+          <p:nvSpPr>
+            <p:cNvPr id="16" name="Shape 68"/>
+            <p:cNvSpPr/>
+            <p:nvPr/>
+          </p:nvSpPr>
+          <p:spPr>
+            <a:xfrm>
+              <a:off x="7082881" y="873434"/>
+              <a:ext cx="214291" cy="84371"/>
+            </a:xfrm>
+            <a:prstGeom prst="rect">
+              <a:avLst/>
+            </a:prstGeom>
+            <a:blipFill rotWithShape="1">
+              <a:blip r:embed="rId5"/>
+              <a:srcRect/>
+              <a:tile tx="0" ty="0" sx="100000" sy="100000" flip="none" algn="tl"/>
+            </a:blipFill>
+            <a:ln w="12700" cap="flat">
+              <a:noFill/>
+              <a:miter lim="400000"/>
+            </a:ln>
+            <a:effectLst>
+              <a:outerShdw blurRad="50800" dist="12700" rotWithShape="0">
+                <a:srgbClr val="000000">
+                  <a:alpha val="50000"/>
+                </a:srgbClr>
+              </a:outerShdw>
+            </a:effectLst>
+          </p:spPr>
+          <p:txBody>
+            <a:bodyPr wrap="square" lIns="50800" tIns="50800" rIns="50800" bIns="50800" numCol="1" anchor="ctr">
+              <a:noAutofit/>
+            </a:bodyPr>
+            <a:lstStyle/>
+            <a:p>
+              <a:pPr>
+                <a:defRPr sz="2400">
+                  <a:solidFill>
+                    <a:srgbClr val="FFFFFF"/>
+                  </a:solidFill>
+                </a:defRPr>
+              </a:pPr>
+              <a:endParaRPr>
+                <a:solidFill>
+                  <a:srgbClr val="FFFFFF"/>
+                </a:solidFill>
+              </a:endParaRPr>
+            </a:p>
+          </p:txBody>
+        </p:sp>
+        <p:sp>
+          <p:nvSpPr>
+            <p:cNvPr id="17" name="Shape 69"/>
+            <p:cNvSpPr/>
+            <p:nvPr/>
+          </p:nvSpPr>
+          <p:spPr>
+            <a:xfrm>
+              <a:off x="7400381" y="873434"/>
+              <a:ext cx="214291" cy="84371"/>
+            </a:xfrm>
+            <a:prstGeom prst="rect">
+              <a:avLst/>
+            </a:prstGeom>
+            <a:blipFill rotWithShape="1">
+              <a:blip r:embed="rId5"/>
+              <a:srcRect/>
+              <a:tile tx="0" ty="0" sx="100000" sy="100000" flip="none" algn="tl"/>
+            </a:blipFill>
+            <a:ln w="12700" cap="flat">
+              <a:noFill/>
+              <a:miter lim="400000"/>
+            </a:ln>
+            <a:effectLst>
+              <a:outerShdw blurRad="50800" dist="12700" rotWithShape="0">
+                <a:srgbClr val="000000">
+                  <a:alpha val="50000"/>
+                </a:srgbClr>
+              </a:outerShdw>
+            </a:effectLst>
+          </p:spPr>
+          <p:txBody>
+            <a:bodyPr wrap="square" lIns="50800" tIns="50800" rIns="50800" bIns="50800" numCol="1" anchor="ctr">
+              <a:noAutofit/>
+            </a:bodyPr>
+            <a:lstStyle/>
+            <a:p>
+              <a:pPr>
+                <a:defRPr sz="2400">
+                  <a:solidFill>
+                    <a:srgbClr val="FFFFFF"/>
+                  </a:solidFill>
+                </a:defRPr>
+              </a:pPr>
+              <a:endParaRPr>
+                <a:solidFill>
+                  <a:srgbClr val="FFFFFF"/>
+                </a:solidFill>
+              </a:endParaRPr>
+            </a:p>
+          </p:txBody>
+        </p:sp>
+        <p:sp>
+          <p:nvSpPr>
+            <p:cNvPr id="18" name="Shape 70"/>
+            <p:cNvSpPr/>
+            <p:nvPr/>
+          </p:nvSpPr>
+          <p:spPr>
+            <a:xfrm>
+              <a:off x="7654381" y="873434"/>
+              <a:ext cx="214291" cy="84371"/>
+            </a:xfrm>
+            <a:prstGeom prst="rect">
+              <a:avLst/>
+            </a:prstGeom>
+            <a:blipFill rotWithShape="1">
+              <a:blip r:embed="rId5"/>
+              <a:srcRect/>
+              <a:tile tx="0" ty="0" sx="100000" sy="100000" flip="none" algn="tl"/>
+            </a:blipFill>
+            <a:ln w="12700" cap="flat">
+              <a:noFill/>
+              <a:miter lim="400000"/>
+            </a:ln>
+            <a:effectLst>
+              <a:outerShdw blurRad="50800" dist="12700" rotWithShape="0">
+                <a:srgbClr val="000000">
+                  <a:alpha val="50000"/>
+                </a:srgbClr>
+              </a:outerShdw>
+            </a:effectLst>
+          </p:spPr>
+          <p:txBody>
+            <a:bodyPr wrap="square" lIns="50800" tIns="50800" rIns="50800" bIns="50800" numCol="1" anchor="ctr">
+              <a:noAutofit/>
+            </a:bodyPr>
+            <a:lstStyle/>
+            <a:p>
+              <a:pPr>
+                <a:defRPr sz="2400">
+                  <a:solidFill>
+                    <a:srgbClr val="FFFFFF"/>
+                  </a:solidFill>
+                </a:defRPr>
+              </a:pPr>
+              <a:endParaRPr>
+                <a:solidFill>
+                  <a:srgbClr val="FFFFFF"/>
+                </a:solidFill>
+              </a:endParaRPr>
+            </a:p>
+          </p:txBody>
+        </p:sp>
+        <p:sp>
+          <p:nvSpPr>
+            <p:cNvPr id="19" name="Shape 71"/>
+            <p:cNvSpPr/>
+            <p:nvPr/>
+          </p:nvSpPr>
+          <p:spPr>
+            <a:xfrm flipV="1">
+              <a:off x="5753656" y="955816"/>
+              <a:ext cx="1" cy="343072"/>
+            </a:xfrm>
+            <a:prstGeom prst="line">
+              <a:avLst/>
+            </a:prstGeom>
+            <a:noFill/>
+            <a:ln w="25400" cap="flat">
+              <a:solidFill>
+                <a:srgbClr val="1A931F"/>
+              </a:solidFill>
+              <a:prstDash val="solid"/>
+              <a:miter lim="400000"/>
+              <a:tailEnd type="triangle" w="med" len="med"/>
+            </a:ln>
+            <a:effectLst/>
+          </p:spPr>
+          <p:txBody>
+            <a:bodyPr wrap="square" lIns="0" tIns="0" rIns="0" bIns="0" numCol="1" anchor="ctr">
+              <a:noAutofit/>
+            </a:bodyPr>
+            <a:lstStyle/>
+            <a:p>
+              <a:pPr>
+                <a:defRPr sz="2400"/>
+              </a:pPr>
+              <a:endParaRPr>
+                <a:solidFill>
+                  <a:srgbClr val="000000"/>
+                </a:solidFill>
+              </a:endParaRPr>
+            </a:p>
+          </p:txBody>
+        </p:sp>
+        <p:sp>
+          <p:nvSpPr>
+            <p:cNvPr id="20" name="Shape 72"/>
+            <p:cNvSpPr/>
+            <p:nvPr/>
+          </p:nvSpPr>
+          <p:spPr>
+            <a:xfrm flipV="1">
+              <a:off x="1657536" y="1289045"/>
+              <a:ext cx="4105511" cy="1"/>
+            </a:xfrm>
+            <a:prstGeom prst="line">
+              <a:avLst/>
+            </a:prstGeom>
+            <a:noFill/>
+            <a:ln w="25400" cap="flat">
+              <a:solidFill>
+                <a:srgbClr val="1A931F"/>
+              </a:solidFill>
+              <a:prstDash val="solid"/>
+              <a:miter lim="400000"/>
+            </a:ln>
+            <a:effectLst/>
+          </p:spPr>
+          <p:txBody>
+            <a:bodyPr wrap="square" lIns="0" tIns="0" rIns="0" bIns="0" numCol="1" anchor="ctr">
+              <a:noAutofit/>
+            </a:bodyPr>
+            <a:lstStyle/>
+            <a:p>
+              <a:pPr>
+                <a:defRPr sz="2400"/>
+              </a:pPr>
+              <a:endParaRPr>
+                <a:solidFill>
+                  <a:srgbClr val="000000"/>
+                </a:solidFill>
+              </a:endParaRPr>
+            </a:p>
+          </p:txBody>
+        </p:sp>
+        <p:sp>
+          <p:nvSpPr>
+            <p:cNvPr id="21" name="Shape 73"/>
+            <p:cNvSpPr/>
+            <p:nvPr/>
+          </p:nvSpPr>
+          <p:spPr>
+            <a:xfrm flipV="1">
+              <a:off x="6377226" y="941814"/>
+              <a:ext cx="1" cy="1433619"/>
+            </a:xfrm>
+            <a:prstGeom prst="line">
+              <a:avLst/>
+            </a:prstGeom>
+            <a:noFill/>
+            <a:ln w="25400" cap="flat">
+              <a:solidFill>
+                <a:srgbClr val="1A931F"/>
+              </a:solidFill>
+              <a:prstDash val="solid"/>
+              <a:miter lim="400000"/>
+              <a:tailEnd type="triangle" w="med" len="med"/>
+            </a:ln>
+            <a:effectLst/>
+          </p:spPr>
+          <p:txBody>
+            <a:bodyPr wrap="square" lIns="0" tIns="0" rIns="0" bIns="0" numCol="1" anchor="ctr">
+              <a:noAutofit/>
+            </a:bodyPr>
+            <a:lstStyle/>
+            <a:p>
+              <a:pPr>
+                <a:defRPr sz="2400"/>
+              </a:pPr>
+              <a:endParaRPr>
+                <a:solidFill>
+                  <a:srgbClr val="000000"/>
+                </a:solidFill>
+              </a:endParaRPr>
+            </a:p>
+          </p:txBody>
+        </p:sp>
+        <p:sp>
+          <p:nvSpPr>
+            <p:cNvPr id="22" name="Shape 74"/>
+            <p:cNvSpPr/>
+            <p:nvPr/>
+          </p:nvSpPr>
+          <p:spPr>
+            <a:xfrm>
+              <a:off x="1682936" y="2355845"/>
+              <a:ext cx="4691454" cy="1"/>
+            </a:xfrm>
+            <a:prstGeom prst="line">
+              <a:avLst/>
+            </a:prstGeom>
+            <a:noFill/>
+            <a:ln w="25400" cap="flat">
+              <a:solidFill>
+                <a:srgbClr val="1A931F"/>
+              </a:solidFill>
+              <a:prstDash val="solid"/>
+              <a:miter lim="400000"/>
+            </a:ln>
+            <a:effectLst/>
+          </p:spPr>
+          <p:txBody>
+            <a:bodyPr wrap="square" lIns="0" tIns="0" rIns="0" bIns="0" numCol="1" anchor="ctr">
+              <a:noAutofit/>
+            </a:bodyPr>
+            <a:lstStyle/>
+            <a:p>
+              <a:pPr>
+                <a:defRPr sz="2400"/>
+              </a:pPr>
+              <a:endParaRPr>
+                <a:solidFill>
+                  <a:srgbClr val="000000"/>
+                </a:solidFill>
+              </a:endParaRPr>
+            </a:p>
+          </p:txBody>
+        </p:sp>
+        <p:sp>
+          <p:nvSpPr>
+            <p:cNvPr id="23" name="Shape 75"/>
+            <p:cNvSpPr/>
+            <p:nvPr/>
+          </p:nvSpPr>
+          <p:spPr>
+            <a:xfrm flipV="1">
+              <a:off x="6633534" y="941814"/>
+              <a:ext cx="1" cy="3425776"/>
+            </a:xfrm>
+            <a:prstGeom prst="line">
+              <a:avLst/>
+            </a:prstGeom>
+            <a:noFill/>
+            <a:ln w="25400" cap="flat">
+              <a:solidFill>
+                <a:srgbClr val="1A931F"/>
+              </a:solidFill>
+              <a:prstDash val="solid"/>
+              <a:miter lim="400000"/>
+              <a:tailEnd type="triangle" w="med" len="med"/>
+            </a:ln>
+            <a:effectLst/>
+          </p:spPr>
+          <p:txBody>
+            <a:bodyPr wrap="square" lIns="0" tIns="0" rIns="0" bIns="0" numCol="1" anchor="ctr">
+              <a:noAutofit/>
+            </a:bodyPr>
+            <a:lstStyle/>
+            <a:p>
+              <a:pPr>
+                <a:defRPr sz="2400"/>
+              </a:pPr>
+              <a:endParaRPr>
+                <a:solidFill>
+                  <a:srgbClr val="000000"/>
+                </a:solidFill>
+              </a:endParaRPr>
+            </a:p>
+          </p:txBody>
+        </p:sp>
+        <p:sp>
+          <p:nvSpPr>
+            <p:cNvPr id="24" name="Shape 76"/>
+            <p:cNvSpPr/>
+            <p:nvPr/>
+          </p:nvSpPr>
+          <p:spPr>
+            <a:xfrm>
+              <a:off x="1651037" y="4363710"/>
+              <a:ext cx="4989910" cy="1"/>
+            </a:xfrm>
+            <a:prstGeom prst="line">
+              <a:avLst/>
+            </a:prstGeom>
+            <a:noFill/>
+            <a:ln w="25400" cap="flat">
+              <a:solidFill>
+                <a:srgbClr val="1A931F"/>
+              </a:solidFill>
+              <a:prstDash val="solid"/>
+              <a:miter lim="400000"/>
+            </a:ln>
+            <a:effectLst/>
+          </p:spPr>
+          <p:txBody>
+            <a:bodyPr wrap="square" lIns="0" tIns="0" rIns="0" bIns="0" numCol="1" anchor="ctr">
+              <a:noAutofit/>
+            </a:bodyPr>
+            <a:lstStyle/>
+            <a:p>
+              <a:pPr>
+                <a:defRPr sz="2400"/>
+              </a:pPr>
+              <a:endParaRPr>
+                <a:solidFill>
+                  <a:srgbClr val="000000"/>
+                </a:solidFill>
+              </a:endParaRPr>
+            </a:p>
+          </p:txBody>
+        </p:sp>
+        <p:sp>
+          <p:nvSpPr>
+            <p:cNvPr id="25" name="Shape 77"/>
+            <p:cNvSpPr/>
+            <p:nvPr/>
+          </p:nvSpPr>
+          <p:spPr>
+            <a:xfrm flipV="1">
+              <a:off x="6935951" y="937109"/>
+              <a:ext cx="1" cy="4331292"/>
+            </a:xfrm>
+            <a:prstGeom prst="line">
+              <a:avLst/>
+            </a:prstGeom>
+            <a:noFill/>
+            <a:ln w="25400" cap="flat">
+              <a:solidFill>
+                <a:srgbClr val="1A931F"/>
+              </a:solidFill>
+              <a:prstDash val="solid"/>
+              <a:miter lim="400000"/>
+              <a:tailEnd type="triangle" w="med" len="med"/>
+            </a:ln>
+            <a:effectLst/>
+          </p:spPr>
+          <p:txBody>
+            <a:bodyPr wrap="square" lIns="0" tIns="0" rIns="0" bIns="0" numCol="1" anchor="ctr">
+              <a:noAutofit/>
+            </a:bodyPr>
+            <a:lstStyle/>
+            <a:p>
+              <a:pPr>
+                <a:defRPr sz="2400"/>
+              </a:pPr>
+              <a:endParaRPr>
+                <a:solidFill>
+                  <a:srgbClr val="000000"/>
+                </a:solidFill>
+              </a:endParaRPr>
+            </a:p>
+          </p:txBody>
+        </p:sp>
+        <p:sp>
+          <p:nvSpPr>
+            <p:cNvPr id="26" name="Shape 78"/>
+            <p:cNvSpPr/>
+            <p:nvPr/>
+          </p:nvSpPr>
+          <p:spPr>
+            <a:xfrm>
+              <a:off x="1651037" y="5265328"/>
+              <a:ext cx="5294838" cy="1"/>
+            </a:xfrm>
+            <a:prstGeom prst="line">
+              <a:avLst/>
+            </a:prstGeom>
+            <a:noFill/>
+            <a:ln w="25400" cap="flat">
+              <a:solidFill>
+                <a:srgbClr val="1A931F"/>
+              </a:solidFill>
+              <a:prstDash val="solid"/>
+              <a:miter lim="400000"/>
+            </a:ln>
+            <a:effectLst/>
+          </p:spPr>
+          <p:txBody>
+            <a:bodyPr wrap="square" lIns="0" tIns="0" rIns="0" bIns="0" numCol="1" anchor="ctr">
+              <a:noAutofit/>
+            </a:bodyPr>
+            <a:lstStyle/>
+            <a:p>
+              <a:pPr>
+                <a:defRPr sz="2400"/>
+              </a:pPr>
+              <a:endParaRPr>
+                <a:solidFill>
+                  <a:srgbClr val="000000"/>
+                </a:solidFill>
+              </a:endParaRPr>
+            </a:p>
+          </p:txBody>
+        </p:sp>
+        <p:sp>
+          <p:nvSpPr>
+            <p:cNvPr id="27" name="Shape 79"/>
+            <p:cNvSpPr/>
+            <p:nvPr/>
+          </p:nvSpPr>
+          <p:spPr>
+            <a:xfrm flipV="1">
+              <a:off x="7188760" y="930448"/>
+              <a:ext cx="1" cy="5391906"/>
+            </a:xfrm>
+            <a:prstGeom prst="line">
+              <a:avLst/>
+            </a:prstGeom>
+            <a:noFill/>
+            <a:ln w="25400" cap="flat">
+              <a:solidFill>
+                <a:srgbClr val="1A931F"/>
+              </a:solidFill>
+              <a:prstDash val="solid"/>
+              <a:miter lim="400000"/>
+              <a:tailEnd type="triangle" w="med" len="med"/>
+            </a:ln>
+            <a:effectLst/>
+          </p:spPr>
+          <p:txBody>
+            <a:bodyPr wrap="square" lIns="0" tIns="0" rIns="0" bIns="0" numCol="1" anchor="ctr">
+              <a:noAutofit/>
+            </a:bodyPr>
+            <a:lstStyle/>
+            <a:p>
+              <a:pPr>
+                <a:defRPr sz="2400"/>
+              </a:pPr>
+              <a:endParaRPr>
+                <a:solidFill>
+                  <a:srgbClr val="000000"/>
+                </a:solidFill>
+              </a:endParaRPr>
+            </a:p>
+          </p:txBody>
+        </p:sp>
+        <p:sp>
+          <p:nvSpPr>
+            <p:cNvPr id="28" name="Shape 80"/>
+            <p:cNvSpPr/>
+            <p:nvPr/>
+          </p:nvSpPr>
+          <p:spPr>
+            <a:xfrm>
+              <a:off x="1689627" y="6317081"/>
+              <a:ext cx="5497814" cy="1"/>
+            </a:xfrm>
+            <a:prstGeom prst="line">
+              <a:avLst/>
+            </a:prstGeom>
+            <a:noFill/>
+            <a:ln w="25400" cap="flat">
+              <a:solidFill>
+                <a:srgbClr val="1A931F"/>
+              </a:solidFill>
+              <a:prstDash val="solid"/>
+              <a:miter lim="400000"/>
+            </a:ln>
+            <a:effectLst/>
+          </p:spPr>
+          <p:txBody>
+            <a:bodyPr wrap="square" lIns="0" tIns="0" rIns="0" bIns="0" numCol="1" anchor="ctr">
+              <a:noAutofit/>
+            </a:bodyPr>
+            <a:lstStyle/>
+            <a:p>
+              <a:pPr>
+                <a:defRPr sz="2400"/>
+              </a:pPr>
+              <a:endParaRPr>
+                <a:solidFill>
+                  <a:srgbClr val="000000"/>
+                </a:solidFill>
+              </a:endParaRPr>
+            </a:p>
+          </p:txBody>
+        </p:sp>
+      </p:grpSp>
+      <p:sp>
+        <p:nvSpPr>
+          <p:cNvPr id="36" name="Shape 82"/>
+          <p:cNvSpPr/>
+          <p:nvPr/>
+        </p:nvSpPr>
+        <p:spPr>
+          <a:xfrm>
+            <a:off x="6212809" y="4476058"/>
+            <a:ext cx="886461" cy="533479"/>
+          </a:xfrm>
+          <a:prstGeom prst="rect">
+            <a:avLst/>
+          </a:prstGeom>
+          <a:ln w="12700">
+            <a:miter lim="400000"/>
+          </a:ln>
+          <a:extLst>
+            <a:ext uri="{C572A759-6A51-4108-AA02-DFA0A04FC94B}">
+              <ma14:wrappingTextBoxFlag xmlns="" xmlns:ma14="http://schemas.microsoft.com/office/mac/drawingml/2011/main" val="1"/>
+            </a:ext>
+          </a:extLst>
+        </p:spPr>
+        <p:txBody>
+          <a:bodyPr wrap="none" lIns="50800" tIns="50800" rIns="50800" bIns="50800" anchor="ctr">
+            <a:spAutoFit/>
+          </a:bodyPr>
+          <a:lstStyle>
+            <a:lvl1pPr>
+              <a:defRPr b="1">
+                <a:solidFill>
+                  <a:srgbClr val="00882B"/>
+                </a:solidFill>
+              </a:defRPr>
+            </a:lvl1pPr>
+          </a:lstStyle>
+          <a:p>
+            <a:pPr>
+              <a:defRPr sz="1800" b="0">
+                <a:solidFill>
+                  <a:srgbClr val="000000"/>
+                </a:solidFill>
+              </a:defRPr>
+            </a:pPr>
+            <a:r>
+              <a:rPr sz="2800" dirty="0"/>
+              <a:t>Etc..</a:t>
+            </a:r>
+          </a:p>
+        </p:txBody>
+      </p:sp>
+    </p:spTree>
+    <p:extLst>
+      <p:ext uri="{BB962C8B-B14F-4D97-AF65-F5344CB8AC3E}">
+        <p14:creationId xmlns:p14="http://schemas.microsoft.com/office/powerpoint/2010/main" val="185891393"/>
       </p:ext>
     </p:extLst>
   </p:cSld>
@@ -12373,8 +16441,12 @@
           <a:lstStyle/>
           <a:p>
             <a:r>
+              <a:rPr lang="nl-NL" dirty="0" err="1" smtClean="0"/>
+              <a:t>Main</a:t>
+            </a:r>
+            <a:r>
               <a:rPr lang="nl-NL" dirty="0" smtClean="0"/>
-              <a:t>Alarm module</a:t>
+              <a:t> controller</a:t>
             </a:r>
             <a:endParaRPr lang="nl-NL" dirty="0"/>
           </a:p>
@@ -12383,13 +16455,20 @@
     </p:spTree>
     <p:extLst>
       <p:ext uri="{BB962C8B-B14F-4D97-AF65-F5344CB8AC3E}">
-        <p14:creationId xmlns:p14="http://schemas.microsoft.com/office/powerpoint/2010/main" val="1580779184"/>
+        <p14:creationId xmlns:p14="http://schemas.microsoft.com/office/powerpoint/2010/main" val="1952424736"/>
       </p:ext>
     </p:extLst>
   </p:cSld>
   <p:clrMapOvr>
     <a:masterClrMapping/>
   </p:clrMapOvr>
+  <p:timing>
+    <p:tnLst>
+      <p:par>
+        <p:cTn id="1" dur="indefinite" restart="never" nodeType="tmRoot"/>
+      </p:par>
+    </p:tnLst>
+  </p:timing>
 </p:sld>
 </file>
 
@@ -12412,7 +16491,7 @@
       </p:grpSpPr>
       <p:sp>
         <p:nvSpPr>
-          <p:cNvPr id="2" name="Titel 1"/>
+          <p:cNvPr id="4098" name="Title 3"/>
           <p:cNvSpPr>
             <a:spLocks noGrp="1"/>
           </p:cNvSpPr>
@@ -12420,26 +16499,206 @@
             <p:ph type="title"/>
           </p:nvPr>
         </p:nvSpPr>
-        <p:spPr/>
+        <p:spPr>
+          <a:xfrm>
+            <a:off x="917575" y="457200"/>
+            <a:ext cx="7159625" cy="627063"/>
+          </a:xfrm>
+        </p:spPr>
         <p:txBody>
           <a:bodyPr/>
           <a:lstStyle/>
           <a:p>
-            <a:r>
-              <a:rPr lang="nl-NL" dirty="0" smtClean="0">
+            <a:pPr>
+              <a:defRPr/>
+            </a:pPr>
+            <a:r>
+              <a:rPr lang="nl-NL" altLang="nl-NL" dirty="0" err="1" smtClean="0">
                 <a:latin typeface="+mn-lt"/>
+                <a:ea typeface="ＭＳ Ｐゴシック" pitchFamily="34" charset="-128"/>
               </a:rPr>
-              <a:t>Totaal</a:t>
-            </a:r>
-            <a:endParaRPr lang="nl-NL" dirty="0">
+              <a:t>Main</a:t>
+            </a:r>
+            <a:r>
+              <a:rPr lang="nl-NL" altLang="nl-NL" dirty="0" smtClean="0">
+                <a:latin typeface="+mn-lt"/>
+                <a:ea typeface="ＭＳ Ｐゴシック" pitchFamily="34" charset="-128"/>
+              </a:rPr>
+              <a:t> controller</a:t>
+            </a:r>
+            <a:endParaRPr lang="nl-NL" altLang="nl-NL" dirty="0" smtClean="0">
               <a:latin typeface="+mn-lt"/>
+              <a:ea typeface="ＭＳ Ｐゴシック" pitchFamily="34" charset="-128"/>
+            </a:endParaRPr>
+          </a:p>
+        </p:txBody>
+      </p:sp>
+      <p:sp>
+        <p:nvSpPr>
+          <p:cNvPr id="6" name="Ondertitel 2"/>
+          <p:cNvSpPr txBox="1">
+            <a:spLocks/>
+          </p:cNvSpPr>
+          <p:nvPr/>
+        </p:nvSpPr>
+        <p:spPr bwMode="auto">
+          <a:xfrm>
+            <a:off x="914400" y="1041400"/>
+            <a:ext cx="6781800" cy="474663"/>
+          </a:xfrm>
+          <a:prstGeom prst="rect">
+            <a:avLst/>
+          </a:prstGeom>
+          <a:noFill/>
+          <a:ln w="9525">
+            <a:noFill/>
+            <a:miter lim="800000"/>
+            <a:headEnd/>
+            <a:tailEnd/>
+          </a:ln>
+        </p:spPr>
+        <p:txBody>
+          <a:bodyPr lIns="0" tIns="0" rIns="0" bIns="0"/>
+          <a:lstStyle>
+            <a:lvl1pPr eaLnBrk="0" hangingPunct="0">
+              <a:defRPr sz="2400">
+                <a:solidFill>
+                  <a:schemeClr val="tx1"/>
+                </a:solidFill>
+                <a:latin typeface="Tahoma" charset="0"/>
+                <a:cs typeface="Arial" charset="0"/>
+              </a:defRPr>
+            </a:lvl1pPr>
+            <a:lvl2pPr marL="37931725" indent="-37474525" eaLnBrk="0" hangingPunct="0">
+              <a:defRPr sz="2400">
+                <a:solidFill>
+                  <a:schemeClr val="tx1"/>
+                </a:solidFill>
+                <a:latin typeface="Tahoma" charset="0"/>
+                <a:cs typeface="Arial" charset="0"/>
+              </a:defRPr>
+            </a:lvl2pPr>
+            <a:lvl3pPr eaLnBrk="0" hangingPunct="0">
+              <a:defRPr sz="2400">
+                <a:solidFill>
+                  <a:schemeClr val="tx1"/>
+                </a:solidFill>
+                <a:latin typeface="Tahoma" charset="0"/>
+                <a:cs typeface="Arial" charset="0"/>
+              </a:defRPr>
+            </a:lvl3pPr>
+            <a:lvl4pPr eaLnBrk="0" hangingPunct="0">
+              <a:defRPr sz="2400">
+                <a:solidFill>
+                  <a:schemeClr val="tx1"/>
+                </a:solidFill>
+                <a:latin typeface="Tahoma" charset="0"/>
+                <a:cs typeface="Arial" charset="0"/>
+              </a:defRPr>
+            </a:lvl4pPr>
+            <a:lvl5pPr eaLnBrk="0" hangingPunct="0">
+              <a:defRPr sz="2400">
+                <a:solidFill>
+                  <a:schemeClr val="tx1"/>
+                </a:solidFill>
+                <a:latin typeface="Tahoma" charset="0"/>
+                <a:cs typeface="Arial" charset="0"/>
+              </a:defRPr>
+            </a:lvl5pPr>
+            <a:lvl6pPr marL="457200" eaLnBrk="0" fontAlgn="base" hangingPunct="0">
+              <a:spcBef>
+                <a:spcPct val="0"/>
+              </a:spcBef>
+              <a:spcAft>
+                <a:spcPct val="0"/>
+              </a:spcAft>
+              <a:defRPr sz="2400">
+                <a:solidFill>
+                  <a:schemeClr val="tx1"/>
+                </a:solidFill>
+                <a:latin typeface="Tahoma" charset="0"/>
+                <a:cs typeface="Arial" charset="0"/>
+              </a:defRPr>
+            </a:lvl6pPr>
+            <a:lvl7pPr marL="914400" eaLnBrk="0" fontAlgn="base" hangingPunct="0">
+              <a:spcBef>
+                <a:spcPct val="0"/>
+              </a:spcBef>
+              <a:spcAft>
+                <a:spcPct val="0"/>
+              </a:spcAft>
+              <a:defRPr sz="2400">
+                <a:solidFill>
+                  <a:schemeClr val="tx1"/>
+                </a:solidFill>
+                <a:latin typeface="Tahoma" charset="0"/>
+                <a:cs typeface="Arial" charset="0"/>
+              </a:defRPr>
+            </a:lvl7pPr>
+            <a:lvl8pPr marL="1371600" eaLnBrk="0" fontAlgn="base" hangingPunct="0">
+              <a:spcBef>
+                <a:spcPct val="0"/>
+              </a:spcBef>
+              <a:spcAft>
+                <a:spcPct val="0"/>
+              </a:spcAft>
+              <a:defRPr sz="2400">
+                <a:solidFill>
+                  <a:schemeClr val="tx1"/>
+                </a:solidFill>
+                <a:latin typeface="Tahoma" charset="0"/>
+                <a:cs typeface="Arial" charset="0"/>
+              </a:defRPr>
+            </a:lvl8pPr>
+            <a:lvl9pPr marL="1828800" eaLnBrk="0" fontAlgn="base" hangingPunct="0">
+              <a:spcBef>
+                <a:spcPct val="0"/>
+              </a:spcBef>
+              <a:spcAft>
+                <a:spcPct val="0"/>
+              </a:spcAft>
+              <a:defRPr sz="2400">
+                <a:solidFill>
+                  <a:schemeClr val="tx1"/>
+                </a:solidFill>
+                <a:latin typeface="Tahoma" charset="0"/>
+                <a:cs typeface="Arial" charset="0"/>
+              </a:defRPr>
+            </a:lvl9pPr>
+          </a:lstStyle>
+          <a:p>
+            <a:pPr algn="l">
+              <a:lnSpc>
+                <a:spcPts val="2500"/>
+              </a:lnSpc>
+              <a:buClr>
+                <a:srgbClr val="00A6D6"/>
+              </a:buClr>
+              <a:defRPr/>
+            </a:pPr>
+            <a:r>
+              <a:rPr lang="nl-NL" altLang="nl-NL" sz="2000" dirty="0" smtClean="0">
+                <a:solidFill>
+                  <a:srgbClr val="00A6D6"/>
+                </a:solidFill>
+                <a:latin typeface="+mn-lt"/>
+                <a:ea typeface="ＭＳ Ｐゴシック" charset="-128"/>
+              </a:rPr>
+              <a:t>Blokdiagram</a:t>
+            </a:r>
+            <a:endParaRPr lang="nl-NL" altLang="nl-NL" sz="2000" dirty="0" smtClean="0">
+              <a:solidFill>
+                <a:srgbClr val="00A6D6"/>
+              </a:solidFill>
+              <a:latin typeface="+mn-lt"/>
+              <a:ea typeface="ＭＳ Ｐゴシック" charset="-128"/>
             </a:endParaRPr>
           </a:p>
         </p:txBody>
       </p:sp>
       <p:pic>
         <p:nvPicPr>
-          <p:cNvPr id="6" name="Tijdelijke aanduiding voor inhoud 5"/>
+          <p:cNvPr id="97" name="Content Placeholder 1" descr="controller.png"/>
           <p:cNvPicPr>
             <a:picLocks noGrp="1" noChangeAspect="1"/>
           </p:cNvPicPr>
@@ -12455,21 +16714,22 @@
               </a:ext>
             </a:extLst>
           </a:blip>
+          <a:srcRect t="-43" b="41680"/>
           <a:stretch>
             <a:fillRect/>
           </a:stretch>
         </p:blipFill>
         <p:spPr>
           <a:xfrm>
-            <a:off x="153448" y="2238233"/>
-            <a:ext cx="8990552" cy="3745381"/>
+            <a:off x="1952625" y="1673225"/>
+            <a:ext cx="5320690" cy="4388402"/>
           </a:xfrm>
         </p:spPr>
       </p:pic>
     </p:spTree>
     <p:extLst>
       <p:ext uri="{BB962C8B-B14F-4D97-AF65-F5344CB8AC3E}">
-        <p14:creationId xmlns:p14="http://schemas.microsoft.com/office/powerpoint/2010/main" val="2638307415"/>
+        <p14:creationId xmlns:p14="http://schemas.microsoft.com/office/powerpoint/2010/main" val="2942164064"/>
       </p:ext>
     </p:extLst>
   </p:cSld>
@@ -12527,44 +16787,26 @@
               <a:defRPr/>
             </a:pPr>
             <a:r>
+              <a:rPr lang="nl-NL" altLang="nl-NL" dirty="0" err="1" smtClean="0">
+                <a:latin typeface="+mn-lt"/>
+                <a:ea typeface="ＭＳ Ｐゴシック" pitchFamily="34" charset="-128"/>
+              </a:rPr>
+              <a:t>Main</a:t>
+            </a:r>
+            <a:r>
               <a:rPr lang="nl-NL" altLang="nl-NL" dirty="0" smtClean="0">
                 <a:latin typeface="+mn-lt"/>
                 <a:ea typeface="ＭＳ Ｐゴシック" pitchFamily="34" charset="-128"/>
               </a:rPr>
-              <a:t>FSM</a:t>
-            </a:r>
+              <a:t> controller</a:t>
+            </a:r>
+            <a:endParaRPr lang="nl-NL" altLang="nl-NL" dirty="0" smtClean="0">
+              <a:latin typeface="+mn-lt"/>
+              <a:ea typeface="ＭＳ Ｐゴシック" pitchFamily="34" charset="-128"/>
+            </a:endParaRPr>
           </a:p>
         </p:txBody>
       </p:sp>
-      <p:pic>
-        <p:nvPicPr>
-          <p:cNvPr id="2" name="Tijdelijke aanduiding voor inhoud 1"/>
-          <p:cNvPicPr>
-            <a:picLocks noGrp="1" noChangeAspect="1"/>
-          </p:cNvPicPr>
-          <p:nvPr>
-            <p:ph idx="1"/>
-          </p:nvPr>
-        </p:nvPicPr>
-        <p:blipFill>
-          <a:blip r:embed="rId2">
-            <a:extLst>
-              <a:ext uri="{28A0092B-C50C-407E-A947-70E740481C1C}">
-                <a14:useLocalDpi xmlns:a14="http://schemas.microsoft.com/office/drawing/2010/main" val="0"/>
-              </a:ext>
-            </a:extLst>
-          </a:blip>
-          <a:stretch>
-            <a:fillRect/>
-          </a:stretch>
-        </p:blipFill>
-        <p:spPr>
-          <a:xfrm>
-            <a:off x="532263" y="1316251"/>
-            <a:ext cx="7789246" cy="4646400"/>
-          </a:xfrm>
-        </p:spPr>
-      </p:pic>
       <p:sp>
         <p:nvSpPr>
           <p:cNvPr id="6" name="Ondertitel 2"/>
@@ -12708,6 +16950,16 @@
               </a:buClr>
               <a:defRPr/>
             </a:pPr>
+            <a:r>
+              <a:rPr lang="nl-NL" altLang="nl-NL" sz="2000" dirty="0" smtClean="0">
+                <a:solidFill>
+                  <a:srgbClr val="00A6D6"/>
+                </a:solidFill>
+                <a:latin typeface="+mn-lt"/>
+                <a:ea typeface="ＭＳ Ｐゴシック" charset="-128"/>
+              </a:rPr>
+              <a:t>Buffer</a:t>
+            </a:r>
             <a:endParaRPr lang="nl-NL" altLang="nl-NL" sz="2000" dirty="0" smtClean="0">
               <a:solidFill>
                 <a:srgbClr val="00A6D6"/>
@@ -12718,10 +16970,57 @@
           </a:p>
         </p:txBody>
       </p:sp>
+      <p:sp>
+        <p:nvSpPr>
+          <p:cNvPr id="8" name="Content Placeholder 4"/>
+          <p:cNvSpPr>
+            <a:spLocks noGrp="1"/>
+          </p:cNvSpPr>
+          <p:nvPr>
+            <p:ph idx="1"/>
+          </p:nvPr>
+        </p:nvSpPr>
+        <p:spPr/>
+        <p:txBody>
+          <a:bodyPr/>
+          <a:lstStyle/>
+          <a:p>
+            <a:r>
+              <a:rPr lang="nl-NL" altLang="nl-NL" dirty="0">
+                <a:ea typeface="Tahoma"/>
+                <a:cs typeface="Tahoma"/>
+              </a:rPr>
+              <a:t> Ingedrukt houden van knoppen</a:t>
+            </a:r>
+          </a:p>
+          <a:p>
+            <a:r>
+              <a:rPr lang="nl-NL" altLang="nl-NL" dirty="0">
+                <a:ea typeface="Tahoma"/>
+                <a:cs typeface="Tahoma"/>
+              </a:rPr>
+              <a:t> Meerdere knoppen tegelijk indrukken</a:t>
+            </a:r>
+          </a:p>
+          <a:p>
+            <a:r>
+              <a:rPr lang="nl-NL" altLang="nl-NL" dirty="0">
+                <a:solidFill>
+                  <a:srgbClr val="000000"/>
+                </a:solidFill>
+                <a:latin typeface="Tahoma"/>
+                <a:ea typeface="Tahoma"/>
+                <a:cs typeface="Tahoma"/>
+              </a:rPr>
+              <a:t> Rekening houden met imperfecties van input</a:t>
+            </a:r>
+          </a:p>
+        </p:txBody>
+      </p:sp>
     </p:spTree>
     <p:extLst>
       <p:ext uri="{BB962C8B-B14F-4D97-AF65-F5344CB8AC3E}">
-        <p14:creationId xmlns:p14="http://schemas.microsoft.com/office/powerpoint/2010/main" val="205514984"/>
+        <p14:creationId xmlns:p14="http://schemas.microsoft.com/office/powerpoint/2010/main" val="388637402"/>
       </p:ext>
     </p:extLst>
   </p:cSld>
@@ -12757,7 +17056,7 @@
       </p:grpSpPr>
       <p:sp>
         <p:nvSpPr>
-          <p:cNvPr id="2" name="Titel 1"/>
+          <p:cNvPr id="4098" name="Title 3"/>
           <p:cNvSpPr>
             <a:spLocks noGrp="1"/>
           </p:cNvSpPr>
@@ -12765,56 +17064,261 @@
             <p:ph type="title"/>
           </p:nvPr>
         </p:nvSpPr>
+        <p:spPr>
+          <a:xfrm>
+            <a:off x="917575" y="457200"/>
+            <a:ext cx="7159625" cy="627063"/>
+          </a:xfrm>
+        </p:spPr>
+        <p:txBody>
+          <a:bodyPr/>
+          <a:lstStyle/>
+          <a:p>
+            <a:pPr>
+              <a:defRPr/>
+            </a:pPr>
+            <a:r>
+              <a:rPr lang="nl-NL" altLang="nl-NL" dirty="0" err="1" smtClean="0">
+                <a:latin typeface="+mn-lt"/>
+                <a:ea typeface="ＭＳ Ｐゴシック" pitchFamily="34" charset="-128"/>
+              </a:rPr>
+              <a:t>Main</a:t>
+            </a:r>
+            <a:r>
+              <a:rPr lang="nl-NL" altLang="nl-NL" dirty="0" smtClean="0">
+                <a:latin typeface="+mn-lt"/>
+                <a:ea typeface="ＭＳ Ｐゴシック" pitchFamily="34" charset="-128"/>
+              </a:rPr>
+              <a:t> controller</a:t>
+            </a:r>
+            <a:endParaRPr lang="nl-NL" altLang="nl-NL" dirty="0" smtClean="0">
+              <a:latin typeface="+mn-lt"/>
+              <a:ea typeface="ＭＳ Ｐゴシック" pitchFamily="34" charset="-128"/>
+            </a:endParaRPr>
+          </a:p>
+        </p:txBody>
+      </p:sp>
+      <p:sp>
+        <p:nvSpPr>
+          <p:cNvPr id="6" name="Ondertitel 2"/>
+          <p:cNvSpPr txBox="1">
+            <a:spLocks/>
+          </p:cNvSpPr>
+          <p:nvPr/>
+        </p:nvSpPr>
+        <p:spPr bwMode="auto">
+          <a:xfrm>
+            <a:off x="914400" y="1041400"/>
+            <a:ext cx="6781800" cy="474663"/>
+          </a:xfrm>
+          <a:prstGeom prst="rect">
+            <a:avLst/>
+          </a:prstGeom>
+          <a:noFill/>
+          <a:ln w="9525">
+            <a:noFill/>
+            <a:miter lim="800000"/>
+            <a:headEnd/>
+            <a:tailEnd/>
+          </a:ln>
+        </p:spPr>
+        <p:txBody>
+          <a:bodyPr lIns="0" tIns="0" rIns="0" bIns="0"/>
+          <a:lstStyle>
+            <a:lvl1pPr eaLnBrk="0" hangingPunct="0">
+              <a:defRPr sz="2400">
+                <a:solidFill>
+                  <a:schemeClr val="tx1"/>
+                </a:solidFill>
+                <a:latin typeface="Tahoma" charset="0"/>
+                <a:cs typeface="Arial" charset="0"/>
+              </a:defRPr>
+            </a:lvl1pPr>
+            <a:lvl2pPr marL="37931725" indent="-37474525" eaLnBrk="0" hangingPunct="0">
+              <a:defRPr sz="2400">
+                <a:solidFill>
+                  <a:schemeClr val="tx1"/>
+                </a:solidFill>
+                <a:latin typeface="Tahoma" charset="0"/>
+                <a:cs typeface="Arial" charset="0"/>
+              </a:defRPr>
+            </a:lvl2pPr>
+            <a:lvl3pPr eaLnBrk="0" hangingPunct="0">
+              <a:defRPr sz="2400">
+                <a:solidFill>
+                  <a:schemeClr val="tx1"/>
+                </a:solidFill>
+                <a:latin typeface="Tahoma" charset="0"/>
+                <a:cs typeface="Arial" charset="0"/>
+              </a:defRPr>
+            </a:lvl3pPr>
+            <a:lvl4pPr eaLnBrk="0" hangingPunct="0">
+              <a:defRPr sz="2400">
+                <a:solidFill>
+                  <a:schemeClr val="tx1"/>
+                </a:solidFill>
+                <a:latin typeface="Tahoma" charset="0"/>
+                <a:cs typeface="Arial" charset="0"/>
+              </a:defRPr>
+            </a:lvl4pPr>
+            <a:lvl5pPr eaLnBrk="0" hangingPunct="0">
+              <a:defRPr sz="2400">
+                <a:solidFill>
+                  <a:schemeClr val="tx1"/>
+                </a:solidFill>
+                <a:latin typeface="Tahoma" charset="0"/>
+                <a:cs typeface="Arial" charset="0"/>
+              </a:defRPr>
+            </a:lvl5pPr>
+            <a:lvl6pPr marL="457200" eaLnBrk="0" fontAlgn="base" hangingPunct="0">
+              <a:spcBef>
+                <a:spcPct val="0"/>
+              </a:spcBef>
+              <a:spcAft>
+                <a:spcPct val="0"/>
+              </a:spcAft>
+              <a:defRPr sz="2400">
+                <a:solidFill>
+                  <a:schemeClr val="tx1"/>
+                </a:solidFill>
+                <a:latin typeface="Tahoma" charset="0"/>
+                <a:cs typeface="Arial" charset="0"/>
+              </a:defRPr>
+            </a:lvl6pPr>
+            <a:lvl7pPr marL="914400" eaLnBrk="0" fontAlgn="base" hangingPunct="0">
+              <a:spcBef>
+                <a:spcPct val="0"/>
+              </a:spcBef>
+              <a:spcAft>
+                <a:spcPct val="0"/>
+              </a:spcAft>
+              <a:defRPr sz="2400">
+                <a:solidFill>
+                  <a:schemeClr val="tx1"/>
+                </a:solidFill>
+                <a:latin typeface="Tahoma" charset="0"/>
+                <a:cs typeface="Arial" charset="0"/>
+              </a:defRPr>
+            </a:lvl7pPr>
+            <a:lvl8pPr marL="1371600" eaLnBrk="0" fontAlgn="base" hangingPunct="0">
+              <a:spcBef>
+                <a:spcPct val="0"/>
+              </a:spcBef>
+              <a:spcAft>
+                <a:spcPct val="0"/>
+              </a:spcAft>
+              <a:defRPr sz="2400">
+                <a:solidFill>
+                  <a:schemeClr val="tx1"/>
+                </a:solidFill>
+                <a:latin typeface="Tahoma" charset="0"/>
+                <a:cs typeface="Arial" charset="0"/>
+              </a:defRPr>
+            </a:lvl8pPr>
+            <a:lvl9pPr marL="1828800" eaLnBrk="0" fontAlgn="base" hangingPunct="0">
+              <a:spcBef>
+                <a:spcPct val="0"/>
+              </a:spcBef>
+              <a:spcAft>
+                <a:spcPct val="0"/>
+              </a:spcAft>
+              <a:defRPr sz="2400">
+                <a:solidFill>
+                  <a:schemeClr val="tx1"/>
+                </a:solidFill>
+                <a:latin typeface="Tahoma" charset="0"/>
+                <a:cs typeface="Arial" charset="0"/>
+              </a:defRPr>
+            </a:lvl9pPr>
+          </a:lstStyle>
+          <a:p>
+            <a:pPr algn="l">
+              <a:lnSpc>
+                <a:spcPts val="2500"/>
+              </a:lnSpc>
+              <a:buClr>
+                <a:srgbClr val="00A6D6"/>
+              </a:buClr>
+              <a:defRPr/>
+            </a:pPr>
+            <a:r>
+              <a:rPr lang="nl-NL" altLang="nl-NL" sz="2000" dirty="0" smtClean="0">
+                <a:solidFill>
+                  <a:srgbClr val="00A6D6"/>
+                </a:solidFill>
+                <a:latin typeface="+mn-lt"/>
+                <a:ea typeface="ＭＳ Ｐゴシック" charset="-128"/>
+              </a:rPr>
+              <a:t>Geheugen</a:t>
+            </a:r>
+            <a:endParaRPr lang="nl-NL" altLang="nl-NL" sz="2000" dirty="0" smtClean="0">
+              <a:solidFill>
+                <a:srgbClr val="00A6D6"/>
+              </a:solidFill>
+              <a:latin typeface="+mn-lt"/>
+              <a:ea typeface="ＭＳ Ｐゴシック" charset="-128"/>
+            </a:endParaRPr>
+          </a:p>
+        </p:txBody>
+      </p:sp>
+      <p:sp>
+        <p:nvSpPr>
+          <p:cNvPr id="8" name="Content Placeholder 4"/>
+          <p:cNvSpPr>
+            <a:spLocks noGrp="1"/>
+          </p:cNvSpPr>
+          <p:nvPr>
+            <p:ph idx="1"/>
+          </p:nvPr>
+        </p:nvSpPr>
         <p:spPr/>
         <p:txBody>
           <a:bodyPr/>
           <a:lstStyle/>
           <a:p>
             <a:r>
-              <a:rPr lang="nl-NL" dirty="0" smtClean="0">
-                <a:latin typeface="+mn-lt"/>
+              <a:rPr lang="nl-NL" altLang="nl-NL" dirty="0" err="1">
+                <a:ea typeface="Tahoma"/>
+                <a:cs typeface="Tahoma"/>
               </a:rPr>
-              <a:t>FSM</a:t>
-            </a:r>
-            <a:endParaRPr lang="nl-NL" dirty="0">
-              <a:latin typeface="+mn-lt"/>
+              <a:t>Enable</a:t>
+            </a:r>
+            <a:r>
+              <a:rPr lang="nl-NL" altLang="nl-NL" dirty="0">
+                <a:ea typeface="Tahoma"/>
+                <a:cs typeface="Tahoma"/>
+              </a:rPr>
+              <a:t> signaal</a:t>
+            </a:r>
+          </a:p>
+          <a:p>
+            <a:r>
+              <a:rPr lang="nl-NL" altLang="nl-NL" dirty="0">
+                <a:ea typeface="Tahoma"/>
+                <a:cs typeface="Tahoma"/>
+              </a:rPr>
+              <a:t>16 bits groot</a:t>
+            </a:r>
+          </a:p>
+          <a:p>
+            <a:r>
+              <a:rPr lang="nl-NL" altLang="nl-NL" dirty="0" smtClean="0">
+                <a:ea typeface="Tahoma"/>
+                <a:cs typeface="Tahoma"/>
+              </a:rPr>
+              <a:t>Uitgang</a:t>
+            </a:r>
+            <a:endParaRPr lang="nl-NL" altLang="nl-NL" dirty="0">
+              <a:ea typeface="Tahoma"/>
+              <a:cs typeface="Tahoma"/>
             </a:endParaRPr>
           </a:p>
         </p:txBody>
       </p:sp>
-      <p:pic>
-        <p:nvPicPr>
-          <p:cNvPr id="4" name="Tijdelijke aanduiding voor inhoud 3"/>
-          <p:cNvPicPr>
-            <a:picLocks noGrp="1" noChangeAspect="1"/>
-          </p:cNvPicPr>
-          <p:nvPr>
-            <p:ph idx="1"/>
-          </p:nvPr>
-        </p:nvPicPr>
-        <p:blipFill>
-          <a:blip r:embed="rId2">
-            <a:extLst>
-              <a:ext uri="{28A0092B-C50C-407E-A947-70E740481C1C}">
-                <a14:useLocalDpi xmlns:a14="http://schemas.microsoft.com/office/drawing/2010/main" val="0"/>
-              </a:ext>
-            </a:extLst>
-          </a:blip>
-          <a:stretch>
-            <a:fillRect/>
-          </a:stretch>
-        </p:blipFill>
-        <p:spPr>
-          <a:xfrm>
-            <a:off x="917575" y="1310185"/>
-            <a:ext cx="7154574" cy="4403832"/>
-          </a:xfrm>
-        </p:spPr>
-      </p:pic>
     </p:spTree>
     <p:extLst>
       <p:ext uri="{BB962C8B-B14F-4D97-AF65-F5344CB8AC3E}">
-        <p14:creationId xmlns:p14="http://schemas.microsoft.com/office/powerpoint/2010/main" val="877790804"/>
+        <p14:creationId xmlns:p14="http://schemas.microsoft.com/office/powerpoint/2010/main" val="2557476164"/>
       </p:ext>
     </p:extLst>
   </p:cSld>

</xml_diff>

<commit_message>
Added placeholders in red
</commit_message>
<xml_diff>
--- a/Presentatie/Presentatie groep A1.pptx
+++ b/Presentatie/Presentatie groep A1.pptx
@@ -5,33 +5,37 @@
     <p:sldMasterId id="2147483649" r:id="rId1"/>
   </p:sldMasterIdLst>
   <p:notesMasterIdLst>
-    <p:notesMasterId r:id="rId23"/>
+    <p:notesMasterId r:id="rId27"/>
   </p:notesMasterIdLst>
   <p:handoutMasterIdLst>
-    <p:handoutMasterId r:id="rId24"/>
+    <p:handoutMasterId r:id="rId28"/>
   </p:handoutMasterIdLst>
   <p:sldIdLst>
     <p:sldId id="382" r:id="rId2"/>
-    <p:sldId id="383" r:id="rId3"/>
-    <p:sldId id="384" r:id="rId4"/>
-    <p:sldId id="385" r:id="rId5"/>
-    <p:sldId id="386" r:id="rId6"/>
-    <p:sldId id="392" r:id="rId7"/>
-    <p:sldId id="393" r:id="rId8"/>
-    <p:sldId id="394" r:id="rId9"/>
-    <p:sldId id="395" r:id="rId10"/>
-    <p:sldId id="396" r:id="rId11"/>
-    <p:sldId id="387" r:id="rId12"/>
-    <p:sldId id="403" r:id="rId13"/>
-    <p:sldId id="404" r:id="rId14"/>
-    <p:sldId id="405" r:id="rId15"/>
-    <p:sldId id="406" r:id="rId16"/>
-    <p:sldId id="397" r:id="rId17"/>
-    <p:sldId id="398" r:id="rId18"/>
-    <p:sldId id="399" r:id="rId19"/>
-    <p:sldId id="400" r:id="rId20"/>
-    <p:sldId id="401" r:id="rId21"/>
-    <p:sldId id="402" r:id="rId22"/>
+    <p:sldId id="407" r:id="rId3"/>
+    <p:sldId id="408" r:id="rId4"/>
+    <p:sldId id="383" r:id="rId5"/>
+    <p:sldId id="384" r:id="rId6"/>
+    <p:sldId id="385" r:id="rId7"/>
+    <p:sldId id="386" r:id="rId8"/>
+    <p:sldId id="392" r:id="rId9"/>
+    <p:sldId id="393" r:id="rId10"/>
+    <p:sldId id="394" r:id="rId11"/>
+    <p:sldId id="395" r:id="rId12"/>
+    <p:sldId id="396" r:id="rId13"/>
+    <p:sldId id="387" r:id="rId14"/>
+    <p:sldId id="403" r:id="rId15"/>
+    <p:sldId id="404" r:id="rId16"/>
+    <p:sldId id="405" r:id="rId17"/>
+    <p:sldId id="406" r:id="rId18"/>
+    <p:sldId id="397" r:id="rId19"/>
+    <p:sldId id="398" r:id="rId20"/>
+    <p:sldId id="399" r:id="rId21"/>
+    <p:sldId id="400" r:id="rId22"/>
+    <p:sldId id="401" r:id="rId23"/>
+    <p:sldId id="402" r:id="rId24"/>
+    <p:sldId id="409" r:id="rId25"/>
+    <p:sldId id="410" r:id="rId26"/>
   </p:sldIdLst>
   <p:sldSz cx="9144000" cy="6858000" type="screen4x3"/>
   <p:notesSz cx="6794500" cy="9931400"/>
@@ -5344,10 +5348,6 @@
               </a:rPr>
               <a:t> controller</a:t>
             </a:r>
-            <a:endParaRPr lang="nl-NL" altLang="nl-NL" dirty="0" smtClean="0">
-              <a:latin typeface="+mn-lt"/>
-              <a:ea typeface="ＭＳ Ｐゴシック" pitchFamily="34" charset="-128"/>
-            </a:endParaRPr>
           </a:p>
         </p:txBody>
       </p:sp>
@@ -5502,15 +5502,8 @@
                 <a:latin typeface="+mn-lt"/>
                 <a:ea typeface="ＭＳ Ｐゴシック" charset="-128"/>
               </a:rPr>
-              <a:t>Menu</a:t>
-            </a:r>
-            <a:endParaRPr lang="nl-NL" altLang="nl-NL" sz="2000" dirty="0" smtClean="0">
-              <a:solidFill>
-                <a:srgbClr val="00A6D6"/>
-              </a:solidFill>
-              <a:latin typeface="+mn-lt"/>
-              <a:ea typeface="ＭＳ Ｐゴシック" charset="-128"/>
-            </a:endParaRPr>
+              <a:t>Buffer</a:t>
+            </a:r>
           </a:p>
         </p:txBody>
       </p:sp>
@@ -5534,59 +5527,37 @@
                 <a:ea typeface="Tahoma"/>
                 <a:cs typeface="Tahoma"/>
               </a:rPr>
-              <a:t>Gebruiksvriendelijk</a:t>
-            </a:r>
-          </a:p>
-          <a:p>
-            <a:r>
-              <a:rPr lang="nl-NL" altLang="nl-NL" dirty="0" smtClean="0">
+              <a:t> Ingedrukt houden van knoppen</a:t>
+            </a:r>
+          </a:p>
+          <a:p>
+            <a:r>
+              <a:rPr lang="nl-NL" altLang="nl-NL" dirty="0">
                 <a:ea typeface="Tahoma"/>
                 <a:cs typeface="Tahoma"/>
               </a:rPr>
-              <a:t>FSM</a:t>
-            </a:r>
-            <a:endParaRPr lang="nl-NL" altLang="nl-NL" dirty="0">
-              <a:ea typeface="Tahoma"/>
-              <a:cs typeface="Tahoma"/>
-            </a:endParaRPr>
+              <a:t> Meerdere knoppen tegelijk indrukken</a:t>
+            </a:r>
+          </a:p>
+          <a:p>
+            <a:r>
+              <a:rPr lang="nl-NL" altLang="nl-NL" dirty="0">
+                <a:solidFill>
+                  <a:srgbClr val="000000"/>
+                </a:solidFill>
+                <a:latin typeface="Tahoma"/>
+                <a:ea typeface="Tahoma"/>
+                <a:cs typeface="Tahoma"/>
+              </a:rPr>
+              <a:t> Rekening houden met imperfecties van input</a:t>
+            </a:r>
           </a:p>
         </p:txBody>
       </p:sp>
-      <p:pic>
-        <p:nvPicPr>
-          <p:cNvPr id="5" name="Afbeelding 4" descr="fsm.png"/>
-          <p:cNvPicPr>
-            <a:picLocks noChangeAspect="1"/>
-          </p:cNvPicPr>
-          <p:nvPr/>
-        </p:nvPicPr>
-        <p:blipFill>
-          <a:blip r:embed="rId2">
-            <a:extLst>
-              <a:ext uri="{28A0092B-C50C-407E-A947-70E740481C1C}">
-                <a14:useLocalDpi xmlns:a14="http://schemas.microsoft.com/office/drawing/2010/main" val="0"/>
-              </a:ext>
-            </a:extLst>
-          </a:blip>
-          <a:srcRect l="-10" r="12916"/>
-          <a:stretch>
-            <a:fillRect/>
-          </a:stretch>
-        </p:blipFill>
-        <p:spPr>
-          <a:xfrm>
-            <a:off x="3544508" y="1903216"/>
-            <a:ext cx="5157167" cy="3552825"/>
-          </a:xfrm>
-          <a:prstGeom prst="rect">
-            <a:avLst/>
-          </a:prstGeom>
-        </p:spPr>
-      </p:pic>
     </p:spTree>
     <p:extLst>
       <p:ext uri="{BB962C8B-B14F-4D97-AF65-F5344CB8AC3E}">
-        <p14:creationId xmlns:p14="http://schemas.microsoft.com/office/powerpoint/2010/main" val="3958517889"/>
+        <p14:creationId xmlns:p14="http://schemas.microsoft.com/office/powerpoint/2010/main" val="388637402"/>
       </p:ext>
     </p:extLst>
   </p:cSld>
@@ -5622,7 +5593,7 @@
       </p:grpSpPr>
       <p:sp>
         <p:nvSpPr>
-          <p:cNvPr id="2" name="Titel 1"/>
+          <p:cNvPr id="4098" name="Title 3"/>
           <p:cNvSpPr>
             <a:spLocks noGrp="1"/>
           </p:cNvSpPr>
@@ -5630,23 +5601,250 @@
             <p:ph type="title"/>
           </p:nvPr>
         </p:nvSpPr>
+        <p:spPr>
+          <a:xfrm>
+            <a:off x="917575" y="457200"/>
+            <a:ext cx="7159625" cy="627063"/>
+          </a:xfrm>
+        </p:spPr>
+        <p:txBody>
+          <a:bodyPr/>
+          <a:lstStyle/>
+          <a:p>
+            <a:pPr>
+              <a:defRPr/>
+            </a:pPr>
+            <a:r>
+              <a:rPr lang="nl-NL" altLang="nl-NL" dirty="0" err="1" smtClean="0">
+                <a:latin typeface="+mn-lt"/>
+                <a:ea typeface="ＭＳ Ｐゴシック" pitchFamily="34" charset="-128"/>
+              </a:rPr>
+              <a:t>Main</a:t>
+            </a:r>
+            <a:r>
+              <a:rPr lang="nl-NL" altLang="nl-NL" dirty="0" smtClean="0">
+                <a:latin typeface="+mn-lt"/>
+                <a:ea typeface="ＭＳ Ｐゴシック" pitchFamily="34" charset="-128"/>
+              </a:rPr>
+              <a:t> controller</a:t>
+            </a:r>
+          </a:p>
+        </p:txBody>
+      </p:sp>
+      <p:sp>
+        <p:nvSpPr>
+          <p:cNvPr id="6" name="Ondertitel 2"/>
+          <p:cNvSpPr txBox="1">
+            <a:spLocks/>
+          </p:cNvSpPr>
+          <p:nvPr/>
+        </p:nvSpPr>
+        <p:spPr bwMode="auto">
+          <a:xfrm>
+            <a:off x="914400" y="1041400"/>
+            <a:ext cx="6781800" cy="474663"/>
+          </a:xfrm>
+          <a:prstGeom prst="rect">
+            <a:avLst/>
+          </a:prstGeom>
+          <a:noFill/>
+          <a:ln w="9525">
+            <a:noFill/>
+            <a:miter lim="800000"/>
+            <a:headEnd/>
+            <a:tailEnd/>
+          </a:ln>
+        </p:spPr>
+        <p:txBody>
+          <a:bodyPr lIns="0" tIns="0" rIns="0" bIns="0"/>
+          <a:lstStyle>
+            <a:lvl1pPr eaLnBrk="0" hangingPunct="0">
+              <a:defRPr sz="2400">
+                <a:solidFill>
+                  <a:schemeClr val="tx1"/>
+                </a:solidFill>
+                <a:latin typeface="Tahoma" charset="0"/>
+                <a:cs typeface="Arial" charset="0"/>
+              </a:defRPr>
+            </a:lvl1pPr>
+            <a:lvl2pPr marL="37931725" indent="-37474525" eaLnBrk="0" hangingPunct="0">
+              <a:defRPr sz="2400">
+                <a:solidFill>
+                  <a:schemeClr val="tx1"/>
+                </a:solidFill>
+                <a:latin typeface="Tahoma" charset="0"/>
+                <a:cs typeface="Arial" charset="0"/>
+              </a:defRPr>
+            </a:lvl2pPr>
+            <a:lvl3pPr eaLnBrk="0" hangingPunct="0">
+              <a:defRPr sz="2400">
+                <a:solidFill>
+                  <a:schemeClr val="tx1"/>
+                </a:solidFill>
+                <a:latin typeface="Tahoma" charset="0"/>
+                <a:cs typeface="Arial" charset="0"/>
+              </a:defRPr>
+            </a:lvl3pPr>
+            <a:lvl4pPr eaLnBrk="0" hangingPunct="0">
+              <a:defRPr sz="2400">
+                <a:solidFill>
+                  <a:schemeClr val="tx1"/>
+                </a:solidFill>
+                <a:latin typeface="Tahoma" charset="0"/>
+                <a:cs typeface="Arial" charset="0"/>
+              </a:defRPr>
+            </a:lvl4pPr>
+            <a:lvl5pPr eaLnBrk="0" hangingPunct="0">
+              <a:defRPr sz="2400">
+                <a:solidFill>
+                  <a:schemeClr val="tx1"/>
+                </a:solidFill>
+                <a:latin typeface="Tahoma" charset="0"/>
+                <a:cs typeface="Arial" charset="0"/>
+              </a:defRPr>
+            </a:lvl5pPr>
+            <a:lvl6pPr marL="457200" eaLnBrk="0" fontAlgn="base" hangingPunct="0">
+              <a:spcBef>
+                <a:spcPct val="0"/>
+              </a:spcBef>
+              <a:spcAft>
+                <a:spcPct val="0"/>
+              </a:spcAft>
+              <a:defRPr sz="2400">
+                <a:solidFill>
+                  <a:schemeClr val="tx1"/>
+                </a:solidFill>
+                <a:latin typeface="Tahoma" charset="0"/>
+                <a:cs typeface="Arial" charset="0"/>
+              </a:defRPr>
+            </a:lvl6pPr>
+            <a:lvl7pPr marL="914400" eaLnBrk="0" fontAlgn="base" hangingPunct="0">
+              <a:spcBef>
+                <a:spcPct val="0"/>
+              </a:spcBef>
+              <a:spcAft>
+                <a:spcPct val="0"/>
+              </a:spcAft>
+              <a:defRPr sz="2400">
+                <a:solidFill>
+                  <a:schemeClr val="tx1"/>
+                </a:solidFill>
+                <a:latin typeface="Tahoma" charset="0"/>
+                <a:cs typeface="Arial" charset="0"/>
+              </a:defRPr>
+            </a:lvl7pPr>
+            <a:lvl8pPr marL="1371600" eaLnBrk="0" fontAlgn="base" hangingPunct="0">
+              <a:spcBef>
+                <a:spcPct val="0"/>
+              </a:spcBef>
+              <a:spcAft>
+                <a:spcPct val="0"/>
+              </a:spcAft>
+              <a:defRPr sz="2400">
+                <a:solidFill>
+                  <a:schemeClr val="tx1"/>
+                </a:solidFill>
+                <a:latin typeface="Tahoma" charset="0"/>
+                <a:cs typeface="Arial" charset="0"/>
+              </a:defRPr>
+            </a:lvl8pPr>
+            <a:lvl9pPr marL="1828800" eaLnBrk="0" fontAlgn="base" hangingPunct="0">
+              <a:spcBef>
+                <a:spcPct val="0"/>
+              </a:spcBef>
+              <a:spcAft>
+                <a:spcPct val="0"/>
+              </a:spcAft>
+              <a:defRPr sz="2400">
+                <a:solidFill>
+                  <a:schemeClr val="tx1"/>
+                </a:solidFill>
+                <a:latin typeface="Tahoma" charset="0"/>
+                <a:cs typeface="Arial" charset="0"/>
+              </a:defRPr>
+            </a:lvl9pPr>
+          </a:lstStyle>
+          <a:p>
+            <a:pPr algn="l">
+              <a:lnSpc>
+                <a:spcPts val="2500"/>
+              </a:lnSpc>
+              <a:buClr>
+                <a:srgbClr val="00A6D6"/>
+              </a:buClr>
+              <a:defRPr/>
+            </a:pPr>
+            <a:r>
+              <a:rPr lang="nl-NL" altLang="nl-NL" sz="2000" dirty="0" smtClean="0">
+                <a:solidFill>
+                  <a:srgbClr val="00A6D6"/>
+                </a:solidFill>
+                <a:latin typeface="+mn-lt"/>
+                <a:ea typeface="ＭＳ Ｐゴシック" charset="-128"/>
+              </a:rPr>
+              <a:t>Geheugen</a:t>
+            </a:r>
+          </a:p>
+        </p:txBody>
+      </p:sp>
+      <p:sp>
+        <p:nvSpPr>
+          <p:cNvPr id="8" name="Content Placeholder 4"/>
+          <p:cNvSpPr>
+            <a:spLocks noGrp="1"/>
+          </p:cNvSpPr>
+          <p:nvPr>
+            <p:ph idx="1"/>
+          </p:nvPr>
+        </p:nvSpPr>
         <p:spPr/>
         <p:txBody>
           <a:bodyPr/>
           <a:lstStyle/>
           <a:p>
             <a:r>
-              <a:rPr lang="nl-NL" dirty="0" smtClean="0"/>
-              <a:t>Alarm module</a:t>
-            </a:r>
-            <a:endParaRPr lang="nl-NL" dirty="0"/>
+              <a:rPr lang="nl-NL" altLang="nl-NL" dirty="0" err="1">
+                <a:ea typeface="Tahoma"/>
+                <a:cs typeface="Tahoma"/>
+              </a:rPr>
+              <a:t>Enable</a:t>
+            </a:r>
+            <a:r>
+              <a:rPr lang="nl-NL" altLang="nl-NL" dirty="0">
+                <a:ea typeface="Tahoma"/>
+                <a:cs typeface="Tahoma"/>
+              </a:rPr>
+              <a:t> signaal</a:t>
+            </a:r>
+          </a:p>
+          <a:p>
+            <a:r>
+              <a:rPr lang="nl-NL" altLang="nl-NL" dirty="0">
+                <a:ea typeface="Tahoma"/>
+                <a:cs typeface="Tahoma"/>
+              </a:rPr>
+              <a:t>16 bits groot</a:t>
+            </a:r>
+          </a:p>
+          <a:p>
+            <a:r>
+              <a:rPr lang="nl-NL" altLang="nl-NL" dirty="0" smtClean="0">
+                <a:ea typeface="Tahoma"/>
+                <a:cs typeface="Tahoma"/>
+              </a:rPr>
+              <a:t>Uitgang</a:t>
+            </a:r>
+            <a:endParaRPr lang="nl-NL" altLang="nl-NL" dirty="0">
+              <a:ea typeface="Tahoma"/>
+              <a:cs typeface="Tahoma"/>
+            </a:endParaRPr>
           </a:p>
         </p:txBody>
       </p:sp>
     </p:spTree>
     <p:extLst>
       <p:ext uri="{BB962C8B-B14F-4D97-AF65-F5344CB8AC3E}">
-        <p14:creationId xmlns:p14="http://schemas.microsoft.com/office/powerpoint/2010/main" val="1580779184"/>
+        <p14:creationId xmlns:p14="http://schemas.microsoft.com/office/powerpoint/2010/main" val="2557476164"/>
       </p:ext>
     </p:extLst>
   </p:cSld>
@@ -5704,16 +5902,19 @@
               <a:defRPr/>
             </a:pPr>
             <a:r>
+              <a:rPr lang="nl-NL" altLang="nl-NL" dirty="0" err="1" smtClean="0">
+                <a:latin typeface="+mn-lt"/>
+                <a:ea typeface="ＭＳ Ｐゴシック" pitchFamily="34" charset="-128"/>
+              </a:rPr>
+              <a:t>Main</a:t>
+            </a:r>
+            <a:r>
               <a:rPr lang="nl-NL" altLang="nl-NL" dirty="0" smtClean="0">
                 <a:latin typeface="+mn-lt"/>
                 <a:ea typeface="ＭＳ Ｐゴシック" pitchFamily="34" charset="-128"/>
               </a:rPr>
-              <a:t>Alarm</a:t>
-            </a:r>
-            <a:endParaRPr lang="nl-NL" altLang="nl-NL" dirty="0" smtClean="0">
-              <a:latin typeface="+mn-lt"/>
-              <a:ea typeface="ＭＳ Ｐゴシック" pitchFamily="34" charset="-128"/>
-            </a:endParaRPr>
+              <a:t> controller</a:t>
+            </a:r>
           </a:p>
         </p:txBody>
       </p:sp>
@@ -5868,21 +6069,52 @@
                 <a:latin typeface="+mn-lt"/>
                 <a:ea typeface="ＭＳ Ｐゴシック" charset="-128"/>
               </a:rPr>
-              <a:t>Blokdiagram</a:t>
-            </a:r>
-            <a:endParaRPr lang="nl-NL" altLang="nl-NL" sz="2000" dirty="0" smtClean="0">
-              <a:solidFill>
-                <a:srgbClr val="00A6D6"/>
-              </a:solidFill>
-              <a:latin typeface="+mn-lt"/>
-              <a:ea typeface="ＭＳ Ｐゴシック" charset="-128"/>
+              <a:t>Menu</a:t>
+            </a:r>
+          </a:p>
+        </p:txBody>
+      </p:sp>
+      <p:sp>
+        <p:nvSpPr>
+          <p:cNvPr id="8" name="Content Placeholder 4"/>
+          <p:cNvSpPr>
+            <a:spLocks noGrp="1"/>
+          </p:cNvSpPr>
+          <p:nvPr>
+            <p:ph idx="1"/>
+          </p:nvPr>
+        </p:nvSpPr>
+        <p:spPr/>
+        <p:txBody>
+          <a:bodyPr/>
+          <a:lstStyle/>
+          <a:p>
+            <a:r>
+              <a:rPr lang="nl-NL" altLang="nl-NL" dirty="0">
+                <a:ea typeface="Tahoma"/>
+                <a:cs typeface="Tahoma"/>
+              </a:rPr>
+              <a:t>Gebruiksvriendelijk</a:t>
+            </a:r>
+          </a:p>
+          <a:p>
+            <a:r>
+              <a:rPr lang="nl-NL" altLang="nl-NL" dirty="0" smtClean="0">
+                <a:ea typeface="Tahoma"/>
+                <a:cs typeface="Tahoma"/>
+              </a:rPr>
+              <a:t>FSM</a:t>
+            </a:r>
+            <a:endParaRPr lang="nl-NL" altLang="nl-NL" dirty="0">
+              <a:ea typeface="Tahoma"/>
+              <a:cs typeface="Tahoma"/>
             </a:endParaRPr>
           </a:p>
         </p:txBody>
       </p:sp>
       <p:pic>
         <p:nvPicPr>
-          <p:cNvPr id="7" name="Tijdelijke aanduiding voor inhoud 5"/>
+          <p:cNvPr id="5" name="Afbeelding 4" descr="fsm.png"/>
           <p:cNvPicPr>
             <a:picLocks noChangeAspect="1"/>
           </p:cNvPicPr>
@@ -5896,47 +6128,25 @@
               </a:ext>
             </a:extLst>
           </a:blip>
+          <a:srcRect l="-10" r="12916"/>
           <a:stretch>
             <a:fillRect/>
           </a:stretch>
         </p:blipFill>
-        <p:spPr bwMode="auto">
+        <p:spPr>
           <a:xfrm>
-            <a:off x="153448" y="2238233"/>
-            <a:ext cx="8990552" cy="3745381"/>
+            <a:off x="3544508" y="1903216"/>
+            <a:ext cx="5157167" cy="3552825"/>
           </a:xfrm>
           <a:prstGeom prst="rect">
             <a:avLst/>
           </a:prstGeom>
-          <a:noFill/>
-          <a:ln>
-            <a:noFill/>
-          </a:ln>
-          <a:extLst>
-            <a:ext uri="{909E8E84-426E-40DD-AFC4-6F175D3DCCD1}">
-              <a14:hiddenFill xmlns:a14="http://schemas.microsoft.com/office/drawing/2010/main">
-                <a:solidFill>
-                  <a:srgbClr val="FFFFFF"/>
-                </a:solidFill>
-              </a14:hiddenFill>
-            </a:ext>
-            <a:ext uri="{91240B29-F687-4F45-9708-019B960494DF}">
-              <a14:hiddenLine xmlns:a14="http://schemas.microsoft.com/office/drawing/2010/main" w="9525">
-                <a:solidFill>
-                  <a:srgbClr val="000000"/>
-                </a:solidFill>
-                <a:miter lim="800000"/>
-                <a:headEnd/>
-                <a:tailEnd/>
-              </a14:hiddenLine>
-            </a:ext>
-          </a:extLst>
         </p:spPr>
       </p:pic>
     </p:spTree>
     <p:extLst>
       <p:ext uri="{BB962C8B-B14F-4D97-AF65-F5344CB8AC3E}">
-        <p14:creationId xmlns:p14="http://schemas.microsoft.com/office/powerpoint/2010/main" val="2267202334"/>
+        <p14:creationId xmlns:p14="http://schemas.microsoft.com/office/powerpoint/2010/main" val="3958517889"/>
       </p:ext>
     </p:extLst>
   </p:cSld>
@@ -5972,7 +6182,7 @@
       </p:grpSpPr>
       <p:sp>
         <p:nvSpPr>
-          <p:cNvPr id="4098" name="Title 3"/>
+          <p:cNvPr id="2" name="Titel 1"/>
           <p:cNvSpPr>
             <a:spLocks noGrp="1"/>
           </p:cNvSpPr>
@@ -5980,249 +6190,23 @@
             <p:ph type="title"/>
           </p:nvPr>
         </p:nvSpPr>
-        <p:spPr>
-          <a:xfrm>
-            <a:off x="917575" y="457200"/>
-            <a:ext cx="7159625" cy="627063"/>
-          </a:xfrm>
-        </p:spPr>
+        <p:spPr/>
         <p:txBody>
           <a:bodyPr/>
           <a:lstStyle/>
           <a:p>
-            <a:pPr>
-              <a:defRPr/>
-            </a:pPr>
-            <a:r>
-              <a:rPr lang="nl-NL" altLang="nl-NL" dirty="0" smtClean="0">
-                <a:latin typeface="+mn-lt"/>
-                <a:ea typeface="ＭＳ Ｐゴシック" pitchFamily="34" charset="-128"/>
-              </a:rPr>
-              <a:t>Alarm</a:t>
-            </a:r>
-            <a:endParaRPr lang="nl-NL" altLang="nl-NL" dirty="0" smtClean="0">
-              <a:latin typeface="+mn-lt"/>
-              <a:ea typeface="ＭＳ Ｐゴシック" pitchFamily="34" charset="-128"/>
-            </a:endParaRPr>
+            <a:r>
+              <a:rPr lang="nl-NL" dirty="0" smtClean="0"/>
+              <a:t>Alarm module</a:t>
+            </a:r>
+            <a:endParaRPr lang="nl-NL" dirty="0"/>
           </a:p>
         </p:txBody>
       </p:sp>
-      <p:sp>
-        <p:nvSpPr>
-          <p:cNvPr id="6" name="Ondertitel 2"/>
-          <p:cNvSpPr txBox="1">
-            <a:spLocks/>
-          </p:cNvSpPr>
-          <p:nvPr/>
-        </p:nvSpPr>
-        <p:spPr bwMode="auto">
-          <a:xfrm>
-            <a:off x="914400" y="1041400"/>
-            <a:ext cx="6781800" cy="474663"/>
-          </a:xfrm>
-          <a:prstGeom prst="rect">
-            <a:avLst/>
-          </a:prstGeom>
-          <a:noFill/>
-          <a:ln w="9525">
-            <a:noFill/>
-            <a:miter lim="800000"/>
-            <a:headEnd/>
-            <a:tailEnd/>
-          </a:ln>
-        </p:spPr>
-        <p:txBody>
-          <a:bodyPr lIns="0" tIns="0" rIns="0" bIns="0"/>
-          <a:lstStyle>
-            <a:lvl1pPr eaLnBrk="0" hangingPunct="0">
-              <a:defRPr sz="2400">
-                <a:solidFill>
-                  <a:schemeClr val="tx1"/>
-                </a:solidFill>
-                <a:latin typeface="Tahoma" charset="0"/>
-                <a:cs typeface="Arial" charset="0"/>
-              </a:defRPr>
-            </a:lvl1pPr>
-            <a:lvl2pPr marL="37931725" indent="-37474525" eaLnBrk="0" hangingPunct="0">
-              <a:defRPr sz="2400">
-                <a:solidFill>
-                  <a:schemeClr val="tx1"/>
-                </a:solidFill>
-                <a:latin typeface="Tahoma" charset="0"/>
-                <a:cs typeface="Arial" charset="0"/>
-              </a:defRPr>
-            </a:lvl2pPr>
-            <a:lvl3pPr eaLnBrk="0" hangingPunct="0">
-              <a:defRPr sz="2400">
-                <a:solidFill>
-                  <a:schemeClr val="tx1"/>
-                </a:solidFill>
-                <a:latin typeface="Tahoma" charset="0"/>
-                <a:cs typeface="Arial" charset="0"/>
-              </a:defRPr>
-            </a:lvl3pPr>
-            <a:lvl4pPr eaLnBrk="0" hangingPunct="0">
-              <a:defRPr sz="2400">
-                <a:solidFill>
-                  <a:schemeClr val="tx1"/>
-                </a:solidFill>
-                <a:latin typeface="Tahoma" charset="0"/>
-                <a:cs typeface="Arial" charset="0"/>
-              </a:defRPr>
-            </a:lvl4pPr>
-            <a:lvl5pPr eaLnBrk="0" hangingPunct="0">
-              <a:defRPr sz="2400">
-                <a:solidFill>
-                  <a:schemeClr val="tx1"/>
-                </a:solidFill>
-                <a:latin typeface="Tahoma" charset="0"/>
-                <a:cs typeface="Arial" charset="0"/>
-              </a:defRPr>
-            </a:lvl5pPr>
-            <a:lvl6pPr marL="457200" eaLnBrk="0" fontAlgn="base" hangingPunct="0">
-              <a:spcBef>
-                <a:spcPct val="0"/>
-              </a:spcBef>
-              <a:spcAft>
-                <a:spcPct val="0"/>
-              </a:spcAft>
-              <a:defRPr sz="2400">
-                <a:solidFill>
-                  <a:schemeClr val="tx1"/>
-                </a:solidFill>
-                <a:latin typeface="Tahoma" charset="0"/>
-                <a:cs typeface="Arial" charset="0"/>
-              </a:defRPr>
-            </a:lvl6pPr>
-            <a:lvl7pPr marL="914400" eaLnBrk="0" fontAlgn="base" hangingPunct="0">
-              <a:spcBef>
-                <a:spcPct val="0"/>
-              </a:spcBef>
-              <a:spcAft>
-                <a:spcPct val="0"/>
-              </a:spcAft>
-              <a:defRPr sz="2400">
-                <a:solidFill>
-                  <a:schemeClr val="tx1"/>
-                </a:solidFill>
-                <a:latin typeface="Tahoma" charset="0"/>
-                <a:cs typeface="Arial" charset="0"/>
-              </a:defRPr>
-            </a:lvl7pPr>
-            <a:lvl8pPr marL="1371600" eaLnBrk="0" fontAlgn="base" hangingPunct="0">
-              <a:spcBef>
-                <a:spcPct val="0"/>
-              </a:spcBef>
-              <a:spcAft>
-                <a:spcPct val="0"/>
-              </a:spcAft>
-              <a:defRPr sz="2400">
-                <a:solidFill>
-                  <a:schemeClr val="tx1"/>
-                </a:solidFill>
-                <a:latin typeface="Tahoma" charset="0"/>
-                <a:cs typeface="Arial" charset="0"/>
-              </a:defRPr>
-            </a:lvl8pPr>
-            <a:lvl9pPr marL="1828800" eaLnBrk="0" fontAlgn="base" hangingPunct="0">
-              <a:spcBef>
-                <a:spcPct val="0"/>
-              </a:spcBef>
-              <a:spcAft>
-                <a:spcPct val="0"/>
-              </a:spcAft>
-              <a:defRPr sz="2400">
-                <a:solidFill>
-                  <a:schemeClr val="tx1"/>
-                </a:solidFill>
-                <a:latin typeface="Tahoma" charset="0"/>
-                <a:cs typeface="Arial" charset="0"/>
-              </a:defRPr>
-            </a:lvl9pPr>
-          </a:lstStyle>
-          <a:p>
-            <a:pPr algn="l">
-              <a:lnSpc>
-                <a:spcPts val="2500"/>
-              </a:lnSpc>
-              <a:buClr>
-                <a:srgbClr val="00A6D6"/>
-              </a:buClr>
-              <a:defRPr/>
-            </a:pPr>
-            <a:r>
-              <a:rPr lang="nl-NL" altLang="nl-NL" sz="2000" dirty="0" smtClean="0">
-                <a:solidFill>
-                  <a:srgbClr val="00A6D6"/>
-                </a:solidFill>
-                <a:latin typeface="+mn-lt"/>
-                <a:ea typeface="ＭＳ Ｐゴシック" charset="-128"/>
-              </a:rPr>
-              <a:t>FSM ‘</a:t>
-            </a:r>
-            <a:r>
-              <a:rPr lang="nl-NL" altLang="nl-NL" sz="2000" dirty="0" err="1" smtClean="0">
-                <a:solidFill>
-                  <a:srgbClr val="00A6D6"/>
-                </a:solidFill>
-                <a:latin typeface="+mn-lt"/>
-                <a:ea typeface="ＭＳ Ｐゴシック" charset="-128"/>
-              </a:rPr>
-              <a:t>Compare</a:t>
-            </a:r>
-            <a:r>
-              <a:rPr lang="nl-NL" altLang="nl-NL" sz="2000" dirty="0" smtClean="0">
-                <a:solidFill>
-                  <a:srgbClr val="00A6D6"/>
-                </a:solidFill>
-                <a:latin typeface="+mn-lt"/>
-                <a:ea typeface="ＭＳ Ｐゴシック" charset="-128"/>
-              </a:rPr>
-              <a:t>’</a:t>
-            </a:r>
-            <a:endParaRPr lang="nl-NL" altLang="nl-NL" sz="2000" dirty="0" smtClean="0">
-              <a:solidFill>
-                <a:srgbClr val="00A6D6"/>
-              </a:solidFill>
-              <a:latin typeface="+mn-lt"/>
-              <a:ea typeface="ＭＳ Ｐゴシック" charset="-128"/>
-            </a:endParaRPr>
-          </a:p>
-        </p:txBody>
-      </p:sp>
-      <p:pic>
-        <p:nvPicPr>
-          <p:cNvPr id="5" name="Tijdelijke aanduiding voor inhoud 1"/>
-          <p:cNvPicPr>
-            <a:picLocks noGrp="1" noChangeAspect="1"/>
-          </p:cNvPicPr>
-          <p:nvPr>
-            <p:ph idx="1"/>
-          </p:nvPr>
-        </p:nvPicPr>
-        <p:blipFill>
-          <a:blip r:embed="rId2">
-            <a:extLst>
-              <a:ext uri="{28A0092B-C50C-407E-A947-70E740481C1C}">
-                <a14:useLocalDpi xmlns:a14="http://schemas.microsoft.com/office/drawing/2010/main" val="0"/>
-              </a:ext>
-            </a:extLst>
-          </a:blip>
-          <a:stretch>
-            <a:fillRect/>
-          </a:stretch>
-        </p:blipFill>
-        <p:spPr>
-          <a:xfrm>
-            <a:off x="532263" y="1316251"/>
-            <a:ext cx="7789246" cy="4646400"/>
-          </a:xfrm>
-        </p:spPr>
-      </p:pic>
     </p:spTree>
     <p:extLst>
       <p:ext uri="{BB962C8B-B14F-4D97-AF65-F5344CB8AC3E}">
-        <p14:creationId xmlns:p14="http://schemas.microsoft.com/office/powerpoint/2010/main" val="1260428583"/>
+        <p14:creationId xmlns:p14="http://schemas.microsoft.com/office/powerpoint/2010/main" val="1580779184"/>
       </p:ext>
     </p:extLst>
   </p:cSld>
@@ -6286,10 +6270,6 @@
               </a:rPr>
               <a:t>Alarm</a:t>
             </a:r>
-            <a:endParaRPr lang="nl-NL" altLang="nl-NL" dirty="0" smtClean="0">
-              <a:latin typeface="+mn-lt"/>
-              <a:ea typeface="ＭＳ Ｐゴシック" pitchFamily="34" charset="-128"/>
-            </a:endParaRPr>
           </a:p>
         </p:txBody>
       </p:sp>
@@ -6444,15 +6424,562 @@
                 <a:latin typeface="+mn-lt"/>
                 <a:ea typeface="ＭＳ Ｐゴシック" charset="-128"/>
               </a:rPr>
+              <a:t>Blokdiagram</a:t>
+            </a:r>
+          </a:p>
+        </p:txBody>
+      </p:sp>
+      <p:pic>
+        <p:nvPicPr>
+          <p:cNvPr id="7" name="Tijdelijke aanduiding voor inhoud 5"/>
+          <p:cNvPicPr>
+            <a:picLocks noChangeAspect="1"/>
+          </p:cNvPicPr>
+          <p:nvPr/>
+        </p:nvPicPr>
+        <p:blipFill>
+          <a:blip r:embed="rId2">
+            <a:extLst>
+              <a:ext uri="{28A0092B-C50C-407E-A947-70E740481C1C}">
+                <a14:useLocalDpi xmlns:a14="http://schemas.microsoft.com/office/drawing/2010/main" val="0"/>
+              </a:ext>
+            </a:extLst>
+          </a:blip>
+          <a:stretch>
+            <a:fillRect/>
+          </a:stretch>
+        </p:blipFill>
+        <p:spPr bwMode="auto">
+          <a:xfrm>
+            <a:off x="153448" y="2238233"/>
+            <a:ext cx="8990552" cy="3745381"/>
+          </a:xfrm>
+          <a:prstGeom prst="rect">
+            <a:avLst/>
+          </a:prstGeom>
+          <a:noFill/>
+          <a:ln>
+            <a:noFill/>
+          </a:ln>
+          <a:extLst>
+            <a:ext uri="{909E8E84-426E-40DD-AFC4-6F175D3DCCD1}">
+              <a14:hiddenFill xmlns:a14="http://schemas.microsoft.com/office/drawing/2010/main">
+                <a:solidFill>
+                  <a:srgbClr val="FFFFFF"/>
+                </a:solidFill>
+              </a14:hiddenFill>
+            </a:ext>
+            <a:ext uri="{91240B29-F687-4F45-9708-019B960494DF}">
+              <a14:hiddenLine xmlns:a14="http://schemas.microsoft.com/office/drawing/2010/main" w="9525">
+                <a:solidFill>
+                  <a:srgbClr val="000000"/>
+                </a:solidFill>
+                <a:miter lim="800000"/>
+                <a:headEnd/>
+                <a:tailEnd/>
+              </a14:hiddenLine>
+            </a:ext>
+          </a:extLst>
+        </p:spPr>
+      </p:pic>
+    </p:spTree>
+    <p:extLst>
+      <p:ext uri="{BB962C8B-B14F-4D97-AF65-F5344CB8AC3E}">
+        <p14:creationId xmlns:p14="http://schemas.microsoft.com/office/powerpoint/2010/main" val="2267202334"/>
+      </p:ext>
+    </p:extLst>
+  </p:cSld>
+  <p:clrMapOvr>
+    <a:masterClrMapping/>
+  </p:clrMapOvr>
+  <p:timing>
+    <p:tnLst>
+      <p:par>
+        <p:cTn id="1" dur="indefinite" restart="never" nodeType="tmRoot"/>
+      </p:par>
+    </p:tnLst>
+  </p:timing>
+</p:sld>
+</file>
+
+<file path=ppt/slides/slide15.xml><?xml version="1.0" encoding="utf-8"?>
+<p:sld xmlns:a="http://schemas.openxmlformats.org/drawingml/2006/main" xmlns:r="http://schemas.openxmlformats.org/officeDocument/2006/relationships" xmlns:p="http://schemas.openxmlformats.org/presentationml/2006/main">
+  <p:cSld>
+    <p:spTree>
+      <p:nvGrpSpPr>
+        <p:cNvPr id="1" name=""/>
+        <p:cNvGrpSpPr/>
+        <p:nvPr/>
+      </p:nvGrpSpPr>
+      <p:grpSpPr>
+        <a:xfrm>
+          <a:off x="0" y="0"/>
+          <a:ext cx="0" cy="0"/>
+          <a:chOff x="0" y="0"/>
+          <a:chExt cx="0" cy="0"/>
+        </a:xfrm>
+      </p:grpSpPr>
+      <p:sp>
+        <p:nvSpPr>
+          <p:cNvPr id="4098" name="Title 3"/>
+          <p:cNvSpPr>
+            <a:spLocks noGrp="1"/>
+          </p:cNvSpPr>
+          <p:nvPr>
+            <p:ph type="title"/>
+          </p:nvPr>
+        </p:nvSpPr>
+        <p:spPr>
+          <a:xfrm>
+            <a:off x="917575" y="457200"/>
+            <a:ext cx="7159625" cy="627063"/>
+          </a:xfrm>
+        </p:spPr>
+        <p:txBody>
+          <a:bodyPr/>
+          <a:lstStyle/>
+          <a:p>
+            <a:pPr>
+              <a:defRPr/>
+            </a:pPr>
+            <a:r>
+              <a:rPr lang="nl-NL" altLang="nl-NL" dirty="0" smtClean="0">
+                <a:latin typeface="+mn-lt"/>
+                <a:ea typeface="ＭＳ Ｐゴシック" pitchFamily="34" charset="-128"/>
+              </a:rPr>
+              <a:t>Alarm</a:t>
+            </a:r>
+          </a:p>
+        </p:txBody>
+      </p:sp>
+      <p:sp>
+        <p:nvSpPr>
+          <p:cNvPr id="6" name="Ondertitel 2"/>
+          <p:cNvSpPr txBox="1">
+            <a:spLocks/>
+          </p:cNvSpPr>
+          <p:nvPr/>
+        </p:nvSpPr>
+        <p:spPr bwMode="auto">
+          <a:xfrm>
+            <a:off x="914400" y="1041400"/>
+            <a:ext cx="6781800" cy="474663"/>
+          </a:xfrm>
+          <a:prstGeom prst="rect">
+            <a:avLst/>
+          </a:prstGeom>
+          <a:noFill/>
+          <a:ln w="9525">
+            <a:noFill/>
+            <a:miter lim="800000"/>
+            <a:headEnd/>
+            <a:tailEnd/>
+          </a:ln>
+        </p:spPr>
+        <p:txBody>
+          <a:bodyPr lIns="0" tIns="0" rIns="0" bIns="0"/>
+          <a:lstStyle>
+            <a:lvl1pPr eaLnBrk="0" hangingPunct="0">
+              <a:defRPr sz="2400">
+                <a:solidFill>
+                  <a:schemeClr val="tx1"/>
+                </a:solidFill>
+                <a:latin typeface="Tahoma" charset="0"/>
+                <a:cs typeface="Arial" charset="0"/>
+              </a:defRPr>
+            </a:lvl1pPr>
+            <a:lvl2pPr marL="37931725" indent="-37474525" eaLnBrk="0" hangingPunct="0">
+              <a:defRPr sz="2400">
+                <a:solidFill>
+                  <a:schemeClr val="tx1"/>
+                </a:solidFill>
+                <a:latin typeface="Tahoma" charset="0"/>
+                <a:cs typeface="Arial" charset="0"/>
+              </a:defRPr>
+            </a:lvl2pPr>
+            <a:lvl3pPr eaLnBrk="0" hangingPunct="0">
+              <a:defRPr sz="2400">
+                <a:solidFill>
+                  <a:schemeClr val="tx1"/>
+                </a:solidFill>
+                <a:latin typeface="Tahoma" charset="0"/>
+                <a:cs typeface="Arial" charset="0"/>
+              </a:defRPr>
+            </a:lvl3pPr>
+            <a:lvl4pPr eaLnBrk="0" hangingPunct="0">
+              <a:defRPr sz="2400">
+                <a:solidFill>
+                  <a:schemeClr val="tx1"/>
+                </a:solidFill>
+                <a:latin typeface="Tahoma" charset="0"/>
+                <a:cs typeface="Arial" charset="0"/>
+              </a:defRPr>
+            </a:lvl4pPr>
+            <a:lvl5pPr eaLnBrk="0" hangingPunct="0">
+              <a:defRPr sz="2400">
+                <a:solidFill>
+                  <a:schemeClr val="tx1"/>
+                </a:solidFill>
+                <a:latin typeface="Tahoma" charset="0"/>
+                <a:cs typeface="Arial" charset="0"/>
+              </a:defRPr>
+            </a:lvl5pPr>
+            <a:lvl6pPr marL="457200" eaLnBrk="0" fontAlgn="base" hangingPunct="0">
+              <a:spcBef>
+                <a:spcPct val="0"/>
+              </a:spcBef>
+              <a:spcAft>
+                <a:spcPct val="0"/>
+              </a:spcAft>
+              <a:defRPr sz="2400">
+                <a:solidFill>
+                  <a:schemeClr val="tx1"/>
+                </a:solidFill>
+                <a:latin typeface="Tahoma" charset="0"/>
+                <a:cs typeface="Arial" charset="0"/>
+              </a:defRPr>
+            </a:lvl6pPr>
+            <a:lvl7pPr marL="914400" eaLnBrk="0" fontAlgn="base" hangingPunct="0">
+              <a:spcBef>
+                <a:spcPct val="0"/>
+              </a:spcBef>
+              <a:spcAft>
+                <a:spcPct val="0"/>
+              </a:spcAft>
+              <a:defRPr sz="2400">
+                <a:solidFill>
+                  <a:schemeClr val="tx1"/>
+                </a:solidFill>
+                <a:latin typeface="Tahoma" charset="0"/>
+                <a:cs typeface="Arial" charset="0"/>
+              </a:defRPr>
+            </a:lvl7pPr>
+            <a:lvl8pPr marL="1371600" eaLnBrk="0" fontAlgn="base" hangingPunct="0">
+              <a:spcBef>
+                <a:spcPct val="0"/>
+              </a:spcBef>
+              <a:spcAft>
+                <a:spcPct val="0"/>
+              </a:spcAft>
+              <a:defRPr sz="2400">
+                <a:solidFill>
+                  <a:schemeClr val="tx1"/>
+                </a:solidFill>
+                <a:latin typeface="Tahoma" charset="0"/>
+                <a:cs typeface="Arial" charset="0"/>
+              </a:defRPr>
+            </a:lvl8pPr>
+            <a:lvl9pPr marL="1828800" eaLnBrk="0" fontAlgn="base" hangingPunct="0">
+              <a:spcBef>
+                <a:spcPct val="0"/>
+              </a:spcBef>
+              <a:spcAft>
+                <a:spcPct val="0"/>
+              </a:spcAft>
+              <a:defRPr sz="2400">
+                <a:solidFill>
+                  <a:schemeClr val="tx1"/>
+                </a:solidFill>
+                <a:latin typeface="Tahoma" charset="0"/>
+                <a:cs typeface="Arial" charset="0"/>
+              </a:defRPr>
+            </a:lvl9pPr>
+          </a:lstStyle>
+          <a:p>
+            <a:pPr algn="l">
+              <a:lnSpc>
+                <a:spcPts val="2500"/>
+              </a:lnSpc>
+              <a:buClr>
+                <a:srgbClr val="00A6D6"/>
+              </a:buClr>
+              <a:defRPr/>
+            </a:pPr>
+            <a:r>
+              <a:rPr lang="nl-NL" altLang="nl-NL" sz="2000" dirty="0" smtClean="0">
+                <a:solidFill>
+                  <a:srgbClr val="00A6D6"/>
+                </a:solidFill>
+                <a:latin typeface="+mn-lt"/>
+                <a:ea typeface="ＭＳ Ｐゴシック" charset="-128"/>
+              </a:rPr>
+              <a:t>FSM ‘</a:t>
+            </a:r>
+            <a:r>
+              <a:rPr lang="nl-NL" altLang="nl-NL" sz="2000" dirty="0" err="1" smtClean="0">
+                <a:solidFill>
+                  <a:srgbClr val="00A6D6"/>
+                </a:solidFill>
+                <a:latin typeface="+mn-lt"/>
+                <a:ea typeface="ＭＳ Ｐゴシック" charset="-128"/>
+              </a:rPr>
+              <a:t>Compare</a:t>
+            </a:r>
+            <a:r>
+              <a:rPr lang="nl-NL" altLang="nl-NL" sz="2000" dirty="0" smtClean="0">
+                <a:solidFill>
+                  <a:srgbClr val="00A6D6"/>
+                </a:solidFill>
+                <a:latin typeface="+mn-lt"/>
+                <a:ea typeface="ＭＳ Ｐゴシック" charset="-128"/>
+              </a:rPr>
+              <a:t>’</a:t>
+            </a:r>
+          </a:p>
+        </p:txBody>
+      </p:sp>
+      <p:pic>
+        <p:nvPicPr>
+          <p:cNvPr id="5" name="Tijdelijke aanduiding voor inhoud 1"/>
+          <p:cNvPicPr>
+            <a:picLocks noGrp="1" noChangeAspect="1"/>
+          </p:cNvPicPr>
+          <p:nvPr>
+            <p:ph idx="1"/>
+          </p:nvPr>
+        </p:nvPicPr>
+        <p:blipFill>
+          <a:blip r:embed="rId2">
+            <a:extLst>
+              <a:ext uri="{28A0092B-C50C-407E-A947-70E740481C1C}">
+                <a14:useLocalDpi xmlns:a14="http://schemas.microsoft.com/office/drawing/2010/main" val="0"/>
+              </a:ext>
+            </a:extLst>
+          </a:blip>
+          <a:stretch>
+            <a:fillRect/>
+          </a:stretch>
+        </p:blipFill>
+        <p:spPr>
+          <a:xfrm>
+            <a:off x="532263" y="1316251"/>
+            <a:ext cx="7789246" cy="4646400"/>
+          </a:xfrm>
+        </p:spPr>
+      </p:pic>
+    </p:spTree>
+    <p:extLst>
+      <p:ext uri="{BB962C8B-B14F-4D97-AF65-F5344CB8AC3E}">
+        <p14:creationId xmlns:p14="http://schemas.microsoft.com/office/powerpoint/2010/main" val="1260428583"/>
+      </p:ext>
+    </p:extLst>
+  </p:cSld>
+  <p:clrMapOvr>
+    <a:masterClrMapping/>
+  </p:clrMapOvr>
+  <p:timing>
+    <p:tnLst>
+      <p:par>
+        <p:cTn id="1" dur="indefinite" restart="never" nodeType="tmRoot"/>
+      </p:par>
+    </p:tnLst>
+  </p:timing>
+</p:sld>
+</file>
+
+<file path=ppt/slides/slide16.xml><?xml version="1.0" encoding="utf-8"?>
+<p:sld xmlns:a="http://schemas.openxmlformats.org/drawingml/2006/main" xmlns:r="http://schemas.openxmlformats.org/officeDocument/2006/relationships" xmlns:p="http://schemas.openxmlformats.org/presentationml/2006/main">
+  <p:cSld>
+    <p:spTree>
+      <p:nvGrpSpPr>
+        <p:cNvPr id="1" name=""/>
+        <p:cNvGrpSpPr/>
+        <p:nvPr/>
+      </p:nvGrpSpPr>
+      <p:grpSpPr>
+        <a:xfrm>
+          <a:off x="0" y="0"/>
+          <a:ext cx="0" cy="0"/>
+          <a:chOff x="0" y="0"/>
+          <a:chExt cx="0" cy="0"/>
+        </a:xfrm>
+      </p:grpSpPr>
+      <p:sp>
+        <p:nvSpPr>
+          <p:cNvPr id="4098" name="Title 3"/>
+          <p:cNvSpPr>
+            <a:spLocks noGrp="1"/>
+          </p:cNvSpPr>
+          <p:nvPr>
+            <p:ph type="title"/>
+          </p:nvPr>
+        </p:nvSpPr>
+        <p:spPr>
+          <a:xfrm>
+            <a:off x="917575" y="457200"/>
+            <a:ext cx="7159625" cy="627063"/>
+          </a:xfrm>
+        </p:spPr>
+        <p:txBody>
+          <a:bodyPr/>
+          <a:lstStyle/>
+          <a:p>
+            <a:pPr>
+              <a:defRPr/>
+            </a:pPr>
+            <a:r>
+              <a:rPr lang="nl-NL" altLang="nl-NL" dirty="0" smtClean="0">
+                <a:latin typeface="+mn-lt"/>
+                <a:ea typeface="ＭＳ Ｐゴシック" pitchFamily="34" charset="-128"/>
+              </a:rPr>
+              <a:t>Alarm</a:t>
+            </a:r>
+          </a:p>
+        </p:txBody>
+      </p:sp>
+      <p:sp>
+        <p:nvSpPr>
+          <p:cNvPr id="6" name="Ondertitel 2"/>
+          <p:cNvSpPr txBox="1">
+            <a:spLocks/>
+          </p:cNvSpPr>
+          <p:nvPr/>
+        </p:nvSpPr>
+        <p:spPr bwMode="auto">
+          <a:xfrm>
+            <a:off x="914400" y="1041400"/>
+            <a:ext cx="6781800" cy="474663"/>
+          </a:xfrm>
+          <a:prstGeom prst="rect">
+            <a:avLst/>
+          </a:prstGeom>
+          <a:noFill/>
+          <a:ln w="9525">
+            <a:noFill/>
+            <a:miter lim="800000"/>
+            <a:headEnd/>
+            <a:tailEnd/>
+          </a:ln>
+        </p:spPr>
+        <p:txBody>
+          <a:bodyPr lIns="0" tIns="0" rIns="0" bIns="0"/>
+          <a:lstStyle>
+            <a:lvl1pPr eaLnBrk="0" hangingPunct="0">
+              <a:defRPr sz="2400">
+                <a:solidFill>
+                  <a:schemeClr val="tx1"/>
+                </a:solidFill>
+                <a:latin typeface="Tahoma" charset="0"/>
+                <a:cs typeface="Arial" charset="0"/>
+              </a:defRPr>
+            </a:lvl1pPr>
+            <a:lvl2pPr marL="37931725" indent="-37474525" eaLnBrk="0" hangingPunct="0">
+              <a:defRPr sz="2400">
+                <a:solidFill>
+                  <a:schemeClr val="tx1"/>
+                </a:solidFill>
+                <a:latin typeface="Tahoma" charset="0"/>
+                <a:cs typeface="Arial" charset="0"/>
+              </a:defRPr>
+            </a:lvl2pPr>
+            <a:lvl3pPr eaLnBrk="0" hangingPunct="0">
+              <a:defRPr sz="2400">
+                <a:solidFill>
+                  <a:schemeClr val="tx1"/>
+                </a:solidFill>
+                <a:latin typeface="Tahoma" charset="0"/>
+                <a:cs typeface="Arial" charset="0"/>
+              </a:defRPr>
+            </a:lvl3pPr>
+            <a:lvl4pPr eaLnBrk="0" hangingPunct="0">
+              <a:defRPr sz="2400">
+                <a:solidFill>
+                  <a:schemeClr val="tx1"/>
+                </a:solidFill>
+                <a:latin typeface="Tahoma" charset="0"/>
+                <a:cs typeface="Arial" charset="0"/>
+              </a:defRPr>
+            </a:lvl4pPr>
+            <a:lvl5pPr eaLnBrk="0" hangingPunct="0">
+              <a:defRPr sz="2400">
+                <a:solidFill>
+                  <a:schemeClr val="tx1"/>
+                </a:solidFill>
+                <a:latin typeface="Tahoma" charset="0"/>
+                <a:cs typeface="Arial" charset="0"/>
+              </a:defRPr>
+            </a:lvl5pPr>
+            <a:lvl6pPr marL="457200" eaLnBrk="0" fontAlgn="base" hangingPunct="0">
+              <a:spcBef>
+                <a:spcPct val="0"/>
+              </a:spcBef>
+              <a:spcAft>
+                <a:spcPct val="0"/>
+              </a:spcAft>
+              <a:defRPr sz="2400">
+                <a:solidFill>
+                  <a:schemeClr val="tx1"/>
+                </a:solidFill>
+                <a:latin typeface="Tahoma" charset="0"/>
+                <a:cs typeface="Arial" charset="0"/>
+              </a:defRPr>
+            </a:lvl6pPr>
+            <a:lvl7pPr marL="914400" eaLnBrk="0" fontAlgn="base" hangingPunct="0">
+              <a:spcBef>
+                <a:spcPct val="0"/>
+              </a:spcBef>
+              <a:spcAft>
+                <a:spcPct val="0"/>
+              </a:spcAft>
+              <a:defRPr sz="2400">
+                <a:solidFill>
+                  <a:schemeClr val="tx1"/>
+                </a:solidFill>
+                <a:latin typeface="Tahoma" charset="0"/>
+                <a:cs typeface="Arial" charset="0"/>
+              </a:defRPr>
+            </a:lvl7pPr>
+            <a:lvl8pPr marL="1371600" eaLnBrk="0" fontAlgn="base" hangingPunct="0">
+              <a:spcBef>
+                <a:spcPct val="0"/>
+              </a:spcBef>
+              <a:spcAft>
+                <a:spcPct val="0"/>
+              </a:spcAft>
+              <a:defRPr sz="2400">
+                <a:solidFill>
+                  <a:schemeClr val="tx1"/>
+                </a:solidFill>
+                <a:latin typeface="Tahoma" charset="0"/>
+                <a:cs typeface="Arial" charset="0"/>
+              </a:defRPr>
+            </a:lvl8pPr>
+            <a:lvl9pPr marL="1828800" eaLnBrk="0" fontAlgn="base" hangingPunct="0">
+              <a:spcBef>
+                <a:spcPct val="0"/>
+              </a:spcBef>
+              <a:spcAft>
+                <a:spcPct val="0"/>
+              </a:spcAft>
+              <a:defRPr sz="2400">
+                <a:solidFill>
+                  <a:schemeClr val="tx1"/>
+                </a:solidFill>
+                <a:latin typeface="Tahoma" charset="0"/>
+                <a:cs typeface="Arial" charset="0"/>
+              </a:defRPr>
+            </a:lvl9pPr>
+          </a:lstStyle>
+          <a:p>
+            <a:pPr algn="l">
+              <a:lnSpc>
+                <a:spcPts val="2500"/>
+              </a:lnSpc>
+              <a:buClr>
+                <a:srgbClr val="00A6D6"/>
+              </a:buClr>
+              <a:defRPr/>
+            </a:pPr>
+            <a:r>
+              <a:rPr lang="nl-NL" altLang="nl-NL" sz="2000" dirty="0" smtClean="0">
+                <a:solidFill>
+                  <a:srgbClr val="00A6D6"/>
+                </a:solidFill>
+                <a:latin typeface="+mn-lt"/>
+                <a:ea typeface="ＭＳ Ｐゴシック" charset="-128"/>
+              </a:rPr>
               <a:t>FSM ‘PWM’</a:t>
             </a:r>
-            <a:endParaRPr lang="nl-NL" altLang="nl-NL" sz="2000" dirty="0" smtClean="0">
-              <a:solidFill>
-                <a:srgbClr val="00A6D6"/>
-              </a:solidFill>
-              <a:latin typeface="+mn-lt"/>
-              <a:ea typeface="ＭＳ Ｐゴシック" charset="-128"/>
-            </a:endParaRPr>
           </a:p>
         </p:txBody>
       </p:sp>
@@ -6548,7 +7075,7 @@
 </p:sld>
 </file>
 
-<file path=ppt/slides/slide15.xml><?xml version="1.0" encoding="utf-8"?>
+<file path=ppt/slides/slide17.xml><?xml version="1.0" encoding="utf-8"?>
 <p:sld xmlns:a="http://schemas.openxmlformats.org/drawingml/2006/main" xmlns:r="http://schemas.openxmlformats.org/officeDocument/2006/relationships" xmlns:p="http://schemas.openxmlformats.org/presentationml/2006/main">
   <p:cSld>
     <p:spTree>
@@ -6648,10 +7175,6 @@
               </a:rPr>
               <a:t>Alarm</a:t>
             </a:r>
-            <a:endParaRPr lang="nl-NL" altLang="nl-NL" dirty="0" smtClean="0">
-              <a:latin typeface="+mn-lt"/>
-              <a:ea typeface="ＭＳ Ｐゴシック" pitchFamily="34" charset="-128"/>
-            </a:endParaRPr>
           </a:p>
         </p:txBody>
       </p:sp>
@@ -6808,13 +7331,6 @@
               </a:rPr>
               <a:t>FSM ‘Counter’</a:t>
             </a:r>
-            <a:endParaRPr lang="nl-NL" altLang="nl-NL" sz="2000" dirty="0" smtClean="0">
-              <a:solidFill>
-                <a:srgbClr val="00A6D6"/>
-              </a:solidFill>
-              <a:latin typeface="+mn-lt"/>
-              <a:ea typeface="ＭＳ Ｐゴシック" charset="-128"/>
-            </a:endParaRPr>
           </a:p>
         </p:txBody>
       </p:sp>
@@ -6822,502 +7338,6 @@
     <p:extLst>
       <p:ext uri="{BB962C8B-B14F-4D97-AF65-F5344CB8AC3E}">
         <p14:creationId xmlns:p14="http://schemas.microsoft.com/office/powerpoint/2010/main" val="2660275856"/>
-      </p:ext>
-    </p:extLst>
-  </p:cSld>
-  <p:clrMapOvr>
-    <a:masterClrMapping/>
-  </p:clrMapOvr>
-  <p:timing>
-    <p:tnLst>
-      <p:par>
-        <p:cTn id="1" dur="indefinite" restart="never" nodeType="tmRoot"/>
-      </p:par>
-    </p:tnLst>
-  </p:timing>
-</p:sld>
-</file>
-
-<file path=ppt/slides/slide16.xml><?xml version="1.0" encoding="utf-8"?>
-<p:sld xmlns:a="http://schemas.openxmlformats.org/drawingml/2006/main" xmlns:r="http://schemas.openxmlformats.org/officeDocument/2006/relationships" xmlns:p="http://schemas.openxmlformats.org/presentationml/2006/main">
-  <p:cSld>
-    <p:spTree>
-      <p:nvGrpSpPr>
-        <p:cNvPr id="1" name=""/>
-        <p:cNvGrpSpPr/>
-        <p:nvPr/>
-      </p:nvGrpSpPr>
-      <p:grpSpPr>
-        <a:xfrm>
-          <a:off x="0" y="0"/>
-          <a:ext cx="0" cy="0"/>
-          <a:chOff x="0" y="0"/>
-          <a:chExt cx="0" cy="0"/>
-        </a:xfrm>
-      </p:grpSpPr>
-      <p:sp>
-        <p:nvSpPr>
-          <p:cNvPr id="2" name="Titel 1"/>
-          <p:cNvSpPr>
-            <a:spLocks noGrp="1"/>
-          </p:cNvSpPr>
-          <p:nvPr>
-            <p:ph type="title"/>
-          </p:nvPr>
-        </p:nvSpPr>
-        <p:spPr/>
-        <p:txBody>
-          <a:bodyPr/>
-          <a:lstStyle/>
-          <a:p>
-            <a:r>
-              <a:rPr lang="nl-NL" dirty="0" smtClean="0"/>
-              <a:t>LCD module</a:t>
-            </a:r>
-            <a:endParaRPr lang="nl-NL" dirty="0"/>
-          </a:p>
-        </p:txBody>
-      </p:sp>
-    </p:spTree>
-    <p:extLst>
-      <p:ext uri="{BB962C8B-B14F-4D97-AF65-F5344CB8AC3E}">
-        <p14:creationId xmlns:p14="http://schemas.microsoft.com/office/powerpoint/2010/main" val="3719282447"/>
-      </p:ext>
-    </p:extLst>
-  </p:cSld>
-  <p:clrMapOvr>
-    <a:masterClrMapping/>
-  </p:clrMapOvr>
-  <p:timing>
-    <p:tnLst>
-      <p:par>
-        <p:cTn id="1" dur="indefinite" restart="never" nodeType="tmRoot"/>
-      </p:par>
-    </p:tnLst>
-  </p:timing>
-</p:sld>
-</file>
-
-<file path=ppt/slides/slide17.xml><?xml version="1.0" encoding="utf-8"?>
-<p:sld xmlns:a="http://schemas.openxmlformats.org/drawingml/2006/main" xmlns:r="http://schemas.openxmlformats.org/officeDocument/2006/relationships" xmlns:p="http://schemas.openxmlformats.org/presentationml/2006/main">
-  <p:cSld>
-    <p:spTree>
-      <p:nvGrpSpPr>
-        <p:cNvPr id="1" name=""/>
-        <p:cNvGrpSpPr/>
-        <p:nvPr/>
-      </p:nvGrpSpPr>
-      <p:grpSpPr>
-        <a:xfrm>
-          <a:off x="0" y="0"/>
-          <a:ext cx="0" cy="0"/>
-          <a:chOff x="0" y="0"/>
-          <a:chExt cx="0" cy="0"/>
-        </a:xfrm>
-      </p:grpSpPr>
-      <p:sp>
-        <p:nvSpPr>
-          <p:cNvPr id="4098" name="Title 3"/>
-          <p:cNvSpPr>
-            <a:spLocks noGrp="1"/>
-          </p:cNvSpPr>
-          <p:nvPr>
-            <p:ph type="title"/>
-          </p:nvPr>
-        </p:nvSpPr>
-        <p:spPr>
-          <a:xfrm>
-            <a:off x="915193" y="502892"/>
-            <a:ext cx="7159625" cy="627063"/>
-          </a:xfrm>
-        </p:spPr>
-        <p:txBody>
-          <a:bodyPr/>
-          <a:lstStyle/>
-          <a:p>
-            <a:pPr>
-              <a:defRPr/>
-            </a:pPr>
-            <a:r>
-              <a:rPr lang="nl-NL" altLang="nl-NL" dirty="0" smtClean="0">
-                <a:latin typeface="+mn-lt"/>
-                <a:ea typeface="ＭＳ Ｐゴシック" pitchFamily="34" charset="-128"/>
-              </a:rPr>
-              <a:t>LCD</a:t>
-            </a:r>
-          </a:p>
-        </p:txBody>
-      </p:sp>
-      <p:sp>
-        <p:nvSpPr>
-          <p:cNvPr id="6" name="Ondertitel 2"/>
-          <p:cNvSpPr txBox="1">
-            <a:spLocks/>
-          </p:cNvSpPr>
-          <p:nvPr/>
-        </p:nvSpPr>
-        <p:spPr bwMode="auto">
-          <a:xfrm>
-            <a:off x="914400" y="1041400"/>
-            <a:ext cx="6781800" cy="474663"/>
-          </a:xfrm>
-          <a:prstGeom prst="rect">
-            <a:avLst/>
-          </a:prstGeom>
-          <a:noFill/>
-          <a:ln w="9525">
-            <a:noFill/>
-            <a:miter lim="800000"/>
-            <a:headEnd/>
-            <a:tailEnd/>
-          </a:ln>
-        </p:spPr>
-        <p:txBody>
-          <a:bodyPr lIns="0" tIns="0" rIns="0" bIns="0"/>
-          <a:lstStyle>
-            <a:lvl1pPr eaLnBrk="0" hangingPunct="0">
-              <a:defRPr sz="2400">
-                <a:solidFill>
-                  <a:schemeClr val="tx1"/>
-                </a:solidFill>
-                <a:latin typeface="Tahoma" charset="0"/>
-                <a:cs typeface="Arial" charset="0"/>
-              </a:defRPr>
-            </a:lvl1pPr>
-            <a:lvl2pPr marL="37931725" indent="-37474525" eaLnBrk="0" hangingPunct="0">
-              <a:defRPr sz="2400">
-                <a:solidFill>
-                  <a:schemeClr val="tx1"/>
-                </a:solidFill>
-                <a:latin typeface="Tahoma" charset="0"/>
-                <a:cs typeface="Arial" charset="0"/>
-              </a:defRPr>
-            </a:lvl2pPr>
-            <a:lvl3pPr eaLnBrk="0" hangingPunct="0">
-              <a:defRPr sz="2400">
-                <a:solidFill>
-                  <a:schemeClr val="tx1"/>
-                </a:solidFill>
-                <a:latin typeface="Tahoma" charset="0"/>
-                <a:cs typeface="Arial" charset="0"/>
-              </a:defRPr>
-            </a:lvl3pPr>
-            <a:lvl4pPr eaLnBrk="0" hangingPunct="0">
-              <a:defRPr sz="2400">
-                <a:solidFill>
-                  <a:schemeClr val="tx1"/>
-                </a:solidFill>
-                <a:latin typeface="Tahoma" charset="0"/>
-                <a:cs typeface="Arial" charset="0"/>
-              </a:defRPr>
-            </a:lvl4pPr>
-            <a:lvl5pPr eaLnBrk="0" hangingPunct="0">
-              <a:defRPr sz="2400">
-                <a:solidFill>
-                  <a:schemeClr val="tx1"/>
-                </a:solidFill>
-                <a:latin typeface="Tahoma" charset="0"/>
-                <a:cs typeface="Arial" charset="0"/>
-              </a:defRPr>
-            </a:lvl5pPr>
-            <a:lvl6pPr marL="457200" eaLnBrk="0" fontAlgn="base" hangingPunct="0">
-              <a:spcBef>
-                <a:spcPct val="0"/>
-              </a:spcBef>
-              <a:spcAft>
-                <a:spcPct val="0"/>
-              </a:spcAft>
-              <a:defRPr sz="2400">
-                <a:solidFill>
-                  <a:schemeClr val="tx1"/>
-                </a:solidFill>
-                <a:latin typeface="Tahoma" charset="0"/>
-                <a:cs typeface="Arial" charset="0"/>
-              </a:defRPr>
-            </a:lvl6pPr>
-            <a:lvl7pPr marL="914400" eaLnBrk="0" fontAlgn="base" hangingPunct="0">
-              <a:spcBef>
-                <a:spcPct val="0"/>
-              </a:spcBef>
-              <a:spcAft>
-                <a:spcPct val="0"/>
-              </a:spcAft>
-              <a:defRPr sz="2400">
-                <a:solidFill>
-                  <a:schemeClr val="tx1"/>
-                </a:solidFill>
-                <a:latin typeface="Tahoma" charset="0"/>
-                <a:cs typeface="Arial" charset="0"/>
-              </a:defRPr>
-            </a:lvl7pPr>
-            <a:lvl8pPr marL="1371600" eaLnBrk="0" fontAlgn="base" hangingPunct="0">
-              <a:spcBef>
-                <a:spcPct val="0"/>
-              </a:spcBef>
-              <a:spcAft>
-                <a:spcPct val="0"/>
-              </a:spcAft>
-              <a:defRPr sz="2400">
-                <a:solidFill>
-                  <a:schemeClr val="tx1"/>
-                </a:solidFill>
-                <a:latin typeface="Tahoma" charset="0"/>
-                <a:cs typeface="Arial" charset="0"/>
-              </a:defRPr>
-            </a:lvl8pPr>
-            <a:lvl9pPr marL="1828800" eaLnBrk="0" fontAlgn="base" hangingPunct="0">
-              <a:spcBef>
-                <a:spcPct val="0"/>
-              </a:spcBef>
-              <a:spcAft>
-                <a:spcPct val="0"/>
-              </a:spcAft>
-              <a:defRPr sz="2400">
-                <a:solidFill>
-                  <a:schemeClr val="tx1"/>
-                </a:solidFill>
-                <a:latin typeface="Tahoma" charset="0"/>
-                <a:cs typeface="Arial" charset="0"/>
-              </a:defRPr>
-            </a:lvl9pPr>
-          </a:lstStyle>
-          <a:p>
-            <a:pPr algn="l">
-              <a:lnSpc>
-                <a:spcPts val="2500"/>
-              </a:lnSpc>
-              <a:buClr>
-                <a:srgbClr val="00A6D6"/>
-              </a:buClr>
-              <a:defRPr/>
-            </a:pPr>
-            <a:r>
-              <a:rPr lang="nl-NL" altLang="nl-NL" sz="2000" dirty="0" smtClean="0">
-                <a:solidFill>
-                  <a:srgbClr val="00A6D6"/>
-                </a:solidFill>
-                <a:latin typeface="Tahoma"/>
-                <a:ea typeface="ＭＳ Ｐゴシック" charset="-128"/>
-              </a:rPr>
-              <a:t>Het totale systeem</a:t>
-            </a:r>
-          </a:p>
-        </p:txBody>
-      </p:sp>
-      <p:sp>
-        <p:nvSpPr>
-          <p:cNvPr id="4" name="Tijdelijke aanduiding voor inhoud 3"/>
-          <p:cNvSpPr>
-            <a:spLocks noGrp="1"/>
-          </p:cNvSpPr>
-          <p:nvPr>
-            <p:ph idx="1"/>
-          </p:nvPr>
-        </p:nvSpPr>
-        <p:spPr/>
-        <p:txBody>
-          <a:bodyPr/>
-          <a:lstStyle/>
-          <a:p>
-            <a:pPr lvl="0"/>
-            <a:r>
-              <a:rPr lang="nl-NL" dirty="0"/>
-              <a:t>LCD MIDAS typenummer </a:t>
-            </a:r>
-            <a:r>
-              <a:rPr lang="nl-NL" dirty="0" smtClean="0"/>
-              <a:t>MC128064B6W-BNMLW</a:t>
-            </a:r>
-          </a:p>
-          <a:p>
-            <a:pPr lvl="0"/>
-            <a:endParaRPr lang="nl-NL" dirty="0"/>
-          </a:p>
-          <a:p>
-            <a:pPr lvl="0"/>
-            <a:r>
-              <a:rPr lang="nl-NL" dirty="0"/>
-              <a:t>Chip geeft x-y positie met </a:t>
-            </a:r>
-            <a:r>
-              <a:rPr lang="nl-NL" dirty="0" smtClean="0"/>
-              <a:t>karakter</a:t>
-            </a:r>
-          </a:p>
-          <a:p>
-            <a:pPr lvl="0"/>
-            <a:endParaRPr lang="nl-NL" dirty="0"/>
-          </a:p>
-          <a:p>
-            <a:pPr lvl="0"/>
-            <a:r>
-              <a:rPr lang="nl-NL" dirty="0"/>
-              <a:t>Atmega32-16pu met karakter bibliotheek en schrijf </a:t>
-            </a:r>
-            <a:r>
-              <a:rPr lang="nl-NL" dirty="0" smtClean="0"/>
-              <a:t>routine</a:t>
-            </a:r>
-            <a:endParaRPr lang="nl-NL" dirty="0"/>
-          </a:p>
-        </p:txBody>
-      </p:sp>
-      <p:pic>
-        <p:nvPicPr>
-          <p:cNvPr id="8" name="voorbeeld_lcd.png"/>
-          <p:cNvPicPr/>
-          <p:nvPr/>
-        </p:nvPicPr>
-        <p:blipFill>
-          <a:blip r:embed="rId2">
-            <a:extLst/>
-          </a:blip>
-          <a:stretch>
-            <a:fillRect/>
-          </a:stretch>
-        </p:blipFill>
-        <p:spPr>
-          <a:xfrm>
-            <a:off x="5058289" y="4160983"/>
-            <a:ext cx="3059981" cy="1373199"/>
-          </a:xfrm>
-          <a:prstGeom prst="rect">
-            <a:avLst/>
-          </a:prstGeom>
-          <a:ln w="12700">
-            <a:miter lim="400000"/>
-          </a:ln>
-        </p:spPr>
-      </p:pic>
-      <p:pic>
-        <p:nvPicPr>
-          <p:cNvPr id="10" name="pasted-image.tif"/>
-          <p:cNvPicPr/>
-          <p:nvPr/>
-        </p:nvPicPr>
-        <p:blipFill>
-          <a:blip r:embed="rId3">
-            <a:extLst/>
-          </a:blip>
-          <a:srcRect l="31265" t="1357" r="31139" b="10740"/>
-          <a:stretch>
-            <a:fillRect/>
-          </a:stretch>
-        </p:blipFill>
-        <p:spPr>
-          <a:xfrm>
-            <a:off x="3586356" y="3990773"/>
-            <a:ext cx="673162" cy="1774865"/>
-          </a:xfrm>
-          <a:prstGeom prst="rect">
-            <a:avLst/>
-          </a:prstGeom>
-          <a:ln w="12700">
-            <a:miter lim="400000"/>
-          </a:ln>
-        </p:spPr>
-      </p:pic>
-      <p:pic>
-        <p:nvPicPr>
-          <p:cNvPr id="11" name="toplevel_entity.png"/>
-          <p:cNvPicPr/>
-          <p:nvPr/>
-        </p:nvPicPr>
-        <p:blipFill>
-          <a:blip r:embed="rId4">
-            <a:extLst/>
-          </a:blip>
-          <a:stretch>
-            <a:fillRect/>
-          </a:stretch>
-        </p:blipFill>
-        <p:spPr>
-          <a:xfrm>
-            <a:off x="468569" y="3929528"/>
-            <a:ext cx="2823273" cy="1836110"/>
-          </a:xfrm>
-          <a:prstGeom prst="rect">
-            <a:avLst/>
-          </a:prstGeom>
-          <a:ln w="12700">
-            <a:miter lim="400000"/>
-          </a:ln>
-        </p:spPr>
-      </p:pic>
-      <p:sp>
-        <p:nvSpPr>
-          <p:cNvPr id="12" name="Shape 41"/>
-          <p:cNvSpPr/>
-          <p:nvPr/>
-        </p:nvSpPr>
-        <p:spPr>
-          <a:xfrm>
-            <a:off x="2787586" y="4604708"/>
-            <a:ext cx="798770" cy="0"/>
-          </a:xfrm>
-          <a:prstGeom prst="line">
-            <a:avLst/>
-          </a:prstGeom>
-          <a:ln w="63500">
-            <a:solidFill/>
-            <a:miter lim="400000"/>
-            <a:tailEnd type="triangle"/>
-          </a:ln>
-        </p:spPr>
-        <p:txBody>
-          <a:bodyPr lIns="0" tIns="0" rIns="0" bIns="0" anchor="ctr"/>
-          <a:lstStyle/>
-          <a:p>
-            <a:pPr>
-              <a:defRPr sz="2400"/>
-            </a:pPr>
-            <a:endParaRPr>
-              <a:solidFill>
-                <a:srgbClr val="000000"/>
-              </a:solidFill>
-            </a:endParaRPr>
-          </a:p>
-        </p:txBody>
-      </p:sp>
-      <p:sp>
-        <p:nvSpPr>
-          <p:cNvPr id="13" name="Shape 42"/>
-          <p:cNvSpPr/>
-          <p:nvPr/>
-        </p:nvSpPr>
-        <p:spPr>
-          <a:xfrm>
-            <a:off x="4259518" y="4604708"/>
-            <a:ext cx="798771" cy="0"/>
-          </a:xfrm>
-          <a:prstGeom prst="line">
-            <a:avLst/>
-          </a:prstGeom>
-          <a:ln w="63500">
-            <a:solidFill/>
-            <a:miter lim="400000"/>
-            <a:tailEnd type="triangle"/>
-          </a:ln>
-        </p:spPr>
-        <p:txBody>
-          <a:bodyPr lIns="0" tIns="0" rIns="0" bIns="0" anchor="ctr"/>
-          <a:lstStyle/>
-          <a:p>
-            <a:pPr>
-              <a:defRPr sz="2400"/>
-            </a:pPr>
-            <a:endParaRPr>
-              <a:solidFill>
-                <a:srgbClr val="000000"/>
-              </a:solidFill>
-            </a:endParaRPr>
-          </a:p>
-        </p:txBody>
-      </p:sp>
-    </p:spTree>
-    <p:extLst>
-      <p:ext uri="{BB962C8B-B14F-4D97-AF65-F5344CB8AC3E}">
-        <p14:creationId xmlns:p14="http://schemas.microsoft.com/office/powerpoint/2010/main" val="1029360624"/>
       </p:ext>
     </p:extLst>
   </p:cSld>
@@ -7353,7 +7373,7 @@
       </p:grpSpPr>
       <p:sp>
         <p:nvSpPr>
-          <p:cNvPr id="4098" name="Title 3"/>
+          <p:cNvPr id="2" name="Titel 1"/>
           <p:cNvSpPr>
             <a:spLocks noGrp="1"/>
           </p:cNvSpPr>
@@ -7361,378 +7381,23 @@
             <p:ph type="title"/>
           </p:nvPr>
         </p:nvSpPr>
-        <p:spPr>
-          <a:xfrm>
-            <a:off x="915193" y="502892"/>
-            <a:ext cx="7159625" cy="627063"/>
-          </a:xfrm>
-        </p:spPr>
+        <p:spPr/>
         <p:txBody>
           <a:bodyPr/>
           <a:lstStyle/>
           <a:p>
-            <a:pPr>
-              <a:defRPr/>
-            </a:pPr>
-            <a:r>
-              <a:rPr lang="nl-NL" altLang="nl-NL" dirty="0" smtClean="0">
-                <a:latin typeface="+mn-lt"/>
-                <a:ea typeface="ＭＳ Ｐゴシック" pitchFamily="34" charset="-128"/>
-              </a:rPr>
-              <a:t>LCD</a:t>
-            </a:r>
+            <a:r>
+              <a:rPr lang="nl-NL" dirty="0" smtClean="0"/>
+              <a:t>LCD module</a:t>
+            </a:r>
+            <a:endParaRPr lang="nl-NL" dirty="0"/>
           </a:p>
         </p:txBody>
       </p:sp>
-      <p:sp>
-        <p:nvSpPr>
-          <p:cNvPr id="6" name="Ondertitel 2"/>
-          <p:cNvSpPr txBox="1">
-            <a:spLocks/>
-          </p:cNvSpPr>
-          <p:nvPr/>
-        </p:nvSpPr>
-        <p:spPr bwMode="auto">
-          <a:xfrm>
-            <a:off x="914400" y="1041400"/>
-            <a:ext cx="6781800" cy="474663"/>
-          </a:xfrm>
-          <a:prstGeom prst="rect">
-            <a:avLst/>
-          </a:prstGeom>
-          <a:noFill/>
-          <a:ln w="9525">
-            <a:noFill/>
-            <a:miter lim="800000"/>
-            <a:headEnd/>
-            <a:tailEnd/>
-          </a:ln>
-        </p:spPr>
-        <p:txBody>
-          <a:bodyPr lIns="0" tIns="0" rIns="0" bIns="0"/>
-          <a:lstStyle>
-            <a:lvl1pPr eaLnBrk="0" hangingPunct="0">
-              <a:defRPr sz="2400">
-                <a:solidFill>
-                  <a:schemeClr val="tx1"/>
-                </a:solidFill>
-                <a:latin typeface="Tahoma" charset="0"/>
-                <a:cs typeface="Arial" charset="0"/>
-              </a:defRPr>
-            </a:lvl1pPr>
-            <a:lvl2pPr marL="37931725" indent="-37474525" eaLnBrk="0" hangingPunct="0">
-              <a:defRPr sz="2400">
-                <a:solidFill>
-                  <a:schemeClr val="tx1"/>
-                </a:solidFill>
-                <a:latin typeface="Tahoma" charset="0"/>
-                <a:cs typeface="Arial" charset="0"/>
-              </a:defRPr>
-            </a:lvl2pPr>
-            <a:lvl3pPr eaLnBrk="0" hangingPunct="0">
-              <a:defRPr sz="2400">
-                <a:solidFill>
-                  <a:schemeClr val="tx1"/>
-                </a:solidFill>
-                <a:latin typeface="Tahoma" charset="0"/>
-                <a:cs typeface="Arial" charset="0"/>
-              </a:defRPr>
-            </a:lvl3pPr>
-            <a:lvl4pPr eaLnBrk="0" hangingPunct="0">
-              <a:defRPr sz="2400">
-                <a:solidFill>
-                  <a:schemeClr val="tx1"/>
-                </a:solidFill>
-                <a:latin typeface="Tahoma" charset="0"/>
-                <a:cs typeface="Arial" charset="0"/>
-              </a:defRPr>
-            </a:lvl4pPr>
-            <a:lvl5pPr eaLnBrk="0" hangingPunct="0">
-              <a:defRPr sz="2400">
-                <a:solidFill>
-                  <a:schemeClr val="tx1"/>
-                </a:solidFill>
-                <a:latin typeface="Tahoma" charset="0"/>
-                <a:cs typeface="Arial" charset="0"/>
-              </a:defRPr>
-            </a:lvl5pPr>
-            <a:lvl6pPr marL="457200" eaLnBrk="0" fontAlgn="base" hangingPunct="0">
-              <a:spcBef>
-                <a:spcPct val="0"/>
-              </a:spcBef>
-              <a:spcAft>
-                <a:spcPct val="0"/>
-              </a:spcAft>
-              <a:defRPr sz="2400">
-                <a:solidFill>
-                  <a:schemeClr val="tx1"/>
-                </a:solidFill>
-                <a:latin typeface="Tahoma" charset="0"/>
-                <a:cs typeface="Arial" charset="0"/>
-              </a:defRPr>
-            </a:lvl6pPr>
-            <a:lvl7pPr marL="914400" eaLnBrk="0" fontAlgn="base" hangingPunct="0">
-              <a:spcBef>
-                <a:spcPct val="0"/>
-              </a:spcBef>
-              <a:spcAft>
-                <a:spcPct val="0"/>
-              </a:spcAft>
-              <a:defRPr sz="2400">
-                <a:solidFill>
-                  <a:schemeClr val="tx1"/>
-                </a:solidFill>
-                <a:latin typeface="Tahoma" charset="0"/>
-                <a:cs typeface="Arial" charset="0"/>
-              </a:defRPr>
-            </a:lvl7pPr>
-            <a:lvl8pPr marL="1371600" eaLnBrk="0" fontAlgn="base" hangingPunct="0">
-              <a:spcBef>
-                <a:spcPct val="0"/>
-              </a:spcBef>
-              <a:spcAft>
-                <a:spcPct val="0"/>
-              </a:spcAft>
-              <a:defRPr sz="2400">
-                <a:solidFill>
-                  <a:schemeClr val="tx1"/>
-                </a:solidFill>
-                <a:latin typeface="Tahoma" charset="0"/>
-                <a:cs typeface="Arial" charset="0"/>
-              </a:defRPr>
-            </a:lvl8pPr>
-            <a:lvl9pPr marL="1828800" eaLnBrk="0" fontAlgn="base" hangingPunct="0">
-              <a:spcBef>
-                <a:spcPct val="0"/>
-              </a:spcBef>
-              <a:spcAft>
-                <a:spcPct val="0"/>
-              </a:spcAft>
-              <a:defRPr sz="2400">
-                <a:solidFill>
-                  <a:schemeClr val="tx1"/>
-                </a:solidFill>
-                <a:latin typeface="Tahoma" charset="0"/>
-                <a:cs typeface="Arial" charset="0"/>
-              </a:defRPr>
-            </a:lvl9pPr>
-          </a:lstStyle>
-          <a:p>
-            <a:pPr algn="l">
-              <a:lnSpc>
-                <a:spcPts val="2500"/>
-              </a:lnSpc>
-              <a:buClr>
-                <a:srgbClr val="00A6D6"/>
-              </a:buClr>
-              <a:defRPr/>
-            </a:pPr>
-            <a:r>
-              <a:rPr lang="nl-NL" altLang="nl-NL" sz="2000" dirty="0" smtClean="0">
-                <a:solidFill>
-                  <a:srgbClr val="00A6D6"/>
-                </a:solidFill>
-                <a:latin typeface="Tahoma"/>
-                <a:ea typeface="ＭＳ Ｐゴシック" charset="-128"/>
-              </a:rPr>
-              <a:t>Werking display</a:t>
-            </a:r>
-          </a:p>
-        </p:txBody>
-      </p:sp>
-      <p:pic>
-        <p:nvPicPr>
-          <p:cNvPr id="14" name="voorbeeld_lcd.png"/>
-          <p:cNvPicPr/>
-          <p:nvPr/>
-        </p:nvPicPr>
-        <p:blipFill>
-          <a:blip r:embed="rId2">
-            <a:extLst/>
-          </a:blip>
-          <a:stretch>
-            <a:fillRect/>
-          </a:stretch>
-        </p:blipFill>
-        <p:spPr>
-          <a:xfrm>
-            <a:off x="2796156" y="4305606"/>
-            <a:ext cx="3147444" cy="1422333"/>
-          </a:xfrm>
-          <a:prstGeom prst="rect">
-            <a:avLst/>
-          </a:prstGeom>
-          <a:ln w="12700">
-            <a:miter lim="400000"/>
-          </a:ln>
-        </p:spPr>
-      </p:pic>
-      <p:pic>
-        <p:nvPicPr>
-          <p:cNvPr id="15" name="pasted-image.png"/>
-          <p:cNvPicPr/>
-          <p:nvPr/>
-        </p:nvPicPr>
-        <p:blipFill>
-          <a:blip r:embed="rId3">
-            <a:extLst/>
-          </a:blip>
-          <a:stretch>
-            <a:fillRect/>
-          </a:stretch>
-        </p:blipFill>
-        <p:spPr>
-          <a:xfrm>
-            <a:off x="5297313" y="2054571"/>
-            <a:ext cx="3583304" cy="2087816"/>
-          </a:xfrm>
-          <a:prstGeom prst="rect">
-            <a:avLst/>
-          </a:prstGeom>
-          <a:ln w="12700">
-            <a:miter lim="400000"/>
-          </a:ln>
-        </p:spPr>
-      </p:pic>
-      <p:pic>
-        <p:nvPicPr>
-          <p:cNvPr id="16" name="pasted-image.png"/>
-          <p:cNvPicPr/>
-          <p:nvPr/>
-        </p:nvPicPr>
-        <p:blipFill>
-          <a:blip r:embed="rId4">
-            <a:extLst/>
-          </a:blip>
-          <a:stretch>
-            <a:fillRect/>
-          </a:stretch>
-        </p:blipFill>
-        <p:spPr>
-          <a:xfrm>
-            <a:off x="268958" y="2054571"/>
-            <a:ext cx="2010067" cy="1995570"/>
-          </a:xfrm>
-          <a:prstGeom prst="rect">
-            <a:avLst/>
-          </a:prstGeom>
-          <a:ln w="12700">
-            <a:miter lim="400000"/>
-          </a:ln>
-        </p:spPr>
-      </p:pic>
-      <p:pic>
-        <p:nvPicPr>
-          <p:cNvPr id="17" name="pasted-image.png"/>
-          <p:cNvPicPr/>
-          <p:nvPr/>
-        </p:nvPicPr>
-        <p:blipFill>
-          <a:blip r:embed="rId5">
-            <a:extLst/>
-          </a:blip>
-          <a:stretch>
-            <a:fillRect/>
-          </a:stretch>
-        </p:blipFill>
-        <p:spPr>
-          <a:xfrm>
-            <a:off x="2224824" y="3077072"/>
-            <a:ext cx="3018288" cy="561385"/>
-          </a:xfrm>
-          <a:prstGeom prst="rect">
-            <a:avLst/>
-          </a:prstGeom>
-          <a:ln w="12700">
-            <a:miter lim="400000"/>
-          </a:ln>
-        </p:spPr>
-      </p:pic>
-      <p:pic>
-        <p:nvPicPr>
-          <p:cNvPr id="18" name="pasted-image.png"/>
-          <p:cNvPicPr/>
-          <p:nvPr/>
-        </p:nvPicPr>
-        <p:blipFill>
-          <a:blip r:embed="rId6">
-            <a:extLst/>
-          </a:blip>
-          <a:stretch>
-            <a:fillRect/>
-          </a:stretch>
-        </p:blipFill>
-        <p:spPr>
-          <a:xfrm>
-            <a:off x="2279025" y="2591538"/>
-            <a:ext cx="2909886" cy="506941"/>
-          </a:xfrm>
-          <a:prstGeom prst="rect">
-            <a:avLst/>
-          </a:prstGeom>
-          <a:ln w="12700">
-            <a:miter lim="400000"/>
-          </a:ln>
-        </p:spPr>
-      </p:pic>
-      <p:pic>
-        <p:nvPicPr>
-          <p:cNvPr id="19" name="pasted-image.png"/>
-          <p:cNvPicPr/>
-          <p:nvPr/>
-        </p:nvPicPr>
-        <p:blipFill>
-          <a:blip r:embed="rId7">
-            <a:extLst/>
-          </a:blip>
-          <a:stretch>
-            <a:fillRect/>
-          </a:stretch>
-        </p:blipFill>
-        <p:spPr>
-          <a:xfrm>
-            <a:off x="2224824" y="3635446"/>
-            <a:ext cx="2907026" cy="506941"/>
-          </a:xfrm>
-          <a:prstGeom prst="rect">
-            <a:avLst/>
-          </a:prstGeom>
-          <a:ln w="12700">
-            <a:miter lim="400000"/>
-          </a:ln>
-        </p:spPr>
-      </p:pic>
-      <p:pic>
-        <p:nvPicPr>
-          <p:cNvPr id="20" name="pasted-image.png"/>
-          <p:cNvPicPr/>
-          <p:nvPr/>
-        </p:nvPicPr>
-        <p:blipFill>
-          <a:blip r:embed="rId8">
-            <a:extLst/>
-          </a:blip>
-          <a:stretch>
-            <a:fillRect/>
-          </a:stretch>
-        </p:blipFill>
-        <p:spPr>
-          <a:xfrm>
-            <a:off x="2317237" y="2095332"/>
-            <a:ext cx="3009410" cy="444773"/>
-          </a:xfrm>
-          <a:prstGeom prst="rect">
-            <a:avLst/>
-          </a:prstGeom>
-          <a:ln w="12700">
-            <a:miter lim="400000"/>
-          </a:ln>
-        </p:spPr>
-      </p:pic>
     </p:spTree>
     <p:extLst>
       <p:ext uri="{BB962C8B-B14F-4D97-AF65-F5344CB8AC3E}">
-        <p14:creationId xmlns:p14="http://schemas.microsoft.com/office/powerpoint/2010/main" val="1364178138"/>
+        <p14:creationId xmlns:p14="http://schemas.microsoft.com/office/powerpoint/2010/main" val="3719282447"/>
       </p:ext>
     </p:extLst>
   </p:cSld>
@@ -7950,28 +7615,87 @@
                 <a:latin typeface="Tahoma"/>
                 <a:ea typeface="ＭＳ Ｐゴシック" charset="-128"/>
               </a:rPr>
-              <a:t>LCD controller chip</a:t>
-            </a:r>
+              <a:t>Het totale systeem</a:t>
+            </a:r>
+          </a:p>
+        </p:txBody>
+      </p:sp>
+      <p:sp>
+        <p:nvSpPr>
+          <p:cNvPr id="4" name="Tijdelijke aanduiding voor inhoud 3"/>
+          <p:cNvSpPr>
+            <a:spLocks noGrp="1"/>
+          </p:cNvSpPr>
+          <p:nvPr>
+            <p:ph idx="1"/>
+          </p:nvPr>
+        </p:nvSpPr>
+        <p:spPr/>
+        <p:txBody>
+          <a:bodyPr/>
+          <a:lstStyle/>
+          <a:p>
+            <a:pPr lvl="0"/>
+            <a:r>
+              <a:rPr lang="nl-NL" dirty="0"/>
+              <a:t>LCD MIDAS typenummer </a:t>
+            </a:r>
+            <a:r>
+              <a:rPr lang="nl-NL" dirty="0" smtClean="0"/>
+              <a:t>MC128064B6W-BNMLW</a:t>
+            </a:r>
+          </a:p>
+          <a:p>
+            <a:pPr lvl="0"/>
+            <a:endParaRPr lang="nl-NL" dirty="0"/>
+          </a:p>
+          <a:p>
+            <a:pPr lvl="0"/>
+            <a:r>
+              <a:rPr lang="nl-NL" dirty="0"/>
+              <a:t>Chip geeft x-y positie met </a:t>
+            </a:r>
+            <a:r>
+              <a:rPr lang="nl-NL" dirty="0" smtClean="0"/>
+              <a:t>karakter</a:t>
+            </a:r>
+          </a:p>
+          <a:p>
+            <a:pPr lvl="0"/>
+            <a:endParaRPr lang="nl-NL" dirty="0"/>
+          </a:p>
+          <a:p>
+            <a:pPr lvl="0"/>
+            <a:r>
+              <a:rPr lang="nl-NL" dirty="0"/>
+              <a:t>Atmega32-16pu met karakter bibliotheek en schrijf </a:t>
+            </a:r>
+            <a:r>
+              <a:rPr lang="nl-NL" dirty="0" smtClean="0"/>
+              <a:t>routine</a:t>
+            </a:r>
+            <a:endParaRPr lang="nl-NL" dirty="0"/>
           </a:p>
         </p:txBody>
       </p:sp>
       <p:pic>
         <p:nvPicPr>
-          <p:cNvPr id="14" name="pasted-image.png"/>
+          <p:cNvPr id="8" name="voorbeeld_lcd.png"/>
           <p:cNvPicPr/>
           <p:nvPr/>
         </p:nvPicPr>
-        <p:blipFill rotWithShape="1">
+        <p:blipFill>
           <a:blip r:embed="rId2">
             <a:extLst/>
           </a:blip>
-          <a:srcRect t="2545" b="2026"/>
-          <a:stretch/>
+          <a:stretch>
+            <a:fillRect/>
+          </a:stretch>
         </p:blipFill>
         <p:spPr>
           <a:xfrm>
-            <a:off x="1561381" y="1431985"/>
-            <a:ext cx="6513437" cy="4666890"/>
+            <a:off x="5058289" y="4160983"/>
+            <a:ext cx="3059981" cy="1373199"/>
           </a:xfrm>
           <a:prstGeom prst="rect">
             <a:avLst/>
@@ -7981,10 +7705,135 @@
           </a:ln>
         </p:spPr>
       </p:pic>
+      <p:pic>
+        <p:nvPicPr>
+          <p:cNvPr id="10" name="pasted-image.tif"/>
+          <p:cNvPicPr/>
+          <p:nvPr/>
+        </p:nvPicPr>
+        <p:blipFill>
+          <a:blip r:embed="rId3">
+            <a:extLst/>
+          </a:blip>
+          <a:srcRect l="31265" t="1357" r="31139" b="10740"/>
+          <a:stretch>
+            <a:fillRect/>
+          </a:stretch>
+        </p:blipFill>
+        <p:spPr>
+          <a:xfrm>
+            <a:off x="3586356" y="3990773"/>
+            <a:ext cx="673162" cy="1774865"/>
+          </a:xfrm>
+          <a:prstGeom prst="rect">
+            <a:avLst/>
+          </a:prstGeom>
+          <a:ln w="12700">
+            <a:miter lim="400000"/>
+          </a:ln>
+        </p:spPr>
+      </p:pic>
+      <p:pic>
+        <p:nvPicPr>
+          <p:cNvPr id="11" name="toplevel_entity.png"/>
+          <p:cNvPicPr/>
+          <p:nvPr/>
+        </p:nvPicPr>
+        <p:blipFill>
+          <a:blip r:embed="rId4">
+            <a:extLst/>
+          </a:blip>
+          <a:stretch>
+            <a:fillRect/>
+          </a:stretch>
+        </p:blipFill>
+        <p:spPr>
+          <a:xfrm>
+            <a:off x="468569" y="3929528"/>
+            <a:ext cx="2823273" cy="1836110"/>
+          </a:xfrm>
+          <a:prstGeom prst="rect">
+            <a:avLst/>
+          </a:prstGeom>
+          <a:ln w="12700">
+            <a:miter lim="400000"/>
+          </a:ln>
+        </p:spPr>
+      </p:pic>
+      <p:sp>
+        <p:nvSpPr>
+          <p:cNvPr id="12" name="Shape 41"/>
+          <p:cNvSpPr/>
+          <p:nvPr/>
+        </p:nvSpPr>
+        <p:spPr>
+          <a:xfrm>
+            <a:off x="2787586" y="4604708"/>
+            <a:ext cx="798770" cy="0"/>
+          </a:xfrm>
+          <a:prstGeom prst="line">
+            <a:avLst/>
+          </a:prstGeom>
+          <a:ln w="63500">
+            <a:solidFill/>
+            <a:miter lim="400000"/>
+            <a:tailEnd type="triangle"/>
+          </a:ln>
+        </p:spPr>
+        <p:txBody>
+          <a:bodyPr lIns="0" tIns="0" rIns="0" bIns="0" anchor="ctr"/>
+          <a:lstStyle/>
+          <a:p>
+            <a:pPr>
+              <a:defRPr sz="2400"/>
+            </a:pPr>
+            <a:endParaRPr>
+              <a:solidFill>
+                <a:srgbClr val="000000"/>
+              </a:solidFill>
+            </a:endParaRPr>
+          </a:p>
+        </p:txBody>
+      </p:sp>
+      <p:sp>
+        <p:nvSpPr>
+          <p:cNvPr id="13" name="Shape 42"/>
+          <p:cNvSpPr/>
+          <p:nvPr/>
+        </p:nvSpPr>
+        <p:spPr>
+          <a:xfrm>
+            <a:off x="4259518" y="4604708"/>
+            <a:ext cx="798771" cy="0"/>
+          </a:xfrm>
+          <a:prstGeom prst="line">
+            <a:avLst/>
+          </a:prstGeom>
+          <a:ln w="63500">
+            <a:solidFill/>
+            <a:miter lim="400000"/>
+            <a:tailEnd type="triangle"/>
+          </a:ln>
+        </p:spPr>
+        <p:txBody>
+          <a:bodyPr lIns="0" tIns="0" rIns="0" bIns="0" anchor="ctr"/>
+          <a:lstStyle/>
+          <a:p>
+            <a:pPr>
+              <a:defRPr sz="2400"/>
+            </a:pPr>
+            <a:endParaRPr>
+              <a:solidFill>
+                <a:srgbClr val="000000"/>
+              </a:solidFill>
+            </a:endParaRPr>
+          </a:p>
+        </p:txBody>
+      </p:sp>
     </p:spTree>
     <p:extLst>
       <p:ext uri="{BB962C8B-B14F-4D97-AF65-F5344CB8AC3E}">
-        <p14:creationId xmlns:p14="http://schemas.microsoft.com/office/powerpoint/2010/main" val="2724193976"/>
+        <p14:creationId xmlns:p14="http://schemas.microsoft.com/office/powerpoint/2010/main" val="1029360624"/>
       </p:ext>
     </p:extLst>
   </p:cSld>
@@ -8025,7 +7874,7 @@
             <a:spLocks noGrp="1"/>
           </p:cNvSpPr>
           <p:nvPr>
-            <p:ph type="title"/>
+            <p:ph type="ctrTitle"/>
           </p:nvPr>
         </p:nvSpPr>
         <p:spPr/>
@@ -8034,17 +7883,44 @@
           <a:lstStyle/>
           <a:p>
             <a:r>
-              <a:rPr lang="nl-NL" dirty="0" smtClean="0"/>
-              <a:t>DCF77 module</a:t>
-            </a:r>
-            <a:endParaRPr lang="nl-NL" dirty="0"/>
+              <a:rPr lang="nl-NL" dirty="0" smtClean="0">
+                <a:solidFill>
+                  <a:srgbClr val="FF0000"/>
+                </a:solidFill>
+              </a:rPr>
+              <a:t>Inleiding</a:t>
+            </a:r>
+            <a:endParaRPr lang="nl-NL" dirty="0">
+              <a:solidFill>
+                <a:srgbClr val="FF0000"/>
+              </a:solidFill>
+            </a:endParaRPr>
+          </a:p>
+        </p:txBody>
+      </p:sp>
+      <p:sp>
+        <p:nvSpPr>
+          <p:cNvPr id="3" name="Ondertitel 2"/>
+          <p:cNvSpPr>
+            <a:spLocks noGrp="1"/>
+          </p:cNvSpPr>
+          <p:nvPr>
+            <p:ph type="subTitle" idx="1"/>
+          </p:nvPr>
+        </p:nvSpPr>
+        <p:spPr/>
+        <p:txBody>
+          <a:bodyPr/>
+          <a:lstStyle/>
+          <a:p>
+            <a:endParaRPr lang="nl-NL"/>
           </a:p>
         </p:txBody>
       </p:sp>
     </p:spTree>
     <p:extLst>
       <p:ext uri="{BB962C8B-B14F-4D97-AF65-F5344CB8AC3E}">
-        <p14:creationId xmlns:p14="http://schemas.microsoft.com/office/powerpoint/2010/main" val="912281294"/>
+        <p14:creationId xmlns:p14="http://schemas.microsoft.com/office/powerpoint/2010/main" val="4064259602"/>
       </p:ext>
     </p:extLst>
   </p:cSld>
@@ -8262,6 +8138,673 @@
                 <a:latin typeface="Tahoma"/>
                 <a:ea typeface="ＭＳ Ｐゴシック" charset="-128"/>
               </a:rPr>
+              <a:t>Werking display</a:t>
+            </a:r>
+          </a:p>
+        </p:txBody>
+      </p:sp>
+      <p:pic>
+        <p:nvPicPr>
+          <p:cNvPr id="14" name="voorbeeld_lcd.png"/>
+          <p:cNvPicPr/>
+          <p:nvPr/>
+        </p:nvPicPr>
+        <p:blipFill>
+          <a:blip r:embed="rId2">
+            <a:extLst/>
+          </a:blip>
+          <a:stretch>
+            <a:fillRect/>
+          </a:stretch>
+        </p:blipFill>
+        <p:spPr>
+          <a:xfrm>
+            <a:off x="2796156" y="4305606"/>
+            <a:ext cx="3147444" cy="1422333"/>
+          </a:xfrm>
+          <a:prstGeom prst="rect">
+            <a:avLst/>
+          </a:prstGeom>
+          <a:ln w="12700">
+            <a:miter lim="400000"/>
+          </a:ln>
+        </p:spPr>
+      </p:pic>
+      <p:pic>
+        <p:nvPicPr>
+          <p:cNvPr id="15" name="pasted-image.png"/>
+          <p:cNvPicPr/>
+          <p:nvPr/>
+        </p:nvPicPr>
+        <p:blipFill>
+          <a:blip r:embed="rId3">
+            <a:extLst/>
+          </a:blip>
+          <a:stretch>
+            <a:fillRect/>
+          </a:stretch>
+        </p:blipFill>
+        <p:spPr>
+          <a:xfrm>
+            <a:off x="5297313" y="2054571"/>
+            <a:ext cx="3583304" cy="2087816"/>
+          </a:xfrm>
+          <a:prstGeom prst="rect">
+            <a:avLst/>
+          </a:prstGeom>
+          <a:ln w="12700">
+            <a:miter lim="400000"/>
+          </a:ln>
+        </p:spPr>
+      </p:pic>
+      <p:pic>
+        <p:nvPicPr>
+          <p:cNvPr id="16" name="pasted-image.png"/>
+          <p:cNvPicPr/>
+          <p:nvPr/>
+        </p:nvPicPr>
+        <p:blipFill>
+          <a:blip r:embed="rId4">
+            <a:extLst/>
+          </a:blip>
+          <a:stretch>
+            <a:fillRect/>
+          </a:stretch>
+        </p:blipFill>
+        <p:spPr>
+          <a:xfrm>
+            <a:off x="268958" y="2054571"/>
+            <a:ext cx="2010067" cy="1995570"/>
+          </a:xfrm>
+          <a:prstGeom prst="rect">
+            <a:avLst/>
+          </a:prstGeom>
+          <a:ln w="12700">
+            <a:miter lim="400000"/>
+          </a:ln>
+        </p:spPr>
+      </p:pic>
+      <p:pic>
+        <p:nvPicPr>
+          <p:cNvPr id="17" name="pasted-image.png"/>
+          <p:cNvPicPr/>
+          <p:nvPr/>
+        </p:nvPicPr>
+        <p:blipFill>
+          <a:blip r:embed="rId5">
+            <a:extLst/>
+          </a:blip>
+          <a:stretch>
+            <a:fillRect/>
+          </a:stretch>
+        </p:blipFill>
+        <p:spPr>
+          <a:xfrm>
+            <a:off x="2224824" y="3077072"/>
+            <a:ext cx="3018288" cy="561385"/>
+          </a:xfrm>
+          <a:prstGeom prst="rect">
+            <a:avLst/>
+          </a:prstGeom>
+          <a:ln w="12700">
+            <a:miter lim="400000"/>
+          </a:ln>
+        </p:spPr>
+      </p:pic>
+      <p:pic>
+        <p:nvPicPr>
+          <p:cNvPr id="18" name="pasted-image.png"/>
+          <p:cNvPicPr/>
+          <p:nvPr/>
+        </p:nvPicPr>
+        <p:blipFill>
+          <a:blip r:embed="rId6">
+            <a:extLst/>
+          </a:blip>
+          <a:stretch>
+            <a:fillRect/>
+          </a:stretch>
+        </p:blipFill>
+        <p:spPr>
+          <a:xfrm>
+            <a:off x="2279025" y="2591538"/>
+            <a:ext cx="2909886" cy="506941"/>
+          </a:xfrm>
+          <a:prstGeom prst="rect">
+            <a:avLst/>
+          </a:prstGeom>
+          <a:ln w="12700">
+            <a:miter lim="400000"/>
+          </a:ln>
+        </p:spPr>
+      </p:pic>
+      <p:pic>
+        <p:nvPicPr>
+          <p:cNvPr id="19" name="pasted-image.png"/>
+          <p:cNvPicPr/>
+          <p:nvPr/>
+        </p:nvPicPr>
+        <p:blipFill>
+          <a:blip r:embed="rId7">
+            <a:extLst/>
+          </a:blip>
+          <a:stretch>
+            <a:fillRect/>
+          </a:stretch>
+        </p:blipFill>
+        <p:spPr>
+          <a:xfrm>
+            <a:off x="2224824" y="3635446"/>
+            <a:ext cx="2907026" cy="506941"/>
+          </a:xfrm>
+          <a:prstGeom prst="rect">
+            <a:avLst/>
+          </a:prstGeom>
+          <a:ln w="12700">
+            <a:miter lim="400000"/>
+          </a:ln>
+        </p:spPr>
+      </p:pic>
+      <p:pic>
+        <p:nvPicPr>
+          <p:cNvPr id="20" name="pasted-image.png"/>
+          <p:cNvPicPr/>
+          <p:nvPr/>
+        </p:nvPicPr>
+        <p:blipFill>
+          <a:blip r:embed="rId8">
+            <a:extLst/>
+          </a:blip>
+          <a:stretch>
+            <a:fillRect/>
+          </a:stretch>
+        </p:blipFill>
+        <p:spPr>
+          <a:xfrm>
+            <a:off x="2317237" y="2095332"/>
+            <a:ext cx="3009410" cy="444773"/>
+          </a:xfrm>
+          <a:prstGeom prst="rect">
+            <a:avLst/>
+          </a:prstGeom>
+          <a:ln w="12700">
+            <a:miter lim="400000"/>
+          </a:ln>
+        </p:spPr>
+      </p:pic>
+    </p:spTree>
+    <p:extLst>
+      <p:ext uri="{BB962C8B-B14F-4D97-AF65-F5344CB8AC3E}">
+        <p14:creationId xmlns:p14="http://schemas.microsoft.com/office/powerpoint/2010/main" val="1364178138"/>
+      </p:ext>
+    </p:extLst>
+  </p:cSld>
+  <p:clrMapOvr>
+    <a:masterClrMapping/>
+  </p:clrMapOvr>
+  <p:timing>
+    <p:tnLst>
+      <p:par>
+        <p:cTn id="1" dur="indefinite" restart="never" nodeType="tmRoot"/>
+      </p:par>
+    </p:tnLst>
+  </p:timing>
+</p:sld>
+</file>
+
+<file path=ppt/slides/slide21.xml><?xml version="1.0" encoding="utf-8"?>
+<p:sld xmlns:a="http://schemas.openxmlformats.org/drawingml/2006/main" xmlns:r="http://schemas.openxmlformats.org/officeDocument/2006/relationships" xmlns:p="http://schemas.openxmlformats.org/presentationml/2006/main">
+  <p:cSld>
+    <p:spTree>
+      <p:nvGrpSpPr>
+        <p:cNvPr id="1" name=""/>
+        <p:cNvGrpSpPr/>
+        <p:nvPr/>
+      </p:nvGrpSpPr>
+      <p:grpSpPr>
+        <a:xfrm>
+          <a:off x="0" y="0"/>
+          <a:ext cx="0" cy="0"/>
+          <a:chOff x="0" y="0"/>
+          <a:chExt cx="0" cy="0"/>
+        </a:xfrm>
+      </p:grpSpPr>
+      <p:sp>
+        <p:nvSpPr>
+          <p:cNvPr id="4098" name="Title 3"/>
+          <p:cNvSpPr>
+            <a:spLocks noGrp="1"/>
+          </p:cNvSpPr>
+          <p:nvPr>
+            <p:ph type="title"/>
+          </p:nvPr>
+        </p:nvSpPr>
+        <p:spPr>
+          <a:xfrm>
+            <a:off x="915193" y="502892"/>
+            <a:ext cx="7159625" cy="627063"/>
+          </a:xfrm>
+        </p:spPr>
+        <p:txBody>
+          <a:bodyPr/>
+          <a:lstStyle/>
+          <a:p>
+            <a:pPr>
+              <a:defRPr/>
+            </a:pPr>
+            <a:r>
+              <a:rPr lang="nl-NL" altLang="nl-NL" dirty="0" smtClean="0">
+                <a:latin typeface="+mn-lt"/>
+                <a:ea typeface="ＭＳ Ｐゴシック" pitchFamily="34" charset="-128"/>
+              </a:rPr>
+              <a:t>LCD</a:t>
+            </a:r>
+          </a:p>
+        </p:txBody>
+      </p:sp>
+      <p:sp>
+        <p:nvSpPr>
+          <p:cNvPr id="6" name="Ondertitel 2"/>
+          <p:cNvSpPr txBox="1">
+            <a:spLocks/>
+          </p:cNvSpPr>
+          <p:nvPr/>
+        </p:nvSpPr>
+        <p:spPr bwMode="auto">
+          <a:xfrm>
+            <a:off x="914400" y="1041400"/>
+            <a:ext cx="6781800" cy="474663"/>
+          </a:xfrm>
+          <a:prstGeom prst="rect">
+            <a:avLst/>
+          </a:prstGeom>
+          <a:noFill/>
+          <a:ln w="9525">
+            <a:noFill/>
+            <a:miter lim="800000"/>
+            <a:headEnd/>
+            <a:tailEnd/>
+          </a:ln>
+        </p:spPr>
+        <p:txBody>
+          <a:bodyPr lIns="0" tIns="0" rIns="0" bIns="0"/>
+          <a:lstStyle>
+            <a:lvl1pPr eaLnBrk="0" hangingPunct="0">
+              <a:defRPr sz="2400">
+                <a:solidFill>
+                  <a:schemeClr val="tx1"/>
+                </a:solidFill>
+                <a:latin typeface="Tahoma" charset="0"/>
+                <a:cs typeface="Arial" charset="0"/>
+              </a:defRPr>
+            </a:lvl1pPr>
+            <a:lvl2pPr marL="37931725" indent="-37474525" eaLnBrk="0" hangingPunct="0">
+              <a:defRPr sz="2400">
+                <a:solidFill>
+                  <a:schemeClr val="tx1"/>
+                </a:solidFill>
+                <a:latin typeface="Tahoma" charset="0"/>
+                <a:cs typeface="Arial" charset="0"/>
+              </a:defRPr>
+            </a:lvl2pPr>
+            <a:lvl3pPr eaLnBrk="0" hangingPunct="0">
+              <a:defRPr sz="2400">
+                <a:solidFill>
+                  <a:schemeClr val="tx1"/>
+                </a:solidFill>
+                <a:latin typeface="Tahoma" charset="0"/>
+                <a:cs typeface="Arial" charset="0"/>
+              </a:defRPr>
+            </a:lvl3pPr>
+            <a:lvl4pPr eaLnBrk="0" hangingPunct="0">
+              <a:defRPr sz="2400">
+                <a:solidFill>
+                  <a:schemeClr val="tx1"/>
+                </a:solidFill>
+                <a:latin typeface="Tahoma" charset="0"/>
+                <a:cs typeface="Arial" charset="0"/>
+              </a:defRPr>
+            </a:lvl4pPr>
+            <a:lvl5pPr eaLnBrk="0" hangingPunct="0">
+              <a:defRPr sz="2400">
+                <a:solidFill>
+                  <a:schemeClr val="tx1"/>
+                </a:solidFill>
+                <a:latin typeface="Tahoma" charset="0"/>
+                <a:cs typeface="Arial" charset="0"/>
+              </a:defRPr>
+            </a:lvl5pPr>
+            <a:lvl6pPr marL="457200" eaLnBrk="0" fontAlgn="base" hangingPunct="0">
+              <a:spcBef>
+                <a:spcPct val="0"/>
+              </a:spcBef>
+              <a:spcAft>
+                <a:spcPct val="0"/>
+              </a:spcAft>
+              <a:defRPr sz="2400">
+                <a:solidFill>
+                  <a:schemeClr val="tx1"/>
+                </a:solidFill>
+                <a:latin typeface="Tahoma" charset="0"/>
+                <a:cs typeface="Arial" charset="0"/>
+              </a:defRPr>
+            </a:lvl6pPr>
+            <a:lvl7pPr marL="914400" eaLnBrk="0" fontAlgn="base" hangingPunct="0">
+              <a:spcBef>
+                <a:spcPct val="0"/>
+              </a:spcBef>
+              <a:spcAft>
+                <a:spcPct val="0"/>
+              </a:spcAft>
+              <a:defRPr sz="2400">
+                <a:solidFill>
+                  <a:schemeClr val="tx1"/>
+                </a:solidFill>
+                <a:latin typeface="Tahoma" charset="0"/>
+                <a:cs typeface="Arial" charset="0"/>
+              </a:defRPr>
+            </a:lvl7pPr>
+            <a:lvl8pPr marL="1371600" eaLnBrk="0" fontAlgn="base" hangingPunct="0">
+              <a:spcBef>
+                <a:spcPct val="0"/>
+              </a:spcBef>
+              <a:spcAft>
+                <a:spcPct val="0"/>
+              </a:spcAft>
+              <a:defRPr sz="2400">
+                <a:solidFill>
+                  <a:schemeClr val="tx1"/>
+                </a:solidFill>
+                <a:latin typeface="Tahoma" charset="0"/>
+                <a:cs typeface="Arial" charset="0"/>
+              </a:defRPr>
+            </a:lvl8pPr>
+            <a:lvl9pPr marL="1828800" eaLnBrk="0" fontAlgn="base" hangingPunct="0">
+              <a:spcBef>
+                <a:spcPct val="0"/>
+              </a:spcBef>
+              <a:spcAft>
+                <a:spcPct val="0"/>
+              </a:spcAft>
+              <a:defRPr sz="2400">
+                <a:solidFill>
+                  <a:schemeClr val="tx1"/>
+                </a:solidFill>
+                <a:latin typeface="Tahoma" charset="0"/>
+                <a:cs typeface="Arial" charset="0"/>
+              </a:defRPr>
+            </a:lvl9pPr>
+          </a:lstStyle>
+          <a:p>
+            <a:pPr algn="l">
+              <a:lnSpc>
+                <a:spcPts val="2500"/>
+              </a:lnSpc>
+              <a:buClr>
+                <a:srgbClr val="00A6D6"/>
+              </a:buClr>
+              <a:defRPr/>
+            </a:pPr>
+            <a:r>
+              <a:rPr lang="nl-NL" altLang="nl-NL" sz="2000" dirty="0" smtClean="0">
+                <a:solidFill>
+                  <a:srgbClr val="00A6D6"/>
+                </a:solidFill>
+                <a:latin typeface="Tahoma"/>
+                <a:ea typeface="ＭＳ Ｐゴシック" charset="-128"/>
+              </a:rPr>
+              <a:t>LCD controller chip</a:t>
+            </a:r>
+          </a:p>
+        </p:txBody>
+      </p:sp>
+      <p:pic>
+        <p:nvPicPr>
+          <p:cNvPr id="14" name="pasted-image.png"/>
+          <p:cNvPicPr/>
+          <p:nvPr/>
+        </p:nvPicPr>
+        <p:blipFill rotWithShape="1">
+          <a:blip r:embed="rId2">
+            <a:extLst/>
+          </a:blip>
+          <a:srcRect t="2545" b="2026"/>
+          <a:stretch/>
+        </p:blipFill>
+        <p:spPr>
+          <a:xfrm>
+            <a:off x="1561381" y="1431985"/>
+            <a:ext cx="6513437" cy="4666890"/>
+          </a:xfrm>
+          <a:prstGeom prst="rect">
+            <a:avLst/>
+          </a:prstGeom>
+          <a:ln w="12700">
+            <a:miter lim="400000"/>
+          </a:ln>
+        </p:spPr>
+      </p:pic>
+    </p:spTree>
+    <p:extLst>
+      <p:ext uri="{BB962C8B-B14F-4D97-AF65-F5344CB8AC3E}">
+        <p14:creationId xmlns:p14="http://schemas.microsoft.com/office/powerpoint/2010/main" val="2724193976"/>
+      </p:ext>
+    </p:extLst>
+  </p:cSld>
+  <p:clrMapOvr>
+    <a:masterClrMapping/>
+  </p:clrMapOvr>
+  <p:timing>
+    <p:tnLst>
+      <p:par>
+        <p:cTn id="1" dur="indefinite" restart="never" nodeType="tmRoot"/>
+      </p:par>
+    </p:tnLst>
+  </p:timing>
+</p:sld>
+</file>
+
+<file path=ppt/slides/slide22.xml><?xml version="1.0" encoding="utf-8"?>
+<p:sld xmlns:a="http://schemas.openxmlformats.org/drawingml/2006/main" xmlns:r="http://schemas.openxmlformats.org/officeDocument/2006/relationships" xmlns:p="http://schemas.openxmlformats.org/presentationml/2006/main">
+  <p:cSld>
+    <p:spTree>
+      <p:nvGrpSpPr>
+        <p:cNvPr id="1" name=""/>
+        <p:cNvGrpSpPr/>
+        <p:nvPr/>
+      </p:nvGrpSpPr>
+      <p:grpSpPr>
+        <a:xfrm>
+          <a:off x="0" y="0"/>
+          <a:ext cx="0" cy="0"/>
+          <a:chOff x="0" y="0"/>
+          <a:chExt cx="0" cy="0"/>
+        </a:xfrm>
+      </p:grpSpPr>
+      <p:sp>
+        <p:nvSpPr>
+          <p:cNvPr id="4098" name="Title 3"/>
+          <p:cNvSpPr>
+            <a:spLocks noGrp="1"/>
+          </p:cNvSpPr>
+          <p:nvPr>
+            <p:ph type="title"/>
+          </p:nvPr>
+        </p:nvSpPr>
+        <p:spPr>
+          <a:xfrm>
+            <a:off x="915193" y="502892"/>
+            <a:ext cx="7159625" cy="627063"/>
+          </a:xfrm>
+        </p:spPr>
+        <p:txBody>
+          <a:bodyPr/>
+          <a:lstStyle/>
+          <a:p>
+            <a:pPr>
+              <a:defRPr/>
+            </a:pPr>
+            <a:r>
+              <a:rPr lang="nl-NL" altLang="nl-NL" dirty="0" smtClean="0">
+                <a:latin typeface="+mn-lt"/>
+                <a:ea typeface="ＭＳ Ｐゴシック" pitchFamily="34" charset="-128"/>
+              </a:rPr>
+              <a:t>LCD</a:t>
+            </a:r>
+          </a:p>
+        </p:txBody>
+      </p:sp>
+      <p:sp>
+        <p:nvSpPr>
+          <p:cNvPr id="6" name="Ondertitel 2"/>
+          <p:cNvSpPr txBox="1">
+            <a:spLocks/>
+          </p:cNvSpPr>
+          <p:nvPr/>
+        </p:nvSpPr>
+        <p:spPr bwMode="auto">
+          <a:xfrm>
+            <a:off x="914400" y="1041400"/>
+            <a:ext cx="6781800" cy="474663"/>
+          </a:xfrm>
+          <a:prstGeom prst="rect">
+            <a:avLst/>
+          </a:prstGeom>
+          <a:noFill/>
+          <a:ln w="9525">
+            <a:noFill/>
+            <a:miter lim="800000"/>
+            <a:headEnd/>
+            <a:tailEnd/>
+          </a:ln>
+        </p:spPr>
+        <p:txBody>
+          <a:bodyPr lIns="0" tIns="0" rIns="0" bIns="0"/>
+          <a:lstStyle>
+            <a:lvl1pPr eaLnBrk="0" hangingPunct="0">
+              <a:defRPr sz="2400">
+                <a:solidFill>
+                  <a:schemeClr val="tx1"/>
+                </a:solidFill>
+                <a:latin typeface="Tahoma" charset="0"/>
+                <a:cs typeface="Arial" charset="0"/>
+              </a:defRPr>
+            </a:lvl1pPr>
+            <a:lvl2pPr marL="37931725" indent="-37474525" eaLnBrk="0" hangingPunct="0">
+              <a:defRPr sz="2400">
+                <a:solidFill>
+                  <a:schemeClr val="tx1"/>
+                </a:solidFill>
+                <a:latin typeface="Tahoma" charset="0"/>
+                <a:cs typeface="Arial" charset="0"/>
+              </a:defRPr>
+            </a:lvl2pPr>
+            <a:lvl3pPr eaLnBrk="0" hangingPunct="0">
+              <a:defRPr sz="2400">
+                <a:solidFill>
+                  <a:schemeClr val="tx1"/>
+                </a:solidFill>
+                <a:latin typeface="Tahoma" charset="0"/>
+                <a:cs typeface="Arial" charset="0"/>
+              </a:defRPr>
+            </a:lvl3pPr>
+            <a:lvl4pPr eaLnBrk="0" hangingPunct="0">
+              <a:defRPr sz="2400">
+                <a:solidFill>
+                  <a:schemeClr val="tx1"/>
+                </a:solidFill>
+                <a:latin typeface="Tahoma" charset="0"/>
+                <a:cs typeface="Arial" charset="0"/>
+              </a:defRPr>
+            </a:lvl4pPr>
+            <a:lvl5pPr eaLnBrk="0" hangingPunct="0">
+              <a:defRPr sz="2400">
+                <a:solidFill>
+                  <a:schemeClr val="tx1"/>
+                </a:solidFill>
+                <a:latin typeface="Tahoma" charset="0"/>
+                <a:cs typeface="Arial" charset="0"/>
+              </a:defRPr>
+            </a:lvl5pPr>
+            <a:lvl6pPr marL="457200" eaLnBrk="0" fontAlgn="base" hangingPunct="0">
+              <a:spcBef>
+                <a:spcPct val="0"/>
+              </a:spcBef>
+              <a:spcAft>
+                <a:spcPct val="0"/>
+              </a:spcAft>
+              <a:defRPr sz="2400">
+                <a:solidFill>
+                  <a:schemeClr val="tx1"/>
+                </a:solidFill>
+                <a:latin typeface="Tahoma" charset="0"/>
+                <a:cs typeface="Arial" charset="0"/>
+              </a:defRPr>
+            </a:lvl6pPr>
+            <a:lvl7pPr marL="914400" eaLnBrk="0" fontAlgn="base" hangingPunct="0">
+              <a:spcBef>
+                <a:spcPct val="0"/>
+              </a:spcBef>
+              <a:spcAft>
+                <a:spcPct val="0"/>
+              </a:spcAft>
+              <a:defRPr sz="2400">
+                <a:solidFill>
+                  <a:schemeClr val="tx1"/>
+                </a:solidFill>
+                <a:latin typeface="Tahoma" charset="0"/>
+                <a:cs typeface="Arial" charset="0"/>
+              </a:defRPr>
+            </a:lvl7pPr>
+            <a:lvl8pPr marL="1371600" eaLnBrk="0" fontAlgn="base" hangingPunct="0">
+              <a:spcBef>
+                <a:spcPct val="0"/>
+              </a:spcBef>
+              <a:spcAft>
+                <a:spcPct val="0"/>
+              </a:spcAft>
+              <a:defRPr sz="2400">
+                <a:solidFill>
+                  <a:schemeClr val="tx1"/>
+                </a:solidFill>
+                <a:latin typeface="Tahoma" charset="0"/>
+                <a:cs typeface="Arial" charset="0"/>
+              </a:defRPr>
+            </a:lvl8pPr>
+            <a:lvl9pPr marL="1828800" eaLnBrk="0" fontAlgn="base" hangingPunct="0">
+              <a:spcBef>
+                <a:spcPct val="0"/>
+              </a:spcBef>
+              <a:spcAft>
+                <a:spcPct val="0"/>
+              </a:spcAft>
+              <a:defRPr sz="2400">
+                <a:solidFill>
+                  <a:schemeClr val="tx1"/>
+                </a:solidFill>
+                <a:latin typeface="Tahoma" charset="0"/>
+                <a:cs typeface="Arial" charset="0"/>
+              </a:defRPr>
+            </a:lvl9pPr>
+          </a:lstStyle>
+          <a:p>
+            <a:pPr algn="l">
+              <a:lnSpc>
+                <a:spcPts val="2500"/>
+              </a:lnSpc>
+              <a:buClr>
+                <a:srgbClr val="00A6D6"/>
+              </a:buClr>
+              <a:defRPr/>
+            </a:pPr>
+            <a:r>
+              <a:rPr lang="nl-NL" altLang="nl-NL" sz="2000" dirty="0" smtClean="0">
+                <a:solidFill>
+                  <a:srgbClr val="00A6D6"/>
+                </a:solidFill>
+                <a:latin typeface="Tahoma"/>
+                <a:ea typeface="ＭＳ Ｐゴシック" charset="-128"/>
+              </a:rPr>
               <a:t>Data omzetting, vb. datum</a:t>
             </a:r>
           </a:p>
@@ -8341,7 +8884,7 @@
 </p:sld>
 </file>
 
-<file path=ppt/slides/slide21.xml><?xml version="1.0" encoding="utf-8"?>
+<file path=ppt/slides/slide23.xml><?xml version="1.0" encoding="utf-8"?>
 <p:sld xmlns:a="http://schemas.openxmlformats.org/drawingml/2006/main" xmlns:r="http://schemas.openxmlformats.org/officeDocument/2006/relationships" xmlns:p="http://schemas.openxmlformats.org/presentationml/2006/main">
   <p:cSld>
     <p:spTree>
@@ -9448,7 +9991,7 @@
           </a:ln>
           <a:extLst>
             <a:ext uri="{C572A759-6A51-4108-AA02-DFA0A04FC94B}">
-              <ma14:wrappingTextBoxFlag xmlns="" xmlns:ma14="http://schemas.microsoft.com/office/mac/drawingml/2011/main" val="1"/>
+              <ma14:wrappingTextBoxFlag xmlns:ma14="http://schemas.microsoft.com/office/mac/drawingml/2011/main" xmlns="" val="1"/>
             </a:ext>
           </a:extLst>
         </p:spPr>
@@ -9500,7 +10043,312 @@
 </p:sld>
 </file>
 
+<file path=ppt/slides/slide24.xml><?xml version="1.0" encoding="utf-8"?>
+<p:sld xmlns:a="http://schemas.openxmlformats.org/drawingml/2006/main" xmlns:r="http://schemas.openxmlformats.org/officeDocument/2006/relationships" xmlns:p="http://schemas.openxmlformats.org/presentationml/2006/main">
+  <p:cSld>
+    <p:spTree>
+      <p:nvGrpSpPr>
+        <p:cNvPr id="1" name=""/>
+        <p:cNvGrpSpPr/>
+        <p:nvPr/>
+      </p:nvGrpSpPr>
+      <p:grpSpPr>
+        <a:xfrm>
+          <a:off x="0" y="0"/>
+          <a:ext cx="0" cy="0"/>
+          <a:chOff x="0" y="0"/>
+          <a:chExt cx="0" cy="0"/>
+        </a:xfrm>
+      </p:grpSpPr>
+      <p:sp>
+        <p:nvSpPr>
+          <p:cNvPr id="2" name="Titel 1"/>
+          <p:cNvSpPr>
+            <a:spLocks noGrp="1"/>
+          </p:cNvSpPr>
+          <p:nvPr>
+            <p:ph type="ctrTitle"/>
+          </p:nvPr>
+        </p:nvSpPr>
+        <p:spPr/>
+        <p:txBody>
+          <a:bodyPr/>
+          <a:lstStyle/>
+          <a:p>
+            <a:r>
+              <a:rPr lang="nl-NL" dirty="0" smtClean="0">
+                <a:solidFill>
+                  <a:srgbClr val="FF0000"/>
+                </a:solidFill>
+              </a:rPr>
+              <a:t>Resultaten &amp; testen</a:t>
+            </a:r>
+            <a:endParaRPr lang="nl-NL" dirty="0">
+              <a:solidFill>
+                <a:srgbClr val="FF0000"/>
+              </a:solidFill>
+            </a:endParaRPr>
+          </a:p>
+        </p:txBody>
+      </p:sp>
+      <p:sp>
+        <p:nvSpPr>
+          <p:cNvPr id="3" name="Ondertitel 2"/>
+          <p:cNvSpPr>
+            <a:spLocks noGrp="1"/>
+          </p:cNvSpPr>
+          <p:nvPr>
+            <p:ph type="subTitle" idx="1"/>
+          </p:nvPr>
+        </p:nvSpPr>
+        <p:spPr/>
+        <p:txBody>
+          <a:bodyPr/>
+          <a:lstStyle/>
+          <a:p>
+            <a:endParaRPr lang="nl-NL"/>
+          </a:p>
+        </p:txBody>
+      </p:sp>
+    </p:spTree>
+    <p:extLst>
+      <p:ext uri="{BB962C8B-B14F-4D97-AF65-F5344CB8AC3E}">
+        <p14:creationId xmlns:p14="http://schemas.microsoft.com/office/powerpoint/2010/main" val="1884874840"/>
+      </p:ext>
+    </p:extLst>
+  </p:cSld>
+  <p:clrMapOvr>
+    <a:masterClrMapping/>
+  </p:clrMapOvr>
+</p:sld>
+</file>
+
+<file path=ppt/slides/slide25.xml><?xml version="1.0" encoding="utf-8"?>
+<p:sld xmlns:a="http://schemas.openxmlformats.org/drawingml/2006/main" xmlns:r="http://schemas.openxmlformats.org/officeDocument/2006/relationships" xmlns:p="http://schemas.openxmlformats.org/presentationml/2006/main">
+  <p:cSld>
+    <p:spTree>
+      <p:nvGrpSpPr>
+        <p:cNvPr id="1" name=""/>
+        <p:cNvGrpSpPr/>
+        <p:nvPr/>
+      </p:nvGrpSpPr>
+      <p:grpSpPr>
+        <a:xfrm>
+          <a:off x="0" y="0"/>
+          <a:ext cx="0" cy="0"/>
+          <a:chOff x="0" y="0"/>
+          <a:chExt cx="0" cy="0"/>
+        </a:xfrm>
+      </p:grpSpPr>
+      <p:sp>
+        <p:nvSpPr>
+          <p:cNvPr id="2" name="Titel 1"/>
+          <p:cNvSpPr>
+            <a:spLocks noGrp="1"/>
+          </p:cNvSpPr>
+          <p:nvPr>
+            <p:ph type="ctrTitle"/>
+          </p:nvPr>
+        </p:nvSpPr>
+        <p:spPr/>
+        <p:txBody>
+          <a:bodyPr/>
+          <a:lstStyle/>
+          <a:p>
+            <a:r>
+              <a:rPr lang="nl-NL" dirty="0" smtClean="0">
+                <a:solidFill>
+                  <a:srgbClr val="FF0000"/>
+                </a:solidFill>
+              </a:rPr>
+              <a:t>Conclusie</a:t>
+            </a:r>
+            <a:endParaRPr lang="nl-NL" dirty="0">
+              <a:solidFill>
+                <a:srgbClr val="FF0000"/>
+              </a:solidFill>
+            </a:endParaRPr>
+          </a:p>
+        </p:txBody>
+      </p:sp>
+      <p:sp>
+        <p:nvSpPr>
+          <p:cNvPr id="3" name="Ondertitel 2"/>
+          <p:cNvSpPr>
+            <a:spLocks noGrp="1"/>
+          </p:cNvSpPr>
+          <p:nvPr>
+            <p:ph type="subTitle" idx="1"/>
+          </p:nvPr>
+        </p:nvSpPr>
+        <p:spPr/>
+        <p:txBody>
+          <a:bodyPr/>
+          <a:lstStyle/>
+          <a:p>
+            <a:endParaRPr lang="nl-NL"/>
+          </a:p>
+        </p:txBody>
+      </p:sp>
+    </p:spTree>
+    <p:extLst>
+      <p:ext uri="{BB962C8B-B14F-4D97-AF65-F5344CB8AC3E}">
+        <p14:creationId xmlns:p14="http://schemas.microsoft.com/office/powerpoint/2010/main" val="3870014339"/>
+      </p:ext>
+    </p:extLst>
+  </p:cSld>
+  <p:clrMapOvr>
+    <a:masterClrMapping/>
+  </p:clrMapOvr>
+</p:sld>
+</file>
+
 <file path=ppt/slides/slide3.xml><?xml version="1.0" encoding="utf-8"?>
+<p:sld xmlns:a="http://schemas.openxmlformats.org/drawingml/2006/main" xmlns:r="http://schemas.openxmlformats.org/officeDocument/2006/relationships" xmlns:p="http://schemas.openxmlformats.org/presentationml/2006/main">
+  <p:cSld>
+    <p:spTree>
+      <p:nvGrpSpPr>
+        <p:cNvPr id="1" name=""/>
+        <p:cNvGrpSpPr/>
+        <p:nvPr/>
+      </p:nvGrpSpPr>
+      <p:grpSpPr>
+        <a:xfrm>
+          <a:off x="0" y="0"/>
+          <a:ext cx="0" cy="0"/>
+          <a:chOff x="0" y="0"/>
+          <a:chExt cx="0" cy="0"/>
+        </a:xfrm>
+      </p:grpSpPr>
+      <p:sp>
+        <p:nvSpPr>
+          <p:cNvPr id="2" name="Titel 1"/>
+          <p:cNvSpPr>
+            <a:spLocks noGrp="1"/>
+          </p:cNvSpPr>
+          <p:nvPr>
+            <p:ph type="ctrTitle"/>
+          </p:nvPr>
+        </p:nvSpPr>
+        <p:spPr>
+          <a:xfrm>
+            <a:off x="685800" y="2130425"/>
+            <a:ext cx="7742208" cy="1470025"/>
+          </a:xfrm>
+        </p:spPr>
+        <p:txBody>
+          <a:bodyPr/>
+          <a:lstStyle/>
+          <a:p>
+            <a:r>
+              <a:rPr lang="nl-NL" dirty="0" smtClean="0">
+                <a:solidFill>
+                  <a:srgbClr val="FF0000"/>
+                </a:solidFill>
+              </a:rPr>
+              <a:t>Specificaties &amp; opdeling van het systeem in de 4 modules</a:t>
+            </a:r>
+            <a:endParaRPr lang="nl-NL" dirty="0">
+              <a:solidFill>
+                <a:srgbClr val="FF0000"/>
+              </a:solidFill>
+            </a:endParaRPr>
+          </a:p>
+        </p:txBody>
+      </p:sp>
+      <p:sp>
+        <p:nvSpPr>
+          <p:cNvPr id="3" name="Ondertitel 2"/>
+          <p:cNvSpPr>
+            <a:spLocks noGrp="1"/>
+          </p:cNvSpPr>
+          <p:nvPr>
+            <p:ph type="subTitle" idx="1"/>
+          </p:nvPr>
+        </p:nvSpPr>
+        <p:spPr/>
+        <p:txBody>
+          <a:bodyPr/>
+          <a:lstStyle/>
+          <a:p>
+            <a:endParaRPr lang="nl-NL"/>
+          </a:p>
+        </p:txBody>
+      </p:sp>
+    </p:spTree>
+    <p:extLst>
+      <p:ext uri="{BB962C8B-B14F-4D97-AF65-F5344CB8AC3E}">
+        <p14:creationId xmlns:p14="http://schemas.microsoft.com/office/powerpoint/2010/main" val="4024387490"/>
+      </p:ext>
+    </p:extLst>
+  </p:cSld>
+  <p:clrMapOvr>
+    <a:masterClrMapping/>
+  </p:clrMapOvr>
+</p:sld>
+</file>
+
+<file path=ppt/slides/slide4.xml><?xml version="1.0" encoding="utf-8"?>
+<p:sld xmlns:a="http://schemas.openxmlformats.org/drawingml/2006/main" xmlns:r="http://schemas.openxmlformats.org/officeDocument/2006/relationships" xmlns:p="http://schemas.openxmlformats.org/presentationml/2006/main">
+  <p:cSld>
+    <p:spTree>
+      <p:nvGrpSpPr>
+        <p:cNvPr id="1" name=""/>
+        <p:cNvGrpSpPr/>
+        <p:nvPr/>
+      </p:nvGrpSpPr>
+      <p:grpSpPr>
+        <a:xfrm>
+          <a:off x="0" y="0"/>
+          <a:ext cx="0" cy="0"/>
+          <a:chOff x="0" y="0"/>
+          <a:chExt cx="0" cy="0"/>
+        </a:xfrm>
+      </p:grpSpPr>
+      <p:sp>
+        <p:nvSpPr>
+          <p:cNvPr id="2" name="Titel 1"/>
+          <p:cNvSpPr>
+            <a:spLocks noGrp="1"/>
+          </p:cNvSpPr>
+          <p:nvPr>
+            <p:ph type="title"/>
+          </p:nvPr>
+        </p:nvSpPr>
+        <p:spPr/>
+        <p:txBody>
+          <a:bodyPr/>
+          <a:lstStyle/>
+          <a:p>
+            <a:r>
+              <a:rPr lang="nl-NL" dirty="0" smtClean="0"/>
+              <a:t>DCF77 module</a:t>
+            </a:r>
+            <a:endParaRPr lang="nl-NL" dirty="0"/>
+          </a:p>
+        </p:txBody>
+      </p:sp>
+    </p:spTree>
+    <p:extLst>
+      <p:ext uri="{BB962C8B-B14F-4D97-AF65-F5344CB8AC3E}">
+        <p14:creationId xmlns:p14="http://schemas.microsoft.com/office/powerpoint/2010/main" val="912281294"/>
+      </p:ext>
+    </p:extLst>
+  </p:cSld>
+  <p:clrMapOvr>
+    <a:masterClrMapping/>
+  </p:clrMapOvr>
+  <p:timing>
+    <p:tnLst>
+      <p:par>
+        <p:cTn id="1" dur="indefinite" restart="never" nodeType="tmRoot"/>
+      </p:par>
+    </p:tnLst>
+  </p:timing>
+</p:sld>
+</file>
+
+<file path=ppt/slides/slide5.xml><?xml version="1.0" encoding="utf-8"?>
 <p:sld xmlns:a="http://schemas.openxmlformats.org/drawingml/2006/main" xmlns:r="http://schemas.openxmlformats.org/officeDocument/2006/relationships" xmlns:p="http://schemas.openxmlformats.org/presentationml/2006/main">
   <p:cSld>
     <p:spTree>
@@ -9912,7 +10760,7 @@
 </p:sld>
 </file>
 
-<file path=ppt/slides/slide4.xml><?xml version="1.0" encoding="utf-8"?>
+<file path=ppt/slides/slide6.xml><?xml version="1.0" encoding="utf-8"?>
 <p:sld xmlns:a="http://schemas.openxmlformats.org/drawingml/2006/main" xmlns:r="http://schemas.openxmlformats.org/officeDocument/2006/relationships" xmlns:p="http://schemas.openxmlformats.org/presentationml/2006/main">
   <p:cSld>
     <p:spTree>
@@ -16122,356 +16970,6 @@
 </p:sld>
 </file>
 
-<file path=ppt/slides/slide5.xml><?xml version="1.0" encoding="utf-8"?>
-<p:sld xmlns:a="http://schemas.openxmlformats.org/drawingml/2006/main" xmlns:r="http://schemas.openxmlformats.org/officeDocument/2006/relationships" xmlns:p="http://schemas.openxmlformats.org/presentationml/2006/main">
-  <p:cSld>
-    <p:spTree>
-      <p:nvGrpSpPr>
-        <p:cNvPr id="1" name=""/>
-        <p:cNvGrpSpPr/>
-        <p:nvPr/>
-      </p:nvGrpSpPr>
-      <p:grpSpPr>
-        <a:xfrm>
-          <a:off x="0" y="0"/>
-          <a:ext cx="0" cy="0"/>
-          <a:chOff x="0" y="0"/>
-          <a:chExt cx="0" cy="0"/>
-        </a:xfrm>
-      </p:grpSpPr>
-      <p:sp>
-        <p:nvSpPr>
-          <p:cNvPr id="4098" name="Title 3"/>
-          <p:cNvSpPr>
-            <a:spLocks noGrp="1"/>
-          </p:cNvSpPr>
-          <p:nvPr>
-            <p:ph type="title"/>
-          </p:nvPr>
-        </p:nvSpPr>
-        <p:spPr>
-          <a:xfrm>
-            <a:off x="917575" y="457200"/>
-            <a:ext cx="7159625" cy="627063"/>
-          </a:xfrm>
-        </p:spPr>
-        <p:txBody>
-          <a:bodyPr/>
-          <a:lstStyle/>
-          <a:p>
-            <a:pPr>
-              <a:defRPr/>
-            </a:pPr>
-            <a:r>
-              <a:rPr lang="nl-NL" altLang="nl-NL" dirty="0" smtClean="0">
-                <a:latin typeface="+mn-lt"/>
-                <a:ea typeface="ＭＳ Ｐゴシック" pitchFamily="34" charset="-128"/>
-              </a:rPr>
-              <a:t>DCF77</a:t>
-            </a:r>
-          </a:p>
-        </p:txBody>
-      </p:sp>
-      <p:sp>
-        <p:nvSpPr>
-          <p:cNvPr id="6" name="Ondertitel 2"/>
-          <p:cNvSpPr txBox="1">
-            <a:spLocks/>
-          </p:cNvSpPr>
-          <p:nvPr/>
-        </p:nvSpPr>
-        <p:spPr bwMode="auto">
-          <a:xfrm>
-            <a:off x="914400" y="1041400"/>
-            <a:ext cx="6781800" cy="474663"/>
-          </a:xfrm>
-          <a:prstGeom prst="rect">
-            <a:avLst/>
-          </a:prstGeom>
-          <a:noFill/>
-          <a:ln w="9525">
-            <a:noFill/>
-            <a:miter lim="800000"/>
-            <a:headEnd/>
-            <a:tailEnd/>
-          </a:ln>
-        </p:spPr>
-        <p:txBody>
-          <a:bodyPr lIns="0" tIns="0" rIns="0" bIns="0"/>
-          <a:lstStyle>
-            <a:lvl1pPr eaLnBrk="0" hangingPunct="0">
-              <a:defRPr sz="2400">
-                <a:solidFill>
-                  <a:schemeClr val="tx1"/>
-                </a:solidFill>
-                <a:latin typeface="Tahoma" charset="0"/>
-                <a:cs typeface="Arial" charset="0"/>
-              </a:defRPr>
-            </a:lvl1pPr>
-            <a:lvl2pPr marL="37931725" indent="-37474525" eaLnBrk="0" hangingPunct="0">
-              <a:defRPr sz="2400">
-                <a:solidFill>
-                  <a:schemeClr val="tx1"/>
-                </a:solidFill>
-                <a:latin typeface="Tahoma" charset="0"/>
-                <a:cs typeface="Arial" charset="0"/>
-              </a:defRPr>
-            </a:lvl2pPr>
-            <a:lvl3pPr eaLnBrk="0" hangingPunct="0">
-              <a:defRPr sz="2400">
-                <a:solidFill>
-                  <a:schemeClr val="tx1"/>
-                </a:solidFill>
-                <a:latin typeface="Tahoma" charset="0"/>
-                <a:cs typeface="Arial" charset="0"/>
-              </a:defRPr>
-            </a:lvl3pPr>
-            <a:lvl4pPr eaLnBrk="0" hangingPunct="0">
-              <a:defRPr sz="2400">
-                <a:solidFill>
-                  <a:schemeClr val="tx1"/>
-                </a:solidFill>
-                <a:latin typeface="Tahoma" charset="0"/>
-                <a:cs typeface="Arial" charset="0"/>
-              </a:defRPr>
-            </a:lvl4pPr>
-            <a:lvl5pPr eaLnBrk="0" hangingPunct="0">
-              <a:defRPr sz="2400">
-                <a:solidFill>
-                  <a:schemeClr val="tx1"/>
-                </a:solidFill>
-                <a:latin typeface="Tahoma" charset="0"/>
-                <a:cs typeface="Arial" charset="0"/>
-              </a:defRPr>
-            </a:lvl5pPr>
-            <a:lvl6pPr marL="457200" eaLnBrk="0" fontAlgn="base" hangingPunct="0">
-              <a:spcBef>
-                <a:spcPct val="0"/>
-              </a:spcBef>
-              <a:spcAft>
-                <a:spcPct val="0"/>
-              </a:spcAft>
-              <a:defRPr sz="2400">
-                <a:solidFill>
-                  <a:schemeClr val="tx1"/>
-                </a:solidFill>
-                <a:latin typeface="Tahoma" charset="0"/>
-                <a:cs typeface="Arial" charset="0"/>
-              </a:defRPr>
-            </a:lvl6pPr>
-            <a:lvl7pPr marL="914400" eaLnBrk="0" fontAlgn="base" hangingPunct="0">
-              <a:spcBef>
-                <a:spcPct val="0"/>
-              </a:spcBef>
-              <a:spcAft>
-                <a:spcPct val="0"/>
-              </a:spcAft>
-              <a:defRPr sz="2400">
-                <a:solidFill>
-                  <a:schemeClr val="tx1"/>
-                </a:solidFill>
-                <a:latin typeface="Tahoma" charset="0"/>
-                <a:cs typeface="Arial" charset="0"/>
-              </a:defRPr>
-            </a:lvl7pPr>
-            <a:lvl8pPr marL="1371600" eaLnBrk="0" fontAlgn="base" hangingPunct="0">
-              <a:spcBef>
-                <a:spcPct val="0"/>
-              </a:spcBef>
-              <a:spcAft>
-                <a:spcPct val="0"/>
-              </a:spcAft>
-              <a:defRPr sz="2400">
-                <a:solidFill>
-                  <a:schemeClr val="tx1"/>
-                </a:solidFill>
-                <a:latin typeface="Tahoma" charset="0"/>
-                <a:cs typeface="Arial" charset="0"/>
-              </a:defRPr>
-            </a:lvl8pPr>
-            <a:lvl9pPr marL="1828800" eaLnBrk="0" fontAlgn="base" hangingPunct="0">
-              <a:spcBef>
-                <a:spcPct val="0"/>
-              </a:spcBef>
-              <a:spcAft>
-                <a:spcPct val="0"/>
-              </a:spcAft>
-              <a:defRPr sz="2400">
-                <a:solidFill>
-                  <a:schemeClr val="tx1"/>
-                </a:solidFill>
-                <a:latin typeface="Tahoma" charset="0"/>
-                <a:cs typeface="Arial" charset="0"/>
-              </a:defRPr>
-            </a:lvl9pPr>
-          </a:lstStyle>
-          <a:p>
-            <a:pPr algn="l">
-              <a:lnSpc>
-                <a:spcPts val="2500"/>
-              </a:lnSpc>
-              <a:buClr>
-                <a:srgbClr val="00A6D6"/>
-              </a:buClr>
-              <a:defRPr/>
-            </a:pPr>
-            <a:r>
-              <a:rPr lang="nl-NL" altLang="nl-NL" sz="2000" dirty="0" smtClean="0">
-                <a:solidFill>
-                  <a:srgbClr val="00A6D6"/>
-                </a:solidFill>
-                <a:latin typeface="+mn-lt"/>
-                <a:ea typeface="ＭＳ Ｐゴシック" charset="-128"/>
-              </a:rPr>
-              <a:t>Testen</a:t>
-            </a:r>
-          </a:p>
-        </p:txBody>
-      </p:sp>
-      <p:pic>
-        <p:nvPicPr>
-          <p:cNvPr id="4" name="Afbeelding 3"/>
-          <p:cNvPicPr>
-            <a:picLocks noChangeAspect="1"/>
-          </p:cNvPicPr>
-          <p:nvPr/>
-        </p:nvPicPr>
-        <p:blipFill>
-          <a:blip r:embed="rId2">
-            <a:extLst>
-              <a:ext uri="{28A0092B-C50C-407E-A947-70E740481C1C}">
-                <a14:useLocalDpi xmlns:a14="http://schemas.microsoft.com/office/drawing/2010/main" val="0"/>
-              </a:ext>
-            </a:extLst>
-          </a:blip>
-          <a:stretch>
-            <a:fillRect/>
-          </a:stretch>
-        </p:blipFill>
-        <p:spPr>
-          <a:xfrm>
-            <a:off x="990714" y="2488486"/>
-            <a:ext cx="7300593" cy="2088061"/>
-          </a:xfrm>
-          <a:prstGeom prst="rect">
-            <a:avLst/>
-          </a:prstGeom>
-        </p:spPr>
-      </p:pic>
-      <p:sp>
-        <p:nvSpPr>
-          <p:cNvPr id="2" name="Tekstvak 1"/>
-          <p:cNvSpPr txBox="1"/>
-          <p:nvPr/>
-        </p:nvSpPr>
-        <p:spPr>
-          <a:xfrm>
-            <a:off x="1001987" y="4576547"/>
-            <a:ext cx="7289320" cy="261610"/>
-          </a:xfrm>
-          <a:prstGeom prst="rect">
-            <a:avLst/>
-          </a:prstGeom>
-          <a:noFill/>
-        </p:spPr>
-        <p:txBody>
-          <a:bodyPr wrap="square" rtlCol="0">
-            <a:spAutoFit/>
-          </a:bodyPr>
-          <a:lstStyle/>
-          <a:p>
-            <a:r>
-              <a:rPr lang="nl-NL" sz="1050" i="1" dirty="0" smtClean="0"/>
-              <a:t>De in het DCF signaal van de testbench gecodeerde datum &amp; tijdstempel is in dit geval: maandag 08-12-2014, 11:48  </a:t>
-            </a:r>
-            <a:endParaRPr lang="nl-NL" sz="1050" i="1" dirty="0"/>
-          </a:p>
-        </p:txBody>
-      </p:sp>
-    </p:spTree>
-    <p:extLst>
-      <p:ext uri="{BB962C8B-B14F-4D97-AF65-F5344CB8AC3E}">
-        <p14:creationId xmlns:p14="http://schemas.microsoft.com/office/powerpoint/2010/main" val="488364077"/>
-      </p:ext>
-    </p:extLst>
-  </p:cSld>
-  <p:clrMapOvr>
-    <a:masterClrMapping/>
-  </p:clrMapOvr>
-  <p:timing>
-    <p:tnLst>
-      <p:par>
-        <p:cTn id="1" dur="indefinite" restart="never" nodeType="tmRoot"/>
-      </p:par>
-    </p:tnLst>
-  </p:timing>
-</p:sld>
-</file>
-
-<file path=ppt/slides/slide6.xml><?xml version="1.0" encoding="utf-8"?>
-<p:sld xmlns:a="http://schemas.openxmlformats.org/drawingml/2006/main" xmlns:r="http://schemas.openxmlformats.org/officeDocument/2006/relationships" xmlns:p="http://schemas.openxmlformats.org/presentationml/2006/main">
-  <p:cSld>
-    <p:spTree>
-      <p:nvGrpSpPr>
-        <p:cNvPr id="1" name=""/>
-        <p:cNvGrpSpPr/>
-        <p:nvPr/>
-      </p:nvGrpSpPr>
-      <p:grpSpPr>
-        <a:xfrm>
-          <a:off x="0" y="0"/>
-          <a:ext cx="0" cy="0"/>
-          <a:chOff x="0" y="0"/>
-          <a:chExt cx="0" cy="0"/>
-        </a:xfrm>
-      </p:grpSpPr>
-      <p:sp>
-        <p:nvSpPr>
-          <p:cNvPr id="2" name="Titel 1"/>
-          <p:cNvSpPr>
-            <a:spLocks noGrp="1"/>
-          </p:cNvSpPr>
-          <p:nvPr>
-            <p:ph type="title"/>
-          </p:nvPr>
-        </p:nvSpPr>
-        <p:spPr/>
-        <p:txBody>
-          <a:bodyPr/>
-          <a:lstStyle/>
-          <a:p>
-            <a:r>
-              <a:rPr lang="nl-NL" dirty="0" err="1" smtClean="0"/>
-              <a:t>Main</a:t>
-            </a:r>
-            <a:r>
-              <a:rPr lang="nl-NL" dirty="0" smtClean="0"/>
-              <a:t> controller</a:t>
-            </a:r>
-            <a:endParaRPr lang="nl-NL" dirty="0"/>
-          </a:p>
-        </p:txBody>
-      </p:sp>
-    </p:spTree>
-    <p:extLst>
-      <p:ext uri="{BB962C8B-B14F-4D97-AF65-F5344CB8AC3E}">
-        <p14:creationId xmlns:p14="http://schemas.microsoft.com/office/powerpoint/2010/main" val="1952424736"/>
-      </p:ext>
-    </p:extLst>
-  </p:cSld>
-  <p:clrMapOvr>
-    <a:masterClrMapping/>
-  </p:clrMapOvr>
-  <p:timing>
-    <p:tnLst>
-      <p:par>
-        <p:cTn id="1" dur="indefinite" restart="never" nodeType="tmRoot"/>
-      </p:par>
-    </p:tnLst>
-  </p:timing>
-</p:sld>
-</file>
-
 <file path=ppt/slides/slide7.xml><?xml version="1.0" encoding="utf-8"?>
 <p:sld xmlns:a="http://schemas.openxmlformats.org/drawingml/2006/main" xmlns:r="http://schemas.openxmlformats.org/officeDocument/2006/relationships" xmlns:p="http://schemas.openxmlformats.org/presentationml/2006/main">
   <p:cSld>
@@ -16513,23 +17011,12 @@
               <a:defRPr/>
             </a:pPr>
             <a:r>
-              <a:rPr lang="nl-NL" altLang="nl-NL" dirty="0" err="1" smtClean="0">
-                <a:latin typeface="+mn-lt"/>
-                <a:ea typeface="ＭＳ Ｐゴシック" pitchFamily="34" charset="-128"/>
-              </a:rPr>
-              <a:t>Main</a:t>
-            </a:r>
-            <a:r>
               <a:rPr lang="nl-NL" altLang="nl-NL" dirty="0" smtClean="0">
                 <a:latin typeface="+mn-lt"/>
                 <a:ea typeface="ＭＳ Ｐゴシック" pitchFamily="34" charset="-128"/>
               </a:rPr>
-              <a:t> controller</a:t>
-            </a:r>
-            <a:endParaRPr lang="nl-NL" altLang="nl-NL" dirty="0" smtClean="0">
-              <a:latin typeface="+mn-lt"/>
-              <a:ea typeface="ＭＳ Ｐゴシック" pitchFamily="34" charset="-128"/>
-            </a:endParaRPr>
+              <a:t>DCF77</a:t>
+            </a:r>
           </a:p>
         </p:txBody>
       </p:sp>
@@ -16684,27 +17171,18 @@
                 <a:latin typeface="+mn-lt"/>
                 <a:ea typeface="ＭＳ Ｐゴシック" charset="-128"/>
               </a:rPr>
-              <a:t>Blokdiagram</a:t>
-            </a:r>
-            <a:endParaRPr lang="nl-NL" altLang="nl-NL" sz="2000" dirty="0" smtClean="0">
-              <a:solidFill>
-                <a:srgbClr val="00A6D6"/>
-              </a:solidFill>
-              <a:latin typeface="+mn-lt"/>
-              <a:ea typeface="ＭＳ Ｐゴシック" charset="-128"/>
-            </a:endParaRPr>
+              <a:t>Testen</a:t>
+            </a:r>
           </a:p>
         </p:txBody>
       </p:sp>
       <p:pic>
         <p:nvPicPr>
-          <p:cNvPr id="97" name="Content Placeholder 1" descr="controller.png"/>
+          <p:cNvPr id="4" name="Afbeelding 3"/>
           <p:cNvPicPr>
-            <a:picLocks noGrp="1" noChangeAspect="1"/>
+            <a:picLocks noChangeAspect="1"/>
           </p:cNvPicPr>
-          <p:nvPr>
-            <p:ph idx="1"/>
-          </p:nvPr>
+          <p:nvPr/>
         </p:nvPicPr>
         <p:blipFill>
           <a:blip r:embed="rId2">
@@ -16714,22 +17192,54 @@
               </a:ext>
             </a:extLst>
           </a:blip>
-          <a:srcRect t="-43" b="41680"/>
           <a:stretch>
             <a:fillRect/>
           </a:stretch>
         </p:blipFill>
         <p:spPr>
           <a:xfrm>
-            <a:off x="1952625" y="1673225"/>
-            <a:ext cx="5320690" cy="4388402"/>
-          </a:xfrm>
+            <a:off x="990714" y="2488486"/>
+            <a:ext cx="7300593" cy="2088061"/>
+          </a:xfrm>
+          <a:prstGeom prst="rect">
+            <a:avLst/>
+          </a:prstGeom>
         </p:spPr>
       </p:pic>
+      <p:sp>
+        <p:nvSpPr>
+          <p:cNvPr id="2" name="Tekstvak 1"/>
+          <p:cNvSpPr txBox="1"/>
+          <p:nvPr/>
+        </p:nvSpPr>
+        <p:spPr>
+          <a:xfrm>
+            <a:off x="1001987" y="4576547"/>
+            <a:ext cx="7289320" cy="261610"/>
+          </a:xfrm>
+          <a:prstGeom prst="rect">
+            <a:avLst/>
+          </a:prstGeom>
+          <a:noFill/>
+        </p:spPr>
+        <p:txBody>
+          <a:bodyPr wrap="square" rtlCol="0">
+            <a:spAutoFit/>
+          </a:bodyPr>
+          <a:lstStyle/>
+          <a:p>
+            <a:r>
+              <a:rPr lang="nl-NL" sz="1050" i="1" dirty="0" smtClean="0"/>
+              <a:t>De in het DCF signaal van de testbench gecodeerde datum &amp; tijdstempel is in dit geval: maandag 08-12-2014, 11:48  </a:t>
+            </a:r>
+            <a:endParaRPr lang="nl-NL" sz="1050" i="1" dirty="0"/>
+          </a:p>
+        </p:txBody>
+      </p:sp>
     </p:spTree>
     <p:extLst>
       <p:ext uri="{BB962C8B-B14F-4D97-AF65-F5344CB8AC3E}">
-        <p14:creationId xmlns:p14="http://schemas.microsoft.com/office/powerpoint/2010/main" val="2942164064"/>
+        <p14:creationId xmlns:p14="http://schemas.microsoft.com/office/powerpoint/2010/main" val="488364077"/>
       </p:ext>
     </p:extLst>
   </p:cSld>
@@ -16765,7 +17275,7 @@
       </p:grpSpPr>
       <p:sp>
         <p:nvSpPr>
-          <p:cNvPr id="4098" name="Title 3"/>
+          <p:cNvPr id="2" name="Titel 1"/>
           <p:cNvSpPr>
             <a:spLocks noGrp="1"/>
           </p:cNvSpPr>
@@ -16773,254 +17283,27 @@
             <p:ph type="title"/>
           </p:nvPr>
         </p:nvSpPr>
-        <p:spPr>
-          <a:xfrm>
-            <a:off x="917575" y="457200"/>
-            <a:ext cx="7159625" cy="627063"/>
-          </a:xfrm>
-        </p:spPr>
-        <p:txBody>
-          <a:bodyPr/>
-          <a:lstStyle/>
-          <a:p>
-            <a:pPr>
-              <a:defRPr/>
-            </a:pPr>
-            <a:r>
-              <a:rPr lang="nl-NL" altLang="nl-NL" dirty="0" err="1" smtClean="0">
-                <a:latin typeface="+mn-lt"/>
-                <a:ea typeface="ＭＳ Ｐゴシック" pitchFamily="34" charset="-128"/>
-              </a:rPr>
-              <a:t>Main</a:t>
-            </a:r>
-            <a:r>
-              <a:rPr lang="nl-NL" altLang="nl-NL" dirty="0" smtClean="0">
-                <a:latin typeface="+mn-lt"/>
-                <a:ea typeface="ＭＳ Ｐゴシック" pitchFamily="34" charset="-128"/>
-              </a:rPr>
-              <a:t> controller</a:t>
-            </a:r>
-            <a:endParaRPr lang="nl-NL" altLang="nl-NL" dirty="0" smtClean="0">
-              <a:latin typeface="+mn-lt"/>
-              <a:ea typeface="ＭＳ Ｐゴシック" pitchFamily="34" charset="-128"/>
-            </a:endParaRPr>
-          </a:p>
-        </p:txBody>
-      </p:sp>
-      <p:sp>
-        <p:nvSpPr>
-          <p:cNvPr id="6" name="Ondertitel 2"/>
-          <p:cNvSpPr txBox="1">
-            <a:spLocks/>
-          </p:cNvSpPr>
-          <p:nvPr/>
-        </p:nvSpPr>
-        <p:spPr bwMode="auto">
-          <a:xfrm>
-            <a:off x="914400" y="1041400"/>
-            <a:ext cx="6781800" cy="474663"/>
-          </a:xfrm>
-          <a:prstGeom prst="rect">
-            <a:avLst/>
-          </a:prstGeom>
-          <a:noFill/>
-          <a:ln w="9525">
-            <a:noFill/>
-            <a:miter lim="800000"/>
-            <a:headEnd/>
-            <a:tailEnd/>
-          </a:ln>
-        </p:spPr>
-        <p:txBody>
-          <a:bodyPr lIns="0" tIns="0" rIns="0" bIns="0"/>
-          <a:lstStyle>
-            <a:lvl1pPr eaLnBrk="0" hangingPunct="0">
-              <a:defRPr sz="2400">
-                <a:solidFill>
-                  <a:schemeClr val="tx1"/>
-                </a:solidFill>
-                <a:latin typeface="Tahoma" charset="0"/>
-                <a:cs typeface="Arial" charset="0"/>
-              </a:defRPr>
-            </a:lvl1pPr>
-            <a:lvl2pPr marL="37931725" indent="-37474525" eaLnBrk="0" hangingPunct="0">
-              <a:defRPr sz="2400">
-                <a:solidFill>
-                  <a:schemeClr val="tx1"/>
-                </a:solidFill>
-                <a:latin typeface="Tahoma" charset="0"/>
-                <a:cs typeface="Arial" charset="0"/>
-              </a:defRPr>
-            </a:lvl2pPr>
-            <a:lvl3pPr eaLnBrk="0" hangingPunct="0">
-              <a:defRPr sz="2400">
-                <a:solidFill>
-                  <a:schemeClr val="tx1"/>
-                </a:solidFill>
-                <a:latin typeface="Tahoma" charset="0"/>
-                <a:cs typeface="Arial" charset="0"/>
-              </a:defRPr>
-            </a:lvl3pPr>
-            <a:lvl4pPr eaLnBrk="0" hangingPunct="0">
-              <a:defRPr sz="2400">
-                <a:solidFill>
-                  <a:schemeClr val="tx1"/>
-                </a:solidFill>
-                <a:latin typeface="Tahoma" charset="0"/>
-                <a:cs typeface="Arial" charset="0"/>
-              </a:defRPr>
-            </a:lvl4pPr>
-            <a:lvl5pPr eaLnBrk="0" hangingPunct="0">
-              <a:defRPr sz="2400">
-                <a:solidFill>
-                  <a:schemeClr val="tx1"/>
-                </a:solidFill>
-                <a:latin typeface="Tahoma" charset="0"/>
-                <a:cs typeface="Arial" charset="0"/>
-              </a:defRPr>
-            </a:lvl5pPr>
-            <a:lvl6pPr marL="457200" eaLnBrk="0" fontAlgn="base" hangingPunct="0">
-              <a:spcBef>
-                <a:spcPct val="0"/>
-              </a:spcBef>
-              <a:spcAft>
-                <a:spcPct val="0"/>
-              </a:spcAft>
-              <a:defRPr sz="2400">
-                <a:solidFill>
-                  <a:schemeClr val="tx1"/>
-                </a:solidFill>
-                <a:latin typeface="Tahoma" charset="0"/>
-                <a:cs typeface="Arial" charset="0"/>
-              </a:defRPr>
-            </a:lvl6pPr>
-            <a:lvl7pPr marL="914400" eaLnBrk="0" fontAlgn="base" hangingPunct="0">
-              <a:spcBef>
-                <a:spcPct val="0"/>
-              </a:spcBef>
-              <a:spcAft>
-                <a:spcPct val="0"/>
-              </a:spcAft>
-              <a:defRPr sz="2400">
-                <a:solidFill>
-                  <a:schemeClr val="tx1"/>
-                </a:solidFill>
-                <a:latin typeface="Tahoma" charset="0"/>
-                <a:cs typeface="Arial" charset="0"/>
-              </a:defRPr>
-            </a:lvl7pPr>
-            <a:lvl8pPr marL="1371600" eaLnBrk="0" fontAlgn="base" hangingPunct="0">
-              <a:spcBef>
-                <a:spcPct val="0"/>
-              </a:spcBef>
-              <a:spcAft>
-                <a:spcPct val="0"/>
-              </a:spcAft>
-              <a:defRPr sz="2400">
-                <a:solidFill>
-                  <a:schemeClr val="tx1"/>
-                </a:solidFill>
-                <a:latin typeface="Tahoma" charset="0"/>
-                <a:cs typeface="Arial" charset="0"/>
-              </a:defRPr>
-            </a:lvl8pPr>
-            <a:lvl9pPr marL="1828800" eaLnBrk="0" fontAlgn="base" hangingPunct="0">
-              <a:spcBef>
-                <a:spcPct val="0"/>
-              </a:spcBef>
-              <a:spcAft>
-                <a:spcPct val="0"/>
-              </a:spcAft>
-              <a:defRPr sz="2400">
-                <a:solidFill>
-                  <a:schemeClr val="tx1"/>
-                </a:solidFill>
-                <a:latin typeface="Tahoma" charset="0"/>
-                <a:cs typeface="Arial" charset="0"/>
-              </a:defRPr>
-            </a:lvl9pPr>
-          </a:lstStyle>
-          <a:p>
-            <a:pPr algn="l">
-              <a:lnSpc>
-                <a:spcPts val="2500"/>
-              </a:lnSpc>
-              <a:buClr>
-                <a:srgbClr val="00A6D6"/>
-              </a:buClr>
-              <a:defRPr/>
-            </a:pPr>
-            <a:r>
-              <a:rPr lang="nl-NL" altLang="nl-NL" sz="2000" dirty="0" smtClean="0">
-                <a:solidFill>
-                  <a:srgbClr val="00A6D6"/>
-                </a:solidFill>
-                <a:latin typeface="+mn-lt"/>
-                <a:ea typeface="ＭＳ Ｐゴシック" charset="-128"/>
-              </a:rPr>
-              <a:t>Buffer</a:t>
-            </a:r>
-            <a:endParaRPr lang="nl-NL" altLang="nl-NL" sz="2000" dirty="0" smtClean="0">
-              <a:solidFill>
-                <a:srgbClr val="00A6D6"/>
-              </a:solidFill>
-              <a:latin typeface="+mn-lt"/>
-              <a:ea typeface="ＭＳ Ｐゴシック" charset="-128"/>
-            </a:endParaRPr>
-          </a:p>
-        </p:txBody>
-      </p:sp>
-      <p:sp>
-        <p:nvSpPr>
-          <p:cNvPr id="8" name="Content Placeholder 4"/>
-          <p:cNvSpPr>
-            <a:spLocks noGrp="1"/>
-          </p:cNvSpPr>
-          <p:nvPr>
-            <p:ph idx="1"/>
-          </p:nvPr>
-        </p:nvSpPr>
         <p:spPr/>
         <p:txBody>
           <a:bodyPr/>
           <a:lstStyle/>
           <a:p>
             <a:r>
-              <a:rPr lang="nl-NL" altLang="nl-NL" dirty="0">
-                <a:ea typeface="Tahoma"/>
-                <a:cs typeface="Tahoma"/>
-              </a:rPr>
-              <a:t> Ingedrukt houden van knoppen</a:t>
-            </a:r>
-          </a:p>
-          <a:p>
-            <a:r>
-              <a:rPr lang="nl-NL" altLang="nl-NL" dirty="0">
-                <a:ea typeface="Tahoma"/>
-                <a:cs typeface="Tahoma"/>
-              </a:rPr>
-              <a:t> Meerdere knoppen tegelijk indrukken</a:t>
-            </a:r>
-          </a:p>
-          <a:p>
-            <a:r>
-              <a:rPr lang="nl-NL" altLang="nl-NL" dirty="0">
-                <a:solidFill>
-                  <a:srgbClr val="000000"/>
-                </a:solidFill>
-                <a:latin typeface="Tahoma"/>
-                <a:ea typeface="Tahoma"/>
-                <a:cs typeface="Tahoma"/>
-              </a:rPr>
-              <a:t> Rekening houden met imperfecties van input</a:t>
-            </a:r>
+              <a:rPr lang="nl-NL" dirty="0" err="1" smtClean="0"/>
+              <a:t>Main</a:t>
+            </a:r>
+            <a:r>
+              <a:rPr lang="nl-NL" dirty="0" smtClean="0"/>
+              <a:t> controller</a:t>
+            </a:r>
+            <a:endParaRPr lang="nl-NL" dirty="0"/>
           </a:p>
         </p:txBody>
       </p:sp>
     </p:spTree>
     <p:extLst>
       <p:ext uri="{BB962C8B-B14F-4D97-AF65-F5344CB8AC3E}">
-        <p14:creationId xmlns:p14="http://schemas.microsoft.com/office/powerpoint/2010/main" val="388637402"/>
+        <p14:creationId xmlns:p14="http://schemas.microsoft.com/office/powerpoint/2010/main" val="1952424736"/>
       </p:ext>
     </p:extLst>
   </p:cSld>
@@ -17091,10 +17374,6 @@
               </a:rPr>
               <a:t> controller</a:t>
             </a:r>
-            <a:endParaRPr lang="nl-NL" altLang="nl-NL" dirty="0" smtClean="0">
-              <a:latin typeface="+mn-lt"/>
-              <a:ea typeface="ＭＳ Ｐゴシック" pitchFamily="34" charset="-128"/>
-            </a:endParaRPr>
           </a:p>
         </p:txBody>
       </p:sp>
@@ -17249,76 +17528,45 @@
                 <a:latin typeface="+mn-lt"/>
                 <a:ea typeface="ＭＳ Ｐゴシック" charset="-128"/>
               </a:rPr>
-              <a:t>Geheugen</a:t>
-            </a:r>
-            <a:endParaRPr lang="nl-NL" altLang="nl-NL" sz="2000" dirty="0" smtClean="0">
-              <a:solidFill>
-                <a:srgbClr val="00A6D6"/>
-              </a:solidFill>
-              <a:latin typeface="+mn-lt"/>
-              <a:ea typeface="ＭＳ Ｐゴシック" charset="-128"/>
-            </a:endParaRPr>
+              <a:t>Blokdiagram</a:t>
+            </a:r>
           </a:p>
         </p:txBody>
       </p:sp>
-      <p:sp>
-        <p:nvSpPr>
-          <p:cNvPr id="8" name="Content Placeholder 4"/>
-          <p:cNvSpPr>
-            <a:spLocks noGrp="1"/>
-          </p:cNvSpPr>
+      <p:pic>
+        <p:nvPicPr>
+          <p:cNvPr id="97" name="Content Placeholder 1" descr="controller.png"/>
+          <p:cNvPicPr>
+            <a:picLocks noGrp="1" noChangeAspect="1"/>
+          </p:cNvPicPr>
           <p:nvPr>
             <p:ph idx="1"/>
           </p:nvPr>
-        </p:nvSpPr>
-        <p:spPr/>
-        <p:txBody>
-          <a:bodyPr/>
-          <a:lstStyle/>
-          <a:p>
-            <a:r>
-              <a:rPr lang="nl-NL" altLang="nl-NL" dirty="0" err="1">
-                <a:ea typeface="Tahoma"/>
-                <a:cs typeface="Tahoma"/>
-              </a:rPr>
-              <a:t>Enable</a:t>
-            </a:r>
-            <a:r>
-              <a:rPr lang="nl-NL" altLang="nl-NL" dirty="0">
-                <a:ea typeface="Tahoma"/>
-                <a:cs typeface="Tahoma"/>
-              </a:rPr>
-              <a:t> signaal</a:t>
-            </a:r>
-          </a:p>
-          <a:p>
-            <a:r>
-              <a:rPr lang="nl-NL" altLang="nl-NL" dirty="0">
-                <a:ea typeface="Tahoma"/>
-                <a:cs typeface="Tahoma"/>
-              </a:rPr>
-              <a:t>16 bits groot</a:t>
-            </a:r>
-          </a:p>
-          <a:p>
-            <a:r>
-              <a:rPr lang="nl-NL" altLang="nl-NL" dirty="0" smtClean="0">
-                <a:ea typeface="Tahoma"/>
-                <a:cs typeface="Tahoma"/>
-              </a:rPr>
-              <a:t>Uitgang</a:t>
-            </a:r>
-            <a:endParaRPr lang="nl-NL" altLang="nl-NL" dirty="0">
-              <a:ea typeface="Tahoma"/>
-              <a:cs typeface="Tahoma"/>
-            </a:endParaRPr>
-          </a:p>
-        </p:txBody>
-      </p:sp>
+        </p:nvPicPr>
+        <p:blipFill>
+          <a:blip r:embed="rId2">
+            <a:extLst>
+              <a:ext uri="{28A0092B-C50C-407E-A947-70E740481C1C}">
+                <a14:useLocalDpi xmlns:a14="http://schemas.microsoft.com/office/drawing/2010/main" val="0"/>
+              </a:ext>
+            </a:extLst>
+          </a:blip>
+          <a:srcRect t="-43" b="41680"/>
+          <a:stretch>
+            <a:fillRect/>
+          </a:stretch>
+        </p:blipFill>
+        <p:spPr>
+          <a:xfrm>
+            <a:off x="1952625" y="1673225"/>
+            <a:ext cx="5320690" cy="4388402"/>
+          </a:xfrm>
+        </p:spPr>
+      </p:pic>
     </p:spTree>
     <p:extLst>
       <p:ext uri="{BB962C8B-B14F-4D97-AF65-F5344CB8AC3E}">
-        <p14:creationId xmlns:p14="http://schemas.microsoft.com/office/powerpoint/2010/main" val="2557476164"/>
+        <p14:creationId xmlns:p14="http://schemas.microsoft.com/office/powerpoint/2010/main" val="2942164064"/>
       </p:ext>
     </p:extLst>
   </p:cSld>

</xml_diff>

<commit_message>
Kleine fix aan een afbeelding; nu echt af
</commit_message>
<xml_diff>
--- a/Presentatie/Presentatie groep A1.pptx
+++ b/Presentatie/Presentatie groep A1.pptx
@@ -174,7 +174,7 @@
   </p:defaultTextStyle>
   <p:extLst>
     <p:ext uri="{EFAFB233-063F-42B5-8137-9DF3F51BA10A}">
-      <p15:sldGuideLst xmlns:p15="http://schemas.microsoft.com/office/powerpoint/2012/main" xmlns="">
+      <p15:sldGuideLst xmlns:p15="http://schemas.microsoft.com/office/powerpoint/2012/main">
         <p15:guide id="1" orient="horz" pos="1296">
           <p15:clr>
             <a:srgbClr val="A4A3A4"/>
@@ -422,7 +422,7 @@
             <a:fld id="{B17CE723-7FAF-42F5-8202-21813B3B577F}" type="slidenum">
               <a:rPr lang="en-US" altLang="nl-NL"/>
               <a:pPr/>
-              <a:t>‹#›</a:t>
+              <a:t>‹nr.›</a:t>
             </a:fld>
             <a:endParaRPr lang="en-US" altLang="nl-NL"/>
           </a:p>
@@ -763,7 +763,7 @@
             <a:fld id="{29B3F914-7A78-478A-AECE-6C3BB1B32040}" type="slidenum">
               <a:rPr lang="en-US" altLang="nl-NL"/>
               <a:pPr/>
-              <a:t>‹#›</a:t>
+              <a:t>‹nr.›</a:t>
             </a:fld>
             <a:endParaRPr lang="en-US" altLang="nl-NL"/>
           </a:p>
@@ -4263,7 +4263,7 @@
                 <a:ea typeface="ＭＳ Ｐゴシック" panose="020B0600070205080204" pitchFamily="34" charset="-128"/>
               </a:rPr>
               <a:pPr algn="r" eaLnBrk="1" hangingPunct="1"/>
-              <a:t>‹#›</a:t>
+              <a:t>‹nr.›</a:t>
             </a:fld>
             <a:endParaRPr lang="nl-NL" altLang="nl-NL" sz="1100">
               <a:ea typeface="ＭＳ Ｐゴシック" panose="020B0600070205080204" pitchFamily="34" charset="-128"/>
@@ -13936,6 +13936,13 @@
   <p:clrMapOvr>
     <a:masterClrMapping/>
   </p:clrMapOvr>
+  <p:timing>
+    <p:tnLst>
+      <p:par>
+        <p:cTn id="1" dur="indefinite" restart="never" nodeType="tmRoot"/>
+      </p:par>
+    </p:tnLst>
+  </p:timing>
 </p:sld>
 </file>
 
@@ -17341,7 +17348,7 @@
           </a:ln>
           <a:extLst>
             <a:ext uri="{C572A759-6A51-4108-AA02-DFA0A04FC94B}">
-              <ma14:wrappingTextBoxFlag xmlns:ma14="http://schemas.microsoft.com/office/mac/drawingml/2011/main" xmlns="" val="1"/>
+              <ma14:wrappingTextBoxFlag xmlns="" xmlns:ma14="http://schemas.microsoft.com/office/mac/drawingml/2011/main" val="1"/>
             </a:ext>
           </a:extLst>
         </p:spPr>
@@ -17825,6 +17832,13 @@
   <p:clrMapOvr>
     <a:masterClrMapping/>
   </p:clrMapOvr>
+  <p:timing>
+    <p:tnLst>
+      <p:par>
+        <p:cTn id="1" dur="indefinite" restart="never" nodeType="tmRoot"/>
+      </p:par>
+    </p:tnLst>
+  </p:timing>
 </p:sld>
 </file>
 
@@ -17885,11 +17899,7 @@
             </a:pPr>
             <a:r>
               <a:rPr lang="nl-NL" dirty="0" smtClean="0"/>
-              <a:t>Sub </a:t>
-            </a:r>
-            <a:r>
-              <a:rPr lang="nl-NL" dirty="0" smtClean="0"/>
-              <a:t>modules</a:t>
+              <a:t>Sub modules</a:t>
             </a:r>
           </a:p>
           <a:p>
@@ -18406,6 +18416,13 @@
   <p:clrMapOvr>
     <a:masterClrMapping/>
   </p:clrMapOvr>
+  <p:timing>
+    <p:tnLst>
+      <p:par>
+        <p:cTn id="1" dur="indefinite" restart="never" nodeType="tmRoot"/>
+      </p:par>
+    </p:tnLst>
+  </p:timing>
 </p:sld>
 </file>
 
@@ -18617,9 +18634,6 @@
               </a:rPr>
               <a:t>RESULTATEN &amp; TESTEN</a:t>
             </a:r>
-            <a:endParaRPr lang="nl-NL" sz="3300" b="0" dirty="0">
-              <a:latin typeface="+mn-lt"/>
-            </a:endParaRPr>
           </a:p>
         </p:txBody>
       </p:sp>
@@ -18776,13 +18790,6 @@
               </a:rPr>
               <a:t>Simulaties</a:t>
             </a:r>
-            <a:endParaRPr lang="nl-NL" altLang="nl-NL" sz="2000" dirty="0" smtClean="0">
-              <a:solidFill>
-                <a:srgbClr val="00A6D6"/>
-              </a:solidFill>
-              <a:latin typeface="Tahoma"/>
-              <a:ea typeface="ＭＳ Ｐゴシック" charset="-128"/>
-            </a:endParaRPr>
           </a:p>
         </p:txBody>
       </p:sp>
@@ -19060,7 +19067,29 @@
                 <a:ea typeface="Tahoma"/>
                 <a:cs typeface="Tahoma"/>
               </a:rPr>
-              <a:t> Switch Level Simulatie</a:t>
+              <a:t> </a:t>
+            </a:r>
+            <a:r>
+              <a:rPr lang="nl-NL" altLang="nl-NL" dirty="0" smtClean="0">
+                <a:solidFill>
+                  <a:srgbClr val="000000"/>
+                </a:solidFill>
+                <a:latin typeface="Tahoma"/>
+                <a:ea typeface="Tahoma"/>
+                <a:cs typeface="Tahoma"/>
+              </a:rPr>
+              <a:t>Switch-level </a:t>
+            </a:r>
+            <a:r>
+              <a:rPr lang="nl-NL" altLang="nl-NL" dirty="0" smtClean="0">
+                <a:solidFill>
+                  <a:srgbClr val="000000"/>
+                </a:solidFill>
+                <a:latin typeface="Tahoma"/>
+                <a:ea typeface="Tahoma"/>
+                <a:cs typeface="Tahoma"/>
+              </a:rPr>
+              <a:t>Simulatie</a:t>
             </a:r>
           </a:p>
           <a:p>
@@ -19107,6 +19136,13 @@
   <p:clrMapOvr>
     <a:masterClrMapping/>
   </p:clrMapOvr>
+  <p:timing>
+    <p:tnLst>
+      <p:par>
+        <p:cTn id="1" dur="indefinite" restart="never" nodeType="tmRoot"/>
+      </p:par>
+    </p:tnLst>
+  </p:timing>
 </p:sld>
 </file>
 
@@ -19318,9 +19354,6 @@
               </a:rPr>
               <a:t>RESULTATEN &amp; TESTEN</a:t>
             </a:r>
-            <a:endParaRPr lang="nl-NL" sz="3300" b="0" dirty="0">
-              <a:latin typeface="+mn-lt"/>
-            </a:endParaRPr>
           </a:p>
         </p:txBody>
       </p:sp>
@@ -19477,13 +19510,6 @@
               </a:rPr>
               <a:t>Testen op de chip</a:t>
             </a:r>
-            <a:endParaRPr lang="nl-NL" altLang="nl-NL" sz="2000" dirty="0" smtClean="0">
-              <a:solidFill>
-                <a:srgbClr val="00A6D6"/>
-              </a:solidFill>
-              <a:latin typeface="Tahoma"/>
-              <a:ea typeface="ＭＳ Ｐゴシック" charset="-128"/>
-            </a:endParaRPr>
           </a:p>
         </p:txBody>
       </p:sp>
@@ -19809,6 +19835,13 @@
   <p:clrMapOvr>
     <a:masterClrMapping/>
   </p:clrMapOvr>
+  <p:timing>
+    <p:tnLst>
+      <p:par>
+        <p:cTn id="1" dur="indefinite" restart="never" nodeType="tmRoot"/>
+      </p:par>
+    </p:tnLst>
+  </p:timing>
 </p:sld>
 </file>
 
@@ -20032,6 +20065,13 @@
   <p:clrMapOvr>
     <a:masterClrMapping/>
   </p:clrMapOvr>
+  <p:timing>
+    <p:tnLst>
+      <p:par>
+        <p:cTn id="1" dur="indefinite" restart="never" nodeType="tmRoot"/>
+      </p:par>
+    </p:tnLst>
+  </p:timing>
 </p:sld>
 </file>
 
@@ -20131,34 +20171,6 @@
           <a:chExt cx="0" cy="0"/>
         </a:xfrm>
       </p:grpSpPr>
-      <p:pic>
-        <p:nvPicPr>
-          <p:cNvPr id="4" name="Tijdelijke aanduiding voor inhoud 3"/>
-          <p:cNvPicPr>
-            <a:picLocks noGrp="1" noChangeAspect="1"/>
-          </p:cNvPicPr>
-          <p:nvPr>
-            <p:ph idx="1"/>
-          </p:nvPr>
-        </p:nvPicPr>
-        <p:blipFill rotWithShape="1">
-          <a:blip r:embed="rId3">
-            <a:extLst>
-              <a:ext uri="{28A0092B-C50C-407E-A947-70E740481C1C}">
-                <a14:useLocalDpi xmlns:a14="http://schemas.microsoft.com/office/drawing/2010/main" val="0"/>
-              </a:ext>
-            </a:extLst>
-          </a:blip>
-          <a:srcRect b="5749"/>
-          <a:stretch/>
-        </p:blipFill>
-        <p:spPr>
-          <a:xfrm>
-            <a:off x="1780816" y="1488266"/>
-            <a:ext cx="5582369" cy="4801324"/>
-          </a:xfrm>
-        </p:spPr>
-      </p:pic>
       <p:sp>
         <p:nvSpPr>
           <p:cNvPr id="7" name="Title 3"/>
@@ -20523,13 +20535,13 @@
       </p:sp>
       <p:pic>
         <p:nvPicPr>
-          <p:cNvPr id="10" name="Tijdelijke aanduiding voor inhoud 3"/>
+          <p:cNvPr id="9" name="Tijdelijke aanduiding voor inhoud 3"/>
           <p:cNvPicPr>
             <a:picLocks noChangeAspect="1"/>
           </p:cNvPicPr>
           <p:nvPr/>
         </p:nvPicPr>
-        <p:blipFill rotWithShape="1">
+        <p:blipFill>
           <a:blip r:embed="rId3">
             <a:extLst>
               <a:ext uri="{28A0092B-C50C-407E-A947-70E740481C1C}">
@@ -20537,13 +20549,14 @@
               </a:ext>
             </a:extLst>
           </a:blip>
-          <a:srcRect l="30004" t="68721" r="27053"/>
-          <a:stretch/>
+          <a:stretch>
+            <a:fillRect/>
+          </a:stretch>
         </p:blipFill>
         <p:spPr bwMode="auto">
           <a:xfrm>
-            <a:off x="3472249" y="4992130"/>
-            <a:ext cx="2397210" cy="1593451"/>
+            <a:off x="1366454" y="1741039"/>
+            <a:ext cx="6257102" cy="4282474"/>
           </a:xfrm>
           <a:prstGeom prst="rect">
             <a:avLst/>
@@ -21070,8 +21083,9 @@
           <a:p>
             <a:r>
               <a:rPr lang="nl-NL" dirty="0" smtClean="0"/>
-              <a:t>DCF-signaal</a:t>
-            </a:r>
+              <a:t>DCF signaal</a:t>
+            </a:r>
+            <a:endParaRPr lang="nl-NL" dirty="0" smtClean="0"/>
           </a:p>
           <a:p>
             <a:r>
@@ -21082,14 +21096,20 @@
           <a:p>
             <a:r>
               <a:rPr lang="nl-NL" dirty="0" smtClean="0"/>
-              <a:t>Reset-knop</a:t>
-            </a:r>
+              <a:t>Reset knop</a:t>
+            </a:r>
+            <a:endParaRPr lang="nl-NL" dirty="0" smtClean="0"/>
           </a:p>
           <a:p>
             <a:r>
               <a:rPr lang="nl-NL" dirty="0" smtClean="0"/>
-              <a:t>4 menu-knoppen</a:t>
-            </a:r>
+              <a:t>4 </a:t>
+            </a:r>
+            <a:r>
+              <a:rPr lang="nl-NL" dirty="0" smtClean="0"/>
+              <a:t>menu knoppen</a:t>
+            </a:r>
+            <a:endParaRPr lang="nl-NL" dirty="0" smtClean="0"/>
           </a:p>
           <a:p>
             <a:r>
@@ -21098,7 +21118,11 @@
             </a:r>
             <a:r>
               <a:rPr lang="nl-NL" dirty="0" err="1" smtClean="0"/>
-              <a:t>uit-knop</a:t>
+              <a:t>snooze</a:t>
+            </a:r>
+            <a:r>
+              <a:rPr lang="nl-NL" dirty="0" smtClean="0"/>
+              <a:t> knop</a:t>
             </a:r>
             <a:endParaRPr lang="nl-NL" dirty="0"/>
           </a:p>

</xml_diff>

<commit_message>
puntjes omgedraaid, nu echt zeker wel af
</commit_message>
<xml_diff>
--- a/Presentatie/Presentatie groep A1.pptx
+++ b/Presentatie/Presentatie groep A1.pptx
@@ -174,7 +174,7 @@
   </p:defaultTextStyle>
   <p:extLst>
     <p:ext uri="{EFAFB233-063F-42B5-8137-9DF3F51BA10A}">
-      <p15:sldGuideLst xmlns:p15="http://schemas.microsoft.com/office/powerpoint/2012/main">
+      <p15:sldGuideLst xmlns:p15="http://schemas.microsoft.com/office/powerpoint/2012/main" xmlns="">
         <p15:guide id="1" orient="horz" pos="1296">
           <p15:clr>
             <a:srgbClr val="A4A3A4"/>
@@ -422,7 +422,7 @@
             <a:fld id="{B17CE723-7FAF-42F5-8202-21813B3B577F}" type="slidenum">
               <a:rPr lang="en-US" altLang="nl-NL"/>
               <a:pPr/>
-              <a:t>‹nr.›</a:t>
+              <a:t>‹#›</a:t>
             </a:fld>
             <a:endParaRPr lang="en-US" altLang="nl-NL"/>
           </a:p>
@@ -763,7 +763,7 @@
             <a:fld id="{29B3F914-7A78-478A-AECE-6C3BB1B32040}" type="slidenum">
               <a:rPr lang="en-US" altLang="nl-NL"/>
               <a:pPr/>
-              <a:t>‹nr.›</a:t>
+              <a:t>‹#›</a:t>
             </a:fld>
             <a:endParaRPr lang="en-US" altLang="nl-NL"/>
           </a:p>
@@ -4263,7 +4263,7 @@
                 <a:ea typeface="ＭＳ Ｐゴシック" panose="020B0600070205080204" pitchFamily="34" charset="-128"/>
               </a:rPr>
               <a:pPr algn="r" eaLnBrk="1" hangingPunct="1"/>
-              <a:t>‹nr.›</a:t>
+              <a:t>‹#›</a:t>
             </a:fld>
             <a:endParaRPr lang="nl-NL" altLang="nl-NL" sz="1100">
               <a:ea typeface="ＭＳ Ｐゴシック" panose="020B0600070205080204" pitchFamily="34" charset="-128"/>
@@ -17348,7 +17348,7 @@
           </a:ln>
           <a:extLst>
             <a:ext uri="{C572A759-6A51-4108-AA02-DFA0A04FC94B}">
-              <ma14:wrappingTextBoxFlag xmlns="" xmlns:ma14="http://schemas.microsoft.com/office/mac/drawingml/2011/main" val="1"/>
+              <ma14:wrappingTextBoxFlag xmlns:ma14="http://schemas.microsoft.com/office/mac/drawingml/2011/main" xmlns="" val="1"/>
             </a:ext>
           </a:extLst>
         </p:spPr>
@@ -19054,8 +19054,39 @@
                 <a:ea typeface="Tahoma"/>
                 <a:cs typeface="Tahoma"/>
               </a:rPr>
-              <a:t> Modelsim</a:t>
-            </a:r>
+              <a:t> </a:t>
+            </a:r>
+            <a:r>
+              <a:rPr lang="nl-NL" altLang="nl-NL" dirty="0" smtClean="0">
+                <a:solidFill>
+                  <a:srgbClr val="000000"/>
+                </a:solidFill>
+                <a:latin typeface="Tahoma"/>
+                <a:ea typeface="Tahoma"/>
+                <a:cs typeface="Tahoma"/>
+              </a:rPr>
+              <a:t>Modelsim</a:t>
+            </a:r>
+          </a:p>
+          <a:p>
+            <a:r>
+              <a:rPr lang="nl-NL" altLang="nl-NL" dirty="0" smtClean="0">
+                <a:solidFill>
+                  <a:srgbClr val="000000"/>
+                </a:solidFill>
+                <a:ea typeface="Tahoma"/>
+                <a:cs typeface="Tahoma"/>
+              </a:rPr>
+              <a:t>FPGA-bord</a:t>
+            </a:r>
+            <a:endParaRPr lang="nl-NL" altLang="nl-NL" dirty="0" smtClean="0">
+              <a:solidFill>
+                <a:srgbClr val="000000"/>
+              </a:solidFill>
+              <a:latin typeface="Tahoma"/>
+              <a:ea typeface="Tahoma"/>
+              <a:cs typeface="Tahoma"/>
+            </a:endParaRPr>
           </a:p>
           <a:p>
             <a:r>
@@ -19070,7 +19101,7 @@
               <a:t> </a:t>
             </a:r>
             <a:r>
-              <a:rPr lang="nl-NL" altLang="nl-NL" dirty="0" smtClean="0">
+              <a:rPr lang="nl-NL" altLang="nl-NL" smtClean="0">
                 <a:solidFill>
                   <a:srgbClr val="000000"/>
                 </a:solidFill>
@@ -19081,7 +19112,7 @@
               <a:t>Switch-level </a:t>
             </a:r>
             <a:r>
-              <a:rPr lang="nl-NL" altLang="nl-NL" dirty="0" smtClean="0">
+              <a:rPr lang="nl-NL" altLang="nl-NL" smtClean="0">
                 <a:solidFill>
                   <a:srgbClr val="000000"/>
                 </a:solidFill>
@@ -19091,31 +19122,7 @@
               </a:rPr>
               <a:t>Simulatie</a:t>
             </a:r>
-          </a:p>
-          <a:p>
-            <a:r>
-              <a:rPr lang="nl-NL" altLang="nl-NL" dirty="0">
-                <a:solidFill>
-                  <a:srgbClr val="000000"/>
-                </a:solidFill>
-                <a:latin typeface="Tahoma"/>
-                <a:ea typeface="Tahoma"/>
-                <a:cs typeface="Tahoma"/>
-              </a:rPr>
-              <a:t> </a:t>
-            </a:r>
-            <a:r>
-              <a:rPr lang="nl-NL" altLang="nl-NL" dirty="0" smtClean="0">
-                <a:solidFill>
-                  <a:srgbClr val="000000"/>
-                </a:solidFill>
-                <a:latin typeface="Tahoma"/>
-                <a:ea typeface="Tahoma"/>
-                <a:cs typeface="Tahoma"/>
-              </a:rPr>
-              <a:t>FPGA-bord</a:t>
-            </a:r>
-            <a:endParaRPr lang="nl-NL" altLang="nl-NL" dirty="0">
+            <a:endParaRPr lang="nl-NL" altLang="nl-NL" dirty="0" smtClean="0">
               <a:solidFill>
                 <a:srgbClr val="000000"/>
               </a:solidFill>
@@ -21085,7 +21092,6 @@
               <a:rPr lang="nl-NL" dirty="0" smtClean="0"/>
               <a:t>DCF signaal</a:t>
             </a:r>
-            <a:endParaRPr lang="nl-NL" dirty="0" smtClean="0"/>
           </a:p>
           <a:p>
             <a:r>
@@ -21098,18 +21104,12 @@
               <a:rPr lang="nl-NL" dirty="0" smtClean="0"/>
               <a:t>Reset knop</a:t>
             </a:r>
-            <a:endParaRPr lang="nl-NL" dirty="0" smtClean="0"/>
           </a:p>
           <a:p>
             <a:r>
               <a:rPr lang="nl-NL" dirty="0" smtClean="0"/>
-              <a:t>4 </a:t>
-            </a:r>
-            <a:r>
-              <a:rPr lang="nl-NL" dirty="0" smtClean="0"/>
-              <a:t>menu knoppen</a:t>
-            </a:r>
-            <a:endParaRPr lang="nl-NL" dirty="0" smtClean="0"/>
+              <a:t>4 menu knoppen</a:t>
+            </a:r>
           </a:p>
           <a:p>
             <a:r>

</xml_diff>